<commit_message>
Leaks slides first complete draft
* Added filling the hole slides

* Solutions for both of the exercises

* Added heap spraying sliddes

* Added attempts to find heap feng shui setups via scripting (sudo bug)
</commit_message>
<xml_diff>
--- a/modules/unsorted_bin_attack/unsorted_bin.pptx
+++ b/modules/unsorted_bin_attack/unsorted_bin.pptx
@@ -6157,6 +6157,753 @@
 </dgm:colorsDef>
 </file>
 
+<file path=ppt/diagrams/colors9.xml><?xml version="1.0" encoding="utf-8"?>
+<dgm:colorsDef xmlns:dgm="http://schemas.openxmlformats.org/drawingml/2006/diagram" xmlns:a="http://schemas.openxmlformats.org/drawingml/2006/main" uniqueId="urn:microsoft.com/office/officeart/2005/8/colors/accent3_2">
+  <dgm:title val=""/>
+  <dgm:desc val=""/>
+  <dgm:catLst>
+    <dgm:cat type="accent3" pri="11200"/>
+  </dgm:catLst>
+  <dgm:styleLbl name="node0">
+    <dgm:fillClrLst meth="repeat">
+      <a:schemeClr val="accent3"/>
+    </dgm:fillClrLst>
+    <dgm:linClrLst meth="repeat">
+      <a:schemeClr val="lt1"/>
+    </dgm:linClrLst>
+    <dgm:effectClrLst/>
+    <dgm:txLinClrLst/>
+    <dgm:txFillClrLst/>
+    <dgm:txEffectClrLst/>
+  </dgm:styleLbl>
+  <dgm:styleLbl name="node1">
+    <dgm:fillClrLst meth="repeat">
+      <a:schemeClr val="accent3"/>
+    </dgm:fillClrLst>
+    <dgm:linClrLst meth="repeat">
+      <a:schemeClr val="lt1"/>
+    </dgm:linClrLst>
+    <dgm:effectClrLst/>
+    <dgm:txLinClrLst/>
+    <dgm:txFillClrLst/>
+    <dgm:txEffectClrLst/>
+  </dgm:styleLbl>
+  <dgm:styleLbl name="alignNode1">
+    <dgm:fillClrLst meth="repeat">
+      <a:schemeClr val="accent3"/>
+    </dgm:fillClrLst>
+    <dgm:linClrLst meth="repeat">
+      <a:schemeClr val="accent3"/>
+    </dgm:linClrLst>
+    <dgm:effectClrLst/>
+    <dgm:txLinClrLst/>
+    <dgm:txFillClrLst/>
+    <dgm:txEffectClrLst/>
+  </dgm:styleLbl>
+  <dgm:styleLbl name="lnNode1">
+    <dgm:fillClrLst meth="repeat">
+      <a:schemeClr val="accent3"/>
+    </dgm:fillClrLst>
+    <dgm:linClrLst meth="repeat">
+      <a:schemeClr val="lt1"/>
+    </dgm:linClrLst>
+    <dgm:effectClrLst/>
+    <dgm:txLinClrLst/>
+    <dgm:txFillClrLst/>
+    <dgm:txEffectClrLst/>
+  </dgm:styleLbl>
+  <dgm:styleLbl name="vennNode1">
+    <dgm:fillClrLst meth="repeat">
+      <a:schemeClr val="accent3">
+        <a:alpha val="50000"/>
+      </a:schemeClr>
+    </dgm:fillClrLst>
+    <dgm:linClrLst meth="repeat">
+      <a:schemeClr val="lt1"/>
+    </dgm:linClrLst>
+    <dgm:effectClrLst/>
+    <dgm:txLinClrLst/>
+    <dgm:txFillClrLst/>
+    <dgm:txEffectClrLst/>
+  </dgm:styleLbl>
+  <dgm:styleLbl name="node2">
+    <dgm:fillClrLst meth="repeat">
+      <a:schemeClr val="accent3"/>
+    </dgm:fillClrLst>
+    <dgm:linClrLst meth="repeat">
+      <a:schemeClr val="lt1"/>
+    </dgm:linClrLst>
+    <dgm:effectClrLst/>
+    <dgm:txLinClrLst/>
+    <dgm:txFillClrLst/>
+    <dgm:txEffectClrLst/>
+  </dgm:styleLbl>
+  <dgm:styleLbl name="node3">
+    <dgm:fillClrLst meth="repeat">
+      <a:schemeClr val="accent3"/>
+    </dgm:fillClrLst>
+    <dgm:linClrLst meth="repeat">
+      <a:schemeClr val="lt1"/>
+    </dgm:linClrLst>
+    <dgm:effectClrLst/>
+    <dgm:txLinClrLst/>
+    <dgm:txFillClrLst/>
+    <dgm:txEffectClrLst/>
+  </dgm:styleLbl>
+  <dgm:styleLbl name="node4">
+    <dgm:fillClrLst meth="repeat">
+      <a:schemeClr val="accent3"/>
+    </dgm:fillClrLst>
+    <dgm:linClrLst meth="repeat">
+      <a:schemeClr val="lt1"/>
+    </dgm:linClrLst>
+    <dgm:effectClrLst/>
+    <dgm:txLinClrLst/>
+    <dgm:txFillClrLst/>
+    <dgm:txEffectClrLst/>
+  </dgm:styleLbl>
+  <dgm:styleLbl name="fgImgPlace1">
+    <dgm:fillClrLst meth="repeat">
+      <a:schemeClr val="accent3">
+        <a:tint val="50000"/>
+      </a:schemeClr>
+    </dgm:fillClrLst>
+    <dgm:linClrLst meth="repeat">
+      <a:schemeClr val="lt1"/>
+    </dgm:linClrLst>
+    <dgm:effectClrLst/>
+    <dgm:txLinClrLst/>
+    <dgm:txFillClrLst meth="repeat">
+      <a:schemeClr val="lt1"/>
+    </dgm:txFillClrLst>
+    <dgm:txEffectClrLst/>
+  </dgm:styleLbl>
+  <dgm:styleLbl name="alignImgPlace1">
+    <dgm:fillClrLst meth="repeat">
+      <a:schemeClr val="accent3">
+        <a:tint val="50000"/>
+      </a:schemeClr>
+    </dgm:fillClrLst>
+    <dgm:linClrLst meth="repeat">
+      <a:schemeClr val="lt1"/>
+    </dgm:linClrLst>
+    <dgm:effectClrLst/>
+    <dgm:txLinClrLst/>
+    <dgm:txFillClrLst meth="repeat">
+      <a:schemeClr val="lt1"/>
+    </dgm:txFillClrLst>
+    <dgm:txEffectClrLst/>
+  </dgm:styleLbl>
+  <dgm:styleLbl name="bgImgPlace1">
+    <dgm:fillClrLst meth="repeat">
+      <a:schemeClr val="accent3">
+        <a:tint val="50000"/>
+      </a:schemeClr>
+    </dgm:fillClrLst>
+    <dgm:linClrLst meth="repeat">
+      <a:schemeClr val="lt1"/>
+    </dgm:linClrLst>
+    <dgm:effectClrLst/>
+    <dgm:txLinClrLst/>
+    <dgm:txFillClrLst meth="repeat">
+      <a:schemeClr val="lt1"/>
+    </dgm:txFillClrLst>
+    <dgm:txEffectClrLst/>
+  </dgm:styleLbl>
+  <dgm:styleLbl name="sibTrans2D1">
+    <dgm:fillClrLst meth="repeat">
+      <a:schemeClr val="accent3">
+        <a:tint val="60000"/>
+      </a:schemeClr>
+    </dgm:fillClrLst>
+    <dgm:linClrLst meth="repeat">
+      <a:schemeClr val="accent3">
+        <a:tint val="60000"/>
+      </a:schemeClr>
+    </dgm:linClrLst>
+    <dgm:effectClrLst/>
+    <dgm:txLinClrLst/>
+    <dgm:txFillClrLst/>
+    <dgm:txEffectClrLst/>
+  </dgm:styleLbl>
+  <dgm:styleLbl name="fgSibTrans2D1">
+    <dgm:fillClrLst meth="repeat">
+      <a:schemeClr val="accent3">
+        <a:tint val="60000"/>
+      </a:schemeClr>
+    </dgm:fillClrLst>
+    <dgm:linClrLst meth="repeat">
+      <a:schemeClr val="accent3">
+        <a:tint val="60000"/>
+      </a:schemeClr>
+    </dgm:linClrLst>
+    <dgm:effectClrLst/>
+    <dgm:txLinClrLst/>
+    <dgm:txFillClrLst/>
+    <dgm:txEffectClrLst/>
+  </dgm:styleLbl>
+  <dgm:styleLbl name="bgSibTrans2D1">
+    <dgm:fillClrLst meth="repeat">
+      <a:schemeClr val="accent3">
+        <a:tint val="60000"/>
+      </a:schemeClr>
+    </dgm:fillClrLst>
+    <dgm:linClrLst meth="repeat">
+      <a:schemeClr val="accent3">
+        <a:tint val="60000"/>
+      </a:schemeClr>
+    </dgm:linClrLst>
+    <dgm:effectClrLst/>
+    <dgm:txLinClrLst/>
+    <dgm:txFillClrLst/>
+    <dgm:txEffectClrLst/>
+  </dgm:styleLbl>
+  <dgm:styleLbl name="sibTrans1D1">
+    <dgm:fillClrLst meth="repeat">
+      <a:schemeClr val="accent3"/>
+    </dgm:fillClrLst>
+    <dgm:linClrLst meth="repeat">
+      <a:schemeClr val="accent3"/>
+    </dgm:linClrLst>
+    <dgm:effectClrLst/>
+    <dgm:txLinClrLst/>
+    <dgm:txFillClrLst meth="repeat">
+      <a:schemeClr val="tx1"/>
+    </dgm:txFillClrLst>
+    <dgm:txEffectClrLst/>
+  </dgm:styleLbl>
+  <dgm:styleLbl name="callout">
+    <dgm:fillClrLst meth="repeat">
+      <a:schemeClr val="accent3"/>
+    </dgm:fillClrLst>
+    <dgm:linClrLst meth="repeat">
+      <a:schemeClr val="accent3">
+        <a:tint val="50000"/>
+      </a:schemeClr>
+    </dgm:linClrLst>
+    <dgm:effectClrLst/>
+    <dgm:txLinClrLst/>
+    <dgm:txFillClrLst meth="repeat">
+      <a:schemeClr val="tx1"/>
+    </dgm:txFillClrLst>
+    <dgm:txEffectClrLst/>
+  </dgm:styleLbl>
+  <dgm:styleLbl name="asst0">
+    <dgm:fillClrLst meth="repeat">
+      <a:schemeClr val="accent3"/>
+    </dgm:fillClrLst>
+    <dgm:linClrLst meth="repeat">
+      <a:schemeClr val="lt1"/>
+    </dgm:linClrLst>
+    <dgm:effectClrLst/>
+    <dgm:txLinClrLst/>
+    <dgm:txFillClrLst/>
+    <dgm:txEffectClrLst/>
+  </dgm:styleLbl>
+  <dgm:styleLbl name="asst1">
+    <dgm:fillClrLst meth="repeat">
+      <a:schemeClr val="accent3"/>
+    </dgm:fillClrLst>
+    <dgm:linClrLst meth="repeat">
+      <a:schemeClr val="lt1"/>
+    </dgm:linClrLst>
+    <dgm:effectClrLst/>
+    <dgm:txLinClrLst/>
+    <dgm:txFillClrLst/>
+    <dgm:txEffectClrLst/>
+  </dgm:styleLbl>
+  <dgm:styleLbl name="asst2">
+    <dgm:fillClrLst meth="repeat">
+      <a:schemeClr val="accent3"/>
+    </dgm:fillClrLst>
+    <dgm:linClrLst meth="repeat">
+      <a:schemeClr val="lt1"/>
+    </dgm:linClrLst>
+    <dgm:effectClrLst/>
+    <dgm:txLinClrLst/>
+    <dgm:txFillClrLst/>
+    <dgm:txEffectClrLst/>
+  </dgm:styleLbl>
+  <dgm:styleLbl name="asst3">
+    <dgm:fillClrLst meth="repeat">
+      <a:schemeClr val="accent3"/>
+    </dgm:fillClrLst>
+    <dgm:linClrLst meth="repeat">
+      <a:schemeClr val="lt1"/>
+    </dgm:linClrLst>
+    <dgm:effectClrLst/>
+    <dgm:txLinClrLst/>
+    <dgm:txFillClrLst/>
+    <dgm:txEffectClrLst/>
+  </dgm:styleLbl>
+  <dgm:styleLbl name="asst4">
+    <dgm:fillClrLst meth="repeat">
+      <a:schemeClr val="accent3"/>
+    </dgm:fillClrLst>
+    <dgm:linClrLst meth="repeat">
+      <a:schemeClr val="lt1"/>
+    </dgm:linClrLst>
+    <dgm:effectClrLst/>
+    <dgm:txLinClrLst/>
+    <dgm:txFillClrLst/>
+    <dgm:txEffectClrLst/>
+  </dgm:styleLbl>
+  <dgm:styleLbl name="parChTrans2D1">
+    <dgm:fillClrLst meth="repeat">
+      <a:schemeClr val="accent3">
+        <a:tint val="60000"/>
+      </a:schemeClr>
+    </dgm:fillClrLst>
+    <dgm:linClrLst meth="repeat">
+      <a:schemeClr val="accent3">
+        <a:tint val="60000"/>
+      </a:schemeClr>
+    </dgm:linClrLst>
+    <dgm:effectClrLst/>
+    <dgm:txLinClrLst/>
+    <dgm:txFillClrLst meth="repeat">
+      <a:schemeClr val="lt1"/>
+    </dgm:txFillClrLst>
+    <dgm:txEffectClrLst/>
+  </dgm:styleLbl>
+  <dgm:styleLbl name="parChTrans2D2">
+    <dgm:fillClrLst meth="repeat">
+      <a:schemeClr val="accent3"/>
+    </dgm:fillClrLst>
+    <dgm:linClrLst meth="repeat">
+      <a:schemeClr val="accent3"/>
+    </dgm:linClrLst>
+    <dgm:effectClrLst/>
+    <dgm:txLinClrLst/>
+    <dgm:txFillClrLst meth="repeat">
+      <a:schemeClr val="lt1"/>
+    </dgm:txFillClrLst>
+    <dgm:txEffectClrLst/>
+  </dgm:styleLbl>
+  <dgm:styleLbl name="parChTrans2D3">
+    <dgm:fillClrLst meth="repeat">
+      <a:schemeClr val="accent3"/>
+    </dgm:fillClrLst>
+    <dgm:linClrLst meth="repeat">
+      <a:schemeClr val="accent3"/>
+    </dgm:linClrLst>
+    <dgm:effectClrLst/>
+    <dgm:txLinClrLst/>
+    <dgm:txFillClrLst meth="repeat">
+      <a:schemeClr val="lt1"/>
+    </dgm:txFillClrLst>
+    <dgm:txEffectClrLst/>
+  </dgm:styleLbl>
+  <dgm:styleLbl name="parChTrans2D4">
+    <dgm:fillClrLst meth="repeat">
+      <a:schemeClr val="accent3"/>
+    </dgm:fillClrLst>
+    <dgm:linClrLst meth="repeat">
+      <a:schemeClr val="accent3"/>
+    </dgm:linClrLst>
+    <dgm:effectClrLst/>
+    <dgm:txLinClrLst/>
+    <dgm:txFillClrLst meth="repeat">
+      <a:schemeClr val="lt1"/>
+    </dgm:txFillClrLst>
+    <dgm:txEffectClrLst/>
+  </dgm:styleLbl>
+  <dgm:styleLbl name="parChTrans1D1">
+    <dgm:fillClrLst meth="repeat">
+      <a:schemeClr val="accent3"/>
+    </dgm:fillClrLst>
+    <dgm:linClrLst meth="repeat">
+      <a:schemeClr val="accent3">
+        <a:shade val="60000"/>
+      </a:schemeClr>
+    </dgm:linClrLst>
+    <dgm:effectClrLst/>
+    <dgm:txLinClrLst/>
+    <dgm:txFillClrLst meth="repeat">
+      <a:schemeClr val="tx1"/>
+    </dgm:txFillClrLst>
+    <dgm:txEffectClrLst/>
+  </dgm:styleLbl>
+  <dgm:styleLbl name="parChTrans1D2">
+    <dgm:fillClrLst meth="repeat">
+      <a:schemeClr val="accent3"/>
+    </dgm:fillClrLst>
+    <dgm:linClrLst meth="repeat">
+      <a:schemeClr val="accent3">
+        <a:shade val="60000"/>
+      </a:schemeClr>
+    </dgm:linClrLst>
+    <dgm:effectClrLst/>
+    <dgm:txLinClrLst/>
+    <dgm:txFillClrLst meth="repeat">
+      <a:schemeClr val="tx1"/>
+    </dgm:txFillClrLst>
+    <dgm:txEffectClrLst/>
+  </dgm:styleLbl>
+  <dgm:styleLbl name="parChTrans1D3">
+    <dgm:fillClrLst meth="repeat">
+      <a:schemeClr val="accent3"/>
+    </dgm:fillClrLst>
+    <dgm:linClrLst meth="repeat">
+      <a:schemeClr val="accent3">
+        <a:shade val="80000"/>
+      </a:schemeClr>
+    </dgm:linClrLst>
+    <dgm:effectClrLst/>
+    <dgm:txLinClrLst/>
+    <dgm:txFillClrLst meth="repeat">
+      <a:schemeClr val="tx1"/>
+    </dgm:txFillClrLst>
+    <dgm:txEffectClrLst/>
+  </dgm:styleLbl>
+  <dgm:styleLbl name="parChTrans1D4">
+    <dgm:fillClrLst meth="repeat">
+      <a:schemeClr val="accent3"/>
+    </dgm:fillClrLst>
+    <dgm:linClrLst meth="repeat">
+      <a:schemeClr val="accent3">
+        <a:shade val="80000"/>
+      </a:schemeClr>
+    </dgm:linClrLst>
+    <dgm:effectClrLst/>
+    <dgm:txLinClrLst/>
+    <dgm:txFillClrLst meth="repeat">
+      <a:schemeClr val="tx1"/>
+    </dgm:txFillClrLst>
+    <dgm:txEffectClrLst/>
+  </dgm:styleLbl>
+  <dgm:styleLbl name="fgAcc1">
+    <dgm:fillClrLst meth="repeat">
+      <a:schemeClr val="lt1">
+        <a:alpha val="90000"/>
+      </a:schemeClr>
+    </dgm:fillClrLst>
+    <dgm:linClrLst meth="repeat">
+      <a:schemeClr val="accent3"/>
+    </dgm:linClrLst>
+    <dgm:effectClrLst/>
+    <dgm:txLinClrLst/>
+    <dgm:txFillClrLst meth="repeat">
+      <a:schemeClr val="dk1"/>
+    </dgm:txFillClrLst>
+    <dgm:txEffectClrLst/>
+  </dgm:styleLbl>
+  <dgm:styleLbl name="conFgAcc1">
+    <dgm:fillClrLst meth="repeat">
+      <a:schemeClr val="lt1">
+        <a:alpha val="90000"/>
+      </a:schemeClr>
+    </dgm:fillClrLst>
+    <dgm:linClrLst meth="repeat">
+      <a:schemeClr val="accent3"/>
+    </dgm:linClrLst>
+    <dgm:effectClrLst/>
+    <dgm:txLinClrLst/>
+    <dgm:txFillClrLst meth="repeat">
+      <a:schemeClr val="dk1"/>
+    </dgm:txFillClrLst>
+    <dgm:txEffectClrLst/>
+  </dgm:styleLbl>
+  <dgm:styleLbl name="alignAcc1">
+    <dgm:fillClrLst meth="repeat">
+      <a:schemeClr val="lt1">
+        <a:alpha val="90000"/>
+      </a:schemeClr>
+    </dgm:fillClrLst>
+    <dgm:linClrLst meth="repeat">
+      <a:schemeClr val="accent3"/>
+    </dgm:linClrLst>
+    <dgm:effectClrLst/>
+    <dgm:txLinClrLst/>
+    <dgm:txFillClrLst meth="repeat">
+      <a:schemeClr val="dk1"/>
+    </dgm:txFillClrLst>
+    <dgm:txEffectClrLst/>
+  </dgm:styleLbl>
+  <dgm:styleLbl name="trAlignAcc1">
+    <dgm:fillClrLst meth="repeat">
+      <a:schemeClr val="lt1">
+        <a:alpha val="40000"/>
+      </a:schemeClr>
+    </dgm:fillClrLst>
+    <dgm:linClrLst meth="repeat">
+      <a:schemeClr val="accent3"/>
+    </dgm:linClrLst>
+    <dgm:effectClrLst/>
+    <dgm:txLinClrLst/>
+    <dgm:txFillClrLst meth="repeat">
+      <a:schemeClr val="dk1"/>
+    </dgm:txFillClrLst>
+    <dgm:txEffectClrLst/>
+  </dgm:styleLbl>
+  <dgm:styleLbl name="bgAcc1">
+    <dgm:fillClrLst meth="repeat">
+      <a:schemeClr val="lt1">
+        <a:alpha val="90000"/>
+      </a:schemeClr>
+    </dgm:fillClrLst>
+    <dgm:linClrLst meth="repeat">
+      <a:schemeClr val="accent3"/>
+    </dgm:linClrLst>
+    <dgm:effectClrLst/>
+    <dgm:txLinClrLst/>
+    <dgm:txFillClrLst meth="repeat">
+      <a:schemeClr val="dk1"/>
+    </dgm:txFillClrLst>
+    <dgm:txEffectClrLst/>
+  </dgm:styleLbl>
+  <dgm:styleLbl name="solidFgAcc1">
+    <dgm:fillClrLst meth="repeat">
+      <a:schemeClr val="lt1"/>
+    </dgm:fillClrLst>
+    <dgm:linClrLst meth="repeat">
+      <a:schemeClr val="accent3"/>
+    </dgm:linClrLst>
+    <dgm:effectClrLst/>
+    <dgm:txLinClrLst/>
+    <dgm:txFillClrLst meth="repeat">
+      <a:schemeClr val="dk1"/>
+    </dgm:txFillClrLst>
+    <dgm:txEffectClrLst/>
+  </dgm:styleLbl>
+  <dgm:styleLbl name="solidAlignAcc1">
+    <dgm:fillClrLst meth="repeat">
+      <a:schemeClr val="lt1"/>
+    </dgm:fillClrLst>
+    <dgm:linClrLst meth="repeat">
+      <a:schemeClr val="accent3"/>
+    </dgm:linClrLst>
+    <dgm:effectClrLst/>
+    <dgm:txLinClrLst/>
+    <dgm:txFillClrLst meth="repeat">
+      <a:schemeClr val="dk1"/>
+    </dgm:txFillClrLst>
+    <dgm:txEffectClrLst/>
+  </dgm:styleLbl>
+  <dgm:styleLbl name="solidBgAcc1">
+    <dgm:fillClrLst meth="repeat">
+      <a:schemeClr val="lt1"/>
+    </dgm:fillClrLst>
+    <dgm:linClrLst meth="repeat">
+      <a:schemeClr val="accent3"/>
+    </dgm:linClrLst>
+    <dgm:effectClrLst/>
+    <dgm:txLinClrLst/>
+    <dgm:txFillClrLst meth="repeat">
+      <a:schemeClr val="dk1"/>
+    </dgm:txFillClrLst>
+    <dgm:txEffectClrLst/>
+  </dgm:styleLbl>
+  <dgm:styleLbl name="fgAccFollowNode1">
+    <dgm:fillClrLst meth="repeat">
+      <a:schemeClr val="accent3">
+        <a:alpha val="90000"/>
+        <a:tint val="40000"/>
+      </a:schemeClr>
+    </dgm:fillClrLst>
+    <dgm:linClrLst meth="repeat">
+      <a:schemeClr val="accent3">
+        <a:alpha val="90000"/>
+        <a:tint val="40000"/>
+      </a:schemeClr>
+    </dgm:linClrLst>
+    <dgm:effectClrLst/>
+    <dgm:txLinClrLst/>
+    <dgm:txFillClrLst meth="repeat">
+      <a:schemeClr val="dk1"/>
+    </dgm:txFillClrLst>
+    <dgm:txEffectClrLst/>
+  </dgm:styleLbl>
+  <dgm:styleLbl name="alignAccFollowNode1">
+    <dgm:fillClrLst meth="repeat">
+      <a:schemeClr val="accent3">
+        <a:alpha val="90000"/>
+        <a:tint val="40000"/>
+      </a:schemeClr>
+    </dgm:fillClrLst>
+    <dgm:linClrLst meth="repeat">
+      <a:schemeClr val="accent3">
+        <a:alpha val="90000"/>
+        <a:tint val="40000"/>
+      </a:schemeClr>
+    </dgm:linClrLst>
+    <dgm:effectClrLst/>
+    <dgm:txLinClrLst/>
+    <dgm:txFillClrLst meth="repeat">
+      <a:schemeClr val="dk1"/>
+    </dgm:txFillClrLst>
+    <dgm:txEffectClrLst/>
+  </dgm:styleLbl>
+  <dgm:styleLbl name="bgAccFollowNode1">
+    <dgm:fillClrLst meth="repeat">
+      <a:schemeClr val="accent3">
+        <a:alpha val="90000"/>
+        <a:tint val="40000"/>
+      </a:schemeClr>
+    </dgm:fillClrLst>
+    <dgm:linClrLst meth="repeat">
+      <a:schemeClr val="accent3">
+        <a:alpha val="90000"/>
+        <a:tint val="40000"/>
+      </a:schemeClr>
+    </dgm:linClrLst>
+    <dgm:effectClrLst/>
+    <dgm:txLinClrLst/>
+    <dgm:txFillClrLst meth="repeat">
+      <a:schemeClr val="dk1"/>
+    </dgm:txFillClrLst>
+    <dgm:txEffectClrLst/>
+  </dgm:styleLbl>
+  <dgm:styleLbl name="fgAcc0">
+    <dgm:fillClrLst meth="repeat">
+      <a:schemeClr val="lt1">
+        <a:alpha val="90000"/>
+      </a:schemeClr>
+    </dgm:fillClrLst>
+    <dgm:linClrLst meth="repeat">
+      <a:schemeClr val="accent3"/>
+    </dgm:linClrLst>
+    <dgm:effectClrLst/>
+    <dgm:txLinClrLst/>
+    <dgm:txFillClrLst meth="repeat">
+      <a:schemeClr val="dk1"/>
+    </dgm:txFillClrLst>
+    <dgm:txEffectClrLst/>
+  </dgm:styleLbl>
+  <dgm:styleLbl name="fgAcc2">
+    <dgm:fillClrLst meth="repeat">
+      <a:schemeClr val="lt1">
+        <a:alpha val="90000"/>
+      </a:schemeClr>
+    </dgm:fillClrLst>
+    <dgm:linClrLst meth="repeat">
+      <a:schemeClr val="accent3"/>
+    </dgm:linClrLst>
+    <dgm:effectClrLst/>
+    <dgm:txLinClrLst/>
+    <dgm:txFillClrLst meth="repeat">
+      <a:schemeClr val="dk1"/>
+    </dgm:txFillClrLst>
+    <dgm:txEffectClrLst/>
+  </dgm:styleLbl>
+  <dgm:styleLbl name="fgAcc3">
+    <dgm:fillClrLst meth="repeat">
+      <a:schemeClr val="lt1">
+        <a:alpha val="90000"/>
+      </a:schemeClr>
+    </dgm:fillClrLst>
+    <dgm:linClrLst meth="repeat">
+      <a:schemeClr val="accent3"/>
+    </dgm:linClrLst>
+    <dgm:effectClrLst/>
+    <dgm:txLinClrLst/>
+    <dgm:txFillClrLst meth="repeat">
+      <a:schemeClr val="dk1"/>
+    </dgm:txFillClrLst>
+    <dgm:txEffectClrLst/>
+  </dgm:styleLbl>
+  <dgm:styleLbl name="fgAcc4">
+    <dgm:fillClrLst meth="repeat">
+      <a:schemeClr val="lt1">
+        <a:alpha val="90000"/>
+      </a:schemeClr>
+    </dgm:fillClrLst>
+    <dgm:linClrLst meth="repeat">
+      <a:schemeClr val="accent3"/>
+    </dgm:linClrLst>
+    <dgm:effectClrLst/>
+    <dgm:txLinClrLst/>
+    <dgm:txFillClrLst meth="repeat">
+      <a:schemeClr val="dk1"/>
+    </dgm:txFillClrLst>
+    <dgm:txEffectClrLst/>
+  </dgm:styleLbl>
+  <dgm:styleLbl name="bgShp">
+    <dgm:fillClrLst meth="repeat">
+      <a:schemeClr val="accent3">
+        <a:tint val="40000"/>
+      </a:schemeClr>
+    </dgm:fillClrLst>
+    <dgm:linClrLst meth="repeat">
+      <a:schemeClr val="accent3"/>
+    </dgm:linClrLst>
+    <dgm:effectClrLst/>
+    <dgm:txLinClrLst/>
+    <dgm:txFillClrLst meth="repeat">
+      <a:schemeClr val="dk1"/>
+    </dgm:txFillClrLst>
+    <dgm:txEffectClrLst/>
+  </dgm:styleLbl>
+  <dgm:styleLbl name="dkBgShp">
+    <dgm:fillClrLst meth="repeat">
+      <a:schemeClr val="accent3">
+        <a:shade val="80000"/>
+      </a:schemeClr>
+    </dgm:fillClrLst>
+    <dgm:linClrLst meth="repeat">
+      <a:schemeClr val="accent3"/>
+    </dgm:linClrLst>
+    <dgm:effectClrLst/>
+    <dgm:txLinClrLst/>
+    <dgm:txFillClrLst meth="repeat">
+      <a:schemeClr val="lt1"/>
+    </dgm:txFillClrLst>
+    <dgm:txEffectClrLst/>
+  </dgm:styleLbl>
+  <dgm:styleLbl name="trBgShp">
+    <dgm:fillClrLst meth="repeat">
+      <a:schemeClr val="accent3">
+        <a:tint val="50000"/>
+        <a:alpha val="40000"/>
+      </a:schemeClr>
+    </dgm:fillClrLst>
+    <dgm:linClrLst meth="repeat">
+      <a:schemeClr val="accent3"/>
+    </dgm:linClrLst>
+    <dgm:effectClrLst/>
+    <dgm:txLinClrLst/>
+    <dgm:txFillClrLst meth="repeat">
+      <a:schemeClr val="lt1"/>
+    </dgm:txFillClrLst>
+    <dgm:txEffectClrLst/>
+  </dgm:styleLbl>
+  <dgm:styleLbl name="fgShp">
+    <dgm:fillClrLst meth="repeat">
+      <a:schemeClr val="accent3">
+        <a:tint val="60000"/>
+      </a:schemeClr>
+    </dgm:fillClrLst>
+    <dgm:linClrLst meth="repeat">
+      <a:schemeClr val="lt1"/>
+    </dgm:linClrLst>
+    <dgm:effectClrLst/>
+    <dgm:txLinClrLst/>
+    <dgm:txFillClrLst meth="repeat">
+      <a:schemeClr val="dk1"/>
+    </dgm:txFillClrLst>
+    <dgm:txEffectClrLst/>
+  </dgm:styleLbl>
+  <dgm:styleLbl name="revTx">
+    <dgm:fillClrLst meth="repeat">
+      <a:schemeClr val="lt1">
+        <a:alpha val="0"/>
+      </a:schemeClr>
+    </dgm:fillClrLst>
+    <dgm:linClrLst meth="repeat">
+      <a:schemeClr val="dk1">
+        <a:alpha val="0"/>
+      </a:schemeClr>
+    </dgm:linClrLst>
+    <dgm:effectClrLst/>
+    <dgm:txLinClrLst/>
+    <dgm:txFillClrLst meth="repeat">
+      <a:schemeClr val="tx1"/>
+    </dgm:txFillClrLst>
+    <dgm:txEffectClrLst/>
+  </dgm:styleLbl>
+</dgm:colorsDef>
+</file>
+
 <file path=ppt/diagrams/data1.xml><?xml version="1.0" encoding="utf-8"?>
 <dgm:dataModel xmlns:dgm="http://schemas.openxmlformats.org/drawingml/2006/diagram" xmlns:a="http://schemas.openxmlformats.org/drawingml/2006/main">
   <dgm:ptLst>
@@ -6301,8 +7048,8 @@
         <a:lstStyle/>
         <a:p>
           <a:r>
-            <a:rPr lang="en-US"/>
-            <a:t>House of Orange House of Roman, House of Husk…</a:t>
+            <a:rPr lang="en-US" dirty="0"/>
+            <a:t>House of Orange, House of Roman, House of Husk…</a:t>
           </a:r>
         </a:p>
       </dgm:t>
@@ -9316,6 +10063,241 @@
 </dgm:dataModel>
 </file>
 
+<file path=ppt/diagrams/data9.xml><?xml version="1.0" encoding="utf-8"?>
+<dgm:dataModel xmlns:dgm="http://schemas.openxmlformats.org/drawingml/2006/diagram" xmlns:a="http://schemas.openxmlformats.org/drawingml/2006/main">
+  <dgm:ptLst>
+    <dgm:pt modelId="{53CF3088-B157-432E-8A97-14C7A8FB26D9}" type="doc">
+      <dgm:prSet loTypeId="urn:microsoft.com/office/officeart/2005/8/layout/vList2" loCatId="list" qsTypeId="urn:microsoft.com/office/officeart/2005/8/quickstyle/simple1" qsCatId="simple" csTypeId="urn:microsoft.com/office/officeart/2005/8/colors/accent3_2" csCatId="accent3"/>
+      <dgm:spPr/>
+      <dgm:t>
+        <a:bodyPr/>
+        <a:lstStyle/>
+        <a:p>
+          <a:endParaRPr lang="en-US"/>
+        </a:p>
+      </dgm:t>
+    </dgm:pt>
+    <dgm:pt modelId="{CA0523EC-41D4-4064-B64A-55CD897C3D01}">
+      <dgm:prSet/>
+      <dgm:spPr/>
+      <dgm:t>
+        <a:bodyPr/>
+        <a:lstStyle/>
+        <a:p>
+          <a:r>
+            <a:rPr lang="en-US"/>
+            <a:t>Allows to write to </a:t>
+          </a:r>
+          <a:r>
+            <a:rPr lang="en-US" b="1"/>
+            <a:t>ANYWHERE</a:t>
+          </a:r>
+          <a:r>
+            <a:rPr lang="en-US"/>
+            <a:t> in memory </a:t>
+          </a:r>
+        </a:p>
+      </dgm:t>
+    </dgm:pt>
+    <dgm:pt modelId="{1A3F1B0B-46C0-4989-9640-6958C4822919}" type="parTrans" cxnId="{8925BE4C-8B90-49C9-B09F-1892CA52E0D1}">
+      <dgm:prSet/>
+      <dgm:spPr/>
+      <dgm:t>
+        <a:bodyPr/>
+        <a:lstStyle/>
+        <a:p>
+          <a:endParaRPr lang="en-US"/>
+        </a:p>
+      </dgm:t>
+    </dgm:pt>
+    <dgm:pt modelId="{14099047-3282-4D86-BF17-6D48EE5282A2}" type="sibTrans" cxnId="{8925BE4C-8B90-49C9-B09F-1892CA52E0D1}">
+      <dgm:prSet/>
+      <dgm:spPr/>
+      <dgm:t>
+        <a:bodyPr/>
+        <a:lstStyle/>
+        <a:p>
+          <a:endParaRPr lang="en-US"/>
+        </a:p>
+      </dgm:t>
+    </dgm:pt>
+    <dgm:pt modelId="{4CA25AA6-CDDE-4D16-B4D3-595DAE473354}">
+      <dgm:prSet/>
+      <dgm:spPr/>
+      <dgm:t>
+        <a:bodyPr/>
+        <a:lstStyle/>
+        <a:p>
+          <a:r>
+            <a:rPr lang="en-US"/>
+            <a:t>Cannot control the WHAT, only the WHERE</a:t>
+          </a:r>
+        </a:p>
+      </dgm:t>
+    </dgm:pt>
+    <dgm:pt modelId="{286E100B-B507-4AF0-AE1F-AA6910833323}" type="parTrans" cxnId="{CA034813-EB6E-40B3-8D69-DE787DCD3E99}">
+      <dgm:prSet/>
+      <dgm:spPr/>
+      <dgm:t>
+        <a:bodyPr/>
+        <a:lstStyle/>
+        <a:p>
+          <a:endParaRPr lang="en-US"/>
+        </a:p>
+      </dgm:t>
+    </dgm:pt>
+    <dgm:pt modelId="{CDCB9FFE-647C-4D81-9239-3BD3215AE7F8}" type="sibTrans" cxnId="{CA034813-EB6E-40B3-8D69-DE787DCD3E99}">
+      <dgm:prSet/>
+      <dgm:spPr/>
+      <dgm:t>
+        <a:bodyPr/>
+        <a:lstStyle/>
+        <a:p>
+          <a:endParaRPr lang="en-US"/>
+        </a:p>
+      </dgm:t>
+    </dgm:pt>
+    <dgm:pt modelId="{8D6FE2BE-CC30-4E58-9E01-E6EA95FC5FB5}">
+      <dgm:prSet/>
+      <dgm:spPr/>
+      <dgm:t>
+        <a:bodyPr/>
+        <a:lstStyle/>
+        <a:p>
+          <a:r>
+            <a:rPr lang="en-US"/>
+            <a:t>Major part of many other techniques:</a:t>
+          </a:r>
+        </a:p>
+      </dgm:t>
+    </dgm:pt>
+    <dgm:pt modelId="{15ED05D5-D511-4A3E-9651-78A537DECCCA}" type="parTrans" cxnId="{D2C46555-06BE-47FC-804C-C74AB2A2DEED}">
+      <dgm:prSet/>
+      <dgm:spPr/>
+      <dgm:t>
+        <a:bodyPr/>
+        <a:lstStyle/>
+        <a:p>
+          <a:endParaRPr lang="en-US"/>
+        </a:p>
+      </dgm:t>
+    </dgm:pt>
+    <dgm:pt modelId="{14210890-BEAD-4A63-AADB-223146CDC4A4}" type="sibTrans" cxnId="{D2C46555-06BE-47FC-804C-C74AB2A2DEED}">
+      <dgm:prSet/>
+      <dgm:spPr/>
+      <dgm:t>
+        <a:bodyPr/>
+        <a:lstStyle/>
+        <a:p>
+          <a:endParaRPr lang="en-US"/>
+        </a:p>
+      </dgm:t>
+    </dgm:pt>
+    <dgm:pt modelId="{9CFBFBF7-F3FC-4873-95A1-78B44129EE77}">
+      <dgm:prSet/>
+      <dgm:spPr/>
+      <dgm:t>
+        <a:bodyPr/>
+        <a:lstStyle/>
+        <a:p>
+          <a:r>
+            <a:rPr lang="en-US"/>
+            <a:t>House of Orange House of Roman, House of Husk…</a:t>
+          </a:r>
+        </a:p>
+      </dgm:t>
+    </dgm:pt>
+    <dgm:pt modelId="{284D5065-F94B-47A3-99EF-A3AB65822898}" type="parTrans" cxnId="{68EB68CF-F53D-48D9-935D-259D7D278CD0}">
+      <dgm:prSet/>
+      <dgm:spPr/>
+      <dgm:t>
+        <a:bodyPr/>
+        <a:lstStyle/>
+        <a:p>
+          <a:endParaRPr lang="en-US"/>
+        </a:p>
+      </dgm:t>
+    </dgm:pt>
+    <dgm:pt modelId="{53A71B27-65DD-497D-AD38-BCC17299A97E}" type="sibTrans" cxnId="{68EB68CF-F53D-48D9-935D-259D7D278CD0}">
+      <dgm:prSet/>
+      <dgm:spPr/>
+      <dgm:t>
+        <a:bodyPr/>
+        <a:lstStyle/>
+        <a:p>
+          <a:endParaRPr lang="en-US"/>
+        </a:p>
+      </dgm:t>
+    </dgm:pt>
+    <dgm:pt modelId="{9893AFC2-A958-8940-B35C-4D50DCBA226D}" type="pres">
+      <dgm:prSet presAssocID="{53CF3088-B157-432E-8A97-14C7A8FB26D9}" presName="linear" presStyleCnt="0">
+        <dgm:presLayoutVars>
+          <dgm:animLvl val="lvl"/>
+          <dgm:resizeHandles val="exact"/>
+        </dgm:presLayoutVars>
+      </dgm:prSet>
+      <dgm:spPr/>
+    </dgm:pt>
+    <dgm:pt modelId="{71DD3614-B292-7243-AD20-5E5D4EA4A618}" type="pres">
+      <dgm:prSet presAssocID="{CA0523EC-41D4-4064-B64A-55CD897C3D01}" presName="parentText" presStyleLbl="node1" presStyleIdx="0" presStyleCnt="2">
+        <dgm:presLayoutVars>
+          <dgm:chMax val="0"/>
+          <dgm:bulletEnabled val="1"/>
+        </dgm:presLayoutVars>
+      </dgm:prSet>
+      <dgm:spPr/>
+    </dgm:pt>
+    <dgm:pt modelId="{9871E600-10AC-CD4B-B3BC-47A797BCD17E}" type="pres">
+      <dgm:prSet presAssocID="{CA0523EC-41D4-4064-B64A-55CD897C3D01}" presName="childText" presStyleLbl="revTx" presStyleIdx="0" presStyleCnt="2">
+        <dgm:presLayoutVars>
+          <dgm:bulletEnabled val="1"/>
+        </dgm:presLayoutVars>
+      </dgm:prSet>
+      <dgm:spPr/>
+    </dgm:pt>
+    <dgm:pt modelId="{527F6B98-C162-4645-A510-013285B7B842}" type="pres">
+      <dgm:prSet presAssocID="{8D6FE2BE-CC30-4E58-9E01-E6EA95FC5FB5}" presName="parentText" presStyleLbl="node1" presStyleIdx="1" presStyleCnt="2">
+        <dgm:presLayoutVars>
+          <dgm:chMax val="0"/>
+          <dgm:bulletEnabled val="1"/>
+        </dgm:presLayoutVars>
+      </dgm:prSet>
+      <dgm:spPr/>
+    </dgm:pt>
+    <dgm:pt modelId="{353AA5DF-0AB7-154B-8DC3-01304A65E957}" type="pres">
+      <dgm:prSet presAssocID="{8D6FE2BE-CC30-4E58-9E01-E6EA95FC5FB5}" presName="childText" presStyleLbl="revTx" presStyleIdx="1" presStyleCnt="2">
+        <dgm:presLayoutVars>
+          <dgm:bulletEnabled val="1"/>
+        </dgm:presLayoutVars>
+      </dgm:prSet>
+      <dgm:spPr/>
+    </dgm:pt>
+  </dgm:ptLst>
+  <dgm:cxnLst>
+    <dgm:cxn modelId="{40D4D70C-0A6F-6143-9D20-43F6B890A333}" type="presOf" srcId="{8D6FE2BE-CC30-4E58-9E01-E6EA95FC5FB5}" destId="{527F6B98-C162-4645-A510-013285B7B842}" srcOrd="0" destOrd="0" presId="urn:microsoft.com/office/officeart/2005/8/layout/vList2"/>
+    <dgm:cxn modelId="{CA034813-EB6E-40B3-8D69-DE787DCD3E99}" srcId="{CA0523EC-41D4-4064-B64A-55CD897C3D01}" destId="{4CA25AA6-CDDE-4D16-B4D3-595DAE473354}" srcOrd="0" destOrd="0" parTransId="{286E100B-B507-4AF0-AE1F-AA6910833323}" sibTransId="{CDCB9FFE-647C-4D81-9239-3BD3215AE7F8}"/>
+    <dgm:cxn modelId="{4171551F-EF29-1546-8775-E806309E5683}" type="presOf" srcId="{4CA25AA6-CDDE-4D16-B4D3-595DAE473354}" destId="{9871E600-10AC-CD4B-B3BC-47A797BCD17E}" srcOrd="0" destOrd="0" presId="urn:microsoft.com/office/officeart/2005/8/layout/vList2"/>
+    <dgm:cxn modelId="{A4B3902E-5035-8D40-B27C-A6A402941BE7}" type="presOf" srcId="{53CF3088-B157-432E-8A97-14C7A8FB26D9}" destId="{9893AFC2-A958-8940-B35C-4D50DCBA226D}" srcOrd="0" destOrd="0" presId="urn:microsoft.com/office/officeart/2005/8/layout/vList2"/>
+    <dgm:cxn modelId="{8925BE4C-8B90-49C9-B09F-1892CA52E0D1}" srcId="{53CF3088-B157-432E-8A97-14C7A8FB26D9}" destId="{CA0523EC-41D4-4064-B64A-55CD897C3D01}" srcOrd="0" destOrd="0" parTransId="{1A3F1B0B-46C0-4989-9640-6958C4822919}" sibTransId="{14099047-3282-4D86-BF17-6D48EE5282A2}"/>
+    <dgm:cxn modelId="{D2C46555-06BE-47FC-804C-C74AB2A2DEED}" srcId="{53CF3088-B157-432E-8A97-14C7A8FB26D9}" destId="{8D6FE2BE-CC30-4E58-9E01-E6EA95FC5FB5}" srcOrd="1" destOrd="0" parTransId="{15ED05D5-D511-4A3E-9651-78A537DECCCA}" sibTransId="{14210890-BEAD-4A63-AADB-223146CDC4A4}"/>
+    <dgm:cxn modelId="{A631B187-18E2-A349-8885-32F3E6754441}" type="presOf" srcId="{CA0523EC-41D4-4064-B64A-55CD897C3D01}" destId="{71DD3614-B292-7243-AD20-5E5D4EA4A618}" srcOrd="0" destOrd="0" presId="urn:microsoft.com/office/officeart/2005/8/layout/vList2"/>
+    <dgm:cxn modelId="{68EB68CF-F53D-48D9-935D-259D7D278CD0}" srcId="{8D6FE2BE-CC30-4E58-9E01-E6EA95FC5FB5}" destId="{9CFBFBF7-F3FC-4873-95A1-78B44129EE77}" srcOrd="0" destOrd="0" parTransId="{284D5065-F94B-47A3-99EF-A3AB65822898}" sibTransId="{53A71B27-65DD-497D-AD38-BCC17299A97E}"/>
+    <dgm:cxn modelId="{73AF02E2-4053-3745-B2BD-CCCB6D7E4507}" type="presOf" srcId="{9CFBFBF7-F3FC-4873-95A1-78B44129EE77}" destId="{353AA5DF-0AB7-154B-8DC3-01304A65E957}" srcOrd="0" destOrd="0" presId="urn:microsoft.com/office/officeart/2005/8/layout/vList2"/>
+    <dgm:cxn modelId="{02A30AA5-4C6B-B242-B3FF-88E8AC9EDA51}" type="presParOf" srcId="{9893AFC2-A958-8940-B35C-4D50DCBA226D}" destId="{71DD3614-B292-7243-AD20-5E5D4EA4A618}" srcOrd="0" destOrd="0" presId="urn:microsoft.com/office/officeart/2005/8/layout/vList2"/>
+    <dgm:cxn modelId="{39A9C519-550F-7F44-B082-18A0E9E0EF7D}" type="presParOf" srcId="{9893AFC2-A958-8940-B35C-4D50DCBA226D}" destId="{9871E600-10AC-CD4B-B3BC-47A797BCD17E}" srcOrd="1" destOrd="0" presId="urn:microsoft.com/office/officeart/2005/8/layout/vList2"/>
+    <dgm:cxn modelId="{B6FE0C52-C797-5047-BA8F-4E8788AF15AA}" type="presParOf" srcId="{9893AFC2-A958-8940-B35C-4D50DCBA226D}" destId="{527F6B98-C162-4645-A510-013285B7B842}" srcOrd="2" destOrd="0" presId="urn:microsoft.com/office/officeart/2005/8/layout/vList2"/>
+    <dgm:cxn modelId="{50159DA4-EC31-2A40-BF6D-FBAEC98C6781}" type="presParOf" srcId="{9893AFC2-A958-8940-B35C-4D50DCBA226D}" destId="{353AA5DF-0AB7-154B-8DC3-01304A65E957}" srcOrd="3" destOrd="0" presId="urn:microsoft.com/office/officeart/2005/8/layout/vList2"/>
+  </dgm:cxnLst>
+  <dgm:bg/>
+  <dgm:whole/>
+  <dgm:extLst>
+    <a:ext uri="http://schemas.microsoft.com/office/drawing/2008/diagram">
+      <dsp:dataModelExt xmlns:dsp="http://schemas.microsoft.com/office/drawing/2008/diagram" relId="rId6" minVer="http://schemas.openxmlformats.org/drawingml/2006/diagram"/>
+    </a:ext>
+  </dgm:extLst>
+</dgm:dataModel>
+</file>
+
 <file path=ppt/diagrams/drawing1.xml><?xml version="1.0" encoding="utf-8"?>
 <dsp:drawing xmlns:dgm="http://schemas.openxmlformats.org/drawingml/2006/diagram" xmlns:dsp="http://schemas.microsoft.com/office/drawing/2008/diagram" xmlns:a="http://schemas.openxmlformats.org/drawingml/2006/main">
   <dsp:spTree>
@@ -9664,8 +10646,8 @@
             <a:buNone/>
           </a:pPr>
           <a:r>
-            <a:rPr lang="en-US" sz="1400" kern="1200"/>
-            <a:t>House of Orange House of Roman, House of Husk…</a:t>
+            <a:rPr lang="en-US" sz="1400" kern="1200" dirty="0"/>
+            <a:t>House of Orange, House of Roman, House of Husk…</a:t>
           </a:r>
         </a:p>
       </dsp:txBody>
@@ -12968,6 +13950,302 @@
 </dsp:drawing>
 </file>
 
+<file path=ppt/diagrams/drawing9.xml><?xml version="1.0" encoding="utf-8"?>
+<dsp:drawing xmlns:dgm="http://schemas.openxmlformats.org/drawingml/2006/diagram" xmlns:dsp="http://schemas.microsoft.com/office/drawing/2008/diagram" xmlns:a="http://schemas.openxmlformats.org/drawingml/2006/main">
+  <dsp:spTree>
+    <dsp:nvGrpSpPr>
+      <dsp:cNvPr id="0" name=""/>
+      <dsp:cNvGrpSpPr/>
+    </dsp:nvGrpSpPr>
+    <dsp:grpSpPr/>
+    <dsp:sp modelId="{71DD3614-B292-7243-AD20-5E5D4EA4A618}">
+      <dsp:nvSpPr>
+        <dsp:cNvPr id="0" name=""/>
+        <dsp:cNvSpPr/>
+      </dsp:nvSpPr>
+      <dsp:spPr>
+        <a:xfrm>
+          <a:off x="0" y="18249"/>
+          <a:ext cx="4629150" cy="1113840"/>
+        </a:xfrm>
+        <a:prstGeom prst="roundRect">
+          <a:avLst/>
+        </a:prstGeom>
+        <a:solidFill>
+          <a:schemeClr val="accent3">
+            <a:hueOff val="0"/>
+            <a:satOff val="0"/>
+            <a:lumOff val="0"/>
+            <a:alphaOff val="0"/>
+          </a:schemeClr>
+        </a:solidFill>
+        <a:ln w="12700" cap="flat" cmpd="sng" algn="ctr">
+          <a:solidFill>
+            <a:schemeClr val="lt1">
+              <a:hueOff val="0"/>
+              <a:satOff val="0"/>
+              <a:lumOff val="0"/>
+              <a:alphaOff val="0"/>
+            </a:schemeClr>
+          </a:solidFill>
+          <a:prstDash val="solid"/>
+          <a:miter lim="800000"/>
+        </a:ln>
+        <a:effectLst/>
+      </dsp:spPr>
+      <dsp:style>
+        <a:lnRef idx="2">
+          <a:scrgbClr r="0" g="0" b="0"/>
+        </a:lnRef>
+        <a:fillRef idx="1">
+          <a:scrgbClr r="0" g="0" b="0"/>
+        </a:fillRef>
+        <a:effectRef idx="0">
+          <a:scrgbClr r="0" g="0" b="0"/>
+        </a:effectRef>
+        <a:fontRef idx="minor">
+          <a:schemeClr val="lt1"/>
+        </a:fontRef>
+      </dsp:style>
+      <dsp:txBody>
+        <a:bodyPr spcFirstLastPara="0" vert="horz" wrap="square" lIns="106680" tIns="106680" rIns="106680" bIns="106680" numCol="1" spcCol="1270" anchor="ctr" anchorCtr="0">
+          <a:noAutofit/>
+        </a:bodyPr>
+        <a:lstStyle/>
+        <a:p>
+          <a:pPr marL="0" lvl="0" indent="0" algn="l" defTabSz="1244600">
+            <a:lnSpc>
+              <a:spcPct val="90000"/>
+            </a:lnSpc>
+            <a:spcBef>
+              <a:spcPct val="0"/>
+            </a:spcBef>
+            <a:spcAft>
+              <a:spcPct val="35000"/>
+            </a:spcAft>
+            <a:buNone/>
+          </a:pPr>
+          <a:r>
+            <a:rPr lang="en-US" sz="2800" kern="1200"/>
+            <a:t>Allows to write to </a:t>
+          </a:r>
+          <a:r>
+            <a:rPr lang="en-US" sz="2800" b="1" kern="1200"/>
+            <a:t>ANYWHERE</a:t>
+          </a:r>
+          <a:r>
+            <a:rPr lang="en-US" sz="2800" kern="1200"/>
+            <a:t> in memory </a:t>
+          </a:r>
+        </a:p>
+      </dsp:txBody>
+      <dsp:txXfrm>
+        <a:off x="54373" y="72622"/>
+        <a:ext cx="4520404" cy="1005094"/>
+      </dsp:txXfrm>
+    </dsp:sp>
+    <dsp:sp modelId="{9871E600-10AC-CD4B-B3BC-47A797BCD17E}">
+      <dsp:nvSpPr>
+        <dsp:cNvPr id="0" name=""/>
+        <dsp:cNvSpPr/>
+      </dsp:nvSpPr>
+      <dsp:spPr>
+        <a:xfrm>
+          <a:off x="0" y="1132089"/>
+          <a:ext cx="4629150" cy="695520"/>
+        </a:xfrm>
+        <a:prstGeom prst="rect">
+          <a:avLst/>
+        </a:prstGeom>
+        <a:noFill/>
+        <a:ln>
+          <a:noFill/>
+        </a:ln>
+        <a:effectLst/>
+      </dsp:spPr>
+      <dsp:style>
+        <a:lnRef idx="0">
+          <a:scrgbClr r="0" g="0" b="0"/>
+        </a:lnRef>
+        <a:fillRef idx="0">
+          <a:scrgbClr r="0" g="0" b="0"/>
+        </a:fillRef>
+        <a:effectRef idx="0">
+          <a:scrgbClr r="0" g="0" b="0"/>
+        </a:effectRef>
+        <a:fontRef idx="minor"/>
+      </dsp:style>
+      <dsp:txBody>
+        <a:bodyPr spcFirstLastPara="0" vert="horz" wrap="square" lIns="146976" tIns="35560" rIns="199136" bIns="35560" numCol="1" spcCol="1270" anchor="t" anchorCtr="0">
+          <a:noAutofit/>
+        </a:bodyPr>
+        <a:lstStyle/>
+        <a:p>
+          <a:pPr marL="228600" lvl="1" indent="-228600" algn="l" defTabSz="977900">
+            <a:lnSpc>
+              <a:spcPct val="90000"/>
+            </a:lnSpc>
+            <a:spcBef>
+              <a:spcPct val="0"/>
+            </a:spcBef>
+            <a:spcAft>
+              <a:spcPct val="20000"/>
+            </a:spcAft>
+            <a:buChar char="•"/>
+          </a:pPr>
+          <a:r>
+            <a:rPr lang="en-US" sz="2200" kern="1200"/>
+            <a:t>Cannot control the WHAT, only the WHERE</a:t>
+          </a:r>
+        </a:p>
+      </dsp:txBody>
+      <dsp:txXfrm>
+        <a:off x="0" y="1132089"/>
+        <a:ext cx="4629150" cy="695520"/>
+      </dsp:txXfrm>
+    </dsp:sp>
+    <dsp:sp modelId="{527F6B98-C162-4645-A510-013285B7B842}">
+      <dsp:nvSpPr>
+        <dsp:cNvPr id="0" name=""/>
+        <dsp:cNvSpPr/>
+      </dsp:nvSpPr>
+      <dsp:spPr>
+        <a:xfrm>
+          <a:off x="0" y="1827609"/>
+          <a:ext cx="4629150" cy="1113840"/>
+        </a:xfrm>
+        <a:prstGeom prst="roundRect">
+          <a:avLst/>
+        </a:prstGeom>
+        <a:solidFill>
+          <a:schemeClr val="accent3">
+            <a:hueOff val="0"/>
+            <a:satOff val="0"/>
+            <a:lumOff val="0"/>
+            <a:alphaOff val="0"/>
+          </a:schemeClr>
+        </a:solidFill>
+        <a:ln w="12700" cap="flat" cmpd="sng" algn="ctr">
+          <a:solidFill>
+            <a:schemeClr val="lt1">
+              <a:hueOff val="0"/>
+              <a:satOff val="0"/>
+              <a:lumOff val="0"/>
+              <a:alphaOff val="0"/>
+            </a:schemeClr>
+          </a:solidFill>
+          <a:prstDash val="solid"/>
+          <a:miter lim="800000"/>
+        </a:ln>
+        <a:effectLst/>
+      </dsp:spPr>
+      <dsp:style>
+        <a:lnRef idx="2">
+          <a:scrgbClr r="0" g="0" b="0"/>
+        </a:lnRef>
+        <a:fillRef idx="1">
+          <a:scrgbClr r="0" g="0" b="0"/>
+        </a:fillRef>
+        <a:effectRef idx="0">
+          <a:scrgbClr r="0" g="0" b="0"/>
+        </a:effectRef>
+        <a:fontRef idx="minor">
+          <a:schemeClr val="lt1"/>
+        </a:fontRef>
+      </dsp:style>
+      <dsp:txBody>
+        <a:bodyPr spcFirstLastPara="0" vert="horz" wrap="square" lIns="106680" tIns="106680" rIns="106680" bIns="106680" numCol="1" spcCol="1270" anchor="ctr" anchorCtr="0">
+          <a:noAutofit/>
+        </a:bodyPr>
+        <a:lstStyle/>
+        <a:p>
+          <a:pPr marL="0" lvl="0" indent="0" algn="l" defTabSz="1244600">
+            <a:lnSpc>
+              <a:spcPct val="90000"/>
+            </a:lnSpc>
+            <a:spcBef>
+              <a:spcPct val="0"/>
+            </a:spcBef>
+            <a:spcAft>
+              <a:spcPct val="35000"/>
+            </a:spcAft>
+            <a:buNone/>
+          </a:pPr>
+          <a:r>
+            <a:rPr lang="en-US" sz="2800" kern="1200"/>
+            <a:t>Major part of many other techniques:</a:t>
+          </a:r>
+        </a:p>
+      </dsp:txBody>
+      <dsp:txXfrm>
+        <a:off x="54373" y="1881982"/>
+        <a:ext cx="4520404" cy="1005094"/>
+      </dsp:txXfrm>
+    </dsp:sp>
+    <dsp:sp modelId="{353AA5DF-0AB7-154B-8DC3-01304A65E957}">
+      <dsp:nvSpPr>
+        <dsp:cNvPr id="0" name=""/>
+        <dsp:cNvSpPr/>
+      </dsp:nvSpPr>
+      <dsp:spPr>
+        <a:xfrm>
+          <a:off x="0" y="2941449"/>
+          <a:ext cx="4629150" cy="695520"/>
+        </a:xfrm>
+        <a:prstGeom prst="rect">
+          <a:avLst/>
+        </a:prstGeom>
+        <a:noFill/>
+        <a:ln>
+          <a:noFill/>
+        </a:ln>
+        <a:effectLst/>
+      </dsp:spPr>
+      <dsp:style>
+        <a:lnRef idx="0">
+          <a:scrgbClr r="0" g="0" b="0"/>
+        </a:lnRef>
+        <a:fillRef idx="0">
+          <a:scrgbClr r="0" g="0" b="0"/>
+        </a:fillRef>
+        <a:effectRef idx="0">
+          <a:scrgbClr r="0" g="0" b="0"/>
+        </a:effectRef>
+        <a:fontRef idx="minor"/>
+      </dsp:style>
+      <dsp:txBody>
+        <a:bodyPr spcFirstLastPara="0" vert="horz" wrap="square" lIns="146976" tIns="35560" rIns="199136" bIns="35560" numCol="1" spcCol="1270" anchor="t" anchorCtr="0">
+          <a:noAutofit/>
+        </a:bodyPr>
+        <a:lstStyle/>
+        <a:p>
+          <a:pPr marL="228600" lvl="1" indent="-228600" algn="l" defTabSz="977900">
+            <a:lnSpc>
+              <a:spcPct val="90000"/>
+            </a:lnSpc>
+            <a:spcBef>
+              <a:spcPct val="0"/>
+            </a:spcBef>
+            <a:spcAft>
+              <a:spcPct val="20000"/>
+            </a:spcAft>
+            <a:buChar char="•"/>
+          </a:pPr>
+          <a:r>
+            <a:rPr lang="en-US" sz="2200" kern="1200"/>
+            <a:t>House of Orange House of Roman, House of Husk…</a:t>
+          </a:r>
+        </a:p>
+      </dsp:txBody>
+      <dsp:txXfrm>
+        <a:off x="0" y="2941449"/>
+        <a:ext cx="4629150" cy="695520"/>
+      </dsp:txXfrm>
+    </dsp:sp>
+  </dsp:spTree>
+</dsp:drawing>
+</file>
+
 <file path=ppt/diagrams/layout1.xml><?xml version="1.0" encoding="utf-8"?>
 <dgm:layoutDef xmlns:dgm="http://schemas.openxmlformats.org/drawingml/2006/diagram" xmlns:a="http://schemas.openxmlformats.org/drawingml/2006/main" uniqueId="urn:microsoft.com/office/officeart/2018/5/layout/CenteredIconLabelDescriptionList">
   <dgm:title val="Centered Icon Label Description List"/>
@@ -14461,6 +15739,173 @@
 </dgm:layoutDef>
 </file>
 
+<file path=ppt/diagrams/layout9.xml><?xml version="1.0" encoding="utf-8"?>
+<dgm:layoutDef xmlns:dgm="http://schemas.openxmlformats.org/drawingml/2006/diagram" xmlns:a="http://schemas.openxmlformats.org/drawingml/2006/main" uniqueId="urn:microsoft.com/office/officeart/2005/8/layout/vList2">
+  <dgm:title val=""/>
+  <dgm:desc val=""/>
+  <dgm:catLst>
+    <dgm:cat type="list" pri="3000"/>
+    <dgm:cat type="convert" pri="1000"/>
+  </dgm:catLst>
+  <dgm:sampData>
+    <dgm:dataModel>
+      <dgm:ptLst>
+        <dgm:pt modelId="0" type="doc"/>
+        <dgm:pt modelId="1">
+          <dgm:prSet phldr="1"/>
+        </dgm:pt>
+        <dgm:pt modelId="11">
+          <dgm:prSet phldr="1"/>
+        </dgm:pt>
+        <dgm:pt modelId="2">
+          <dgm:prSet phldr="1"/>
+        </dgm:pt>
+        <dgm:pt modelId="21">
+          <dgm:prSet phldr="1"/>
+        </dgm:pt>
+      </dgm:ptLst>
+      <dgm:cxnLst>
+        <dgm:cxn modelId="4" srcId="0" destId="1" srcOrd="0" destOrd="0"/>
+        <dgm:cxn modelId="5" srcId="0" destId="2" srcOrd="1" destOrd="0"/>
+        <dgm:cxn modelId="12" srcId="1" destId="11" srcOrd="0" destOrd="0"/>
+        <dgm:cxn modelId="23" srcId="2" destId="21" srcOrd="0" destOrd="0"/>
+      </dgm:cxnLst>
+      <dgm:bg/>
+      <dgm:whole/>
+    </dgm:dataModel>
+  </dgm:sampData>
+  <dgm:styleData>
+    <dgm:dataModel>
+      <dgm:ptLst>
+        <dgm:pt modelId="0" type="doc"/>
+        <dgm:pt modelId="1"/>
+        <dgm:pt modelId="2"/>
+      </dgm:ptLst>
+      <dgm:cxnLst>
+        <dgm:cxn modelId="3" srcId="0" destId="1" srcOrd="0" destOrd="0"/>
+        <dgm:cxn modelId="4" srcId="0" destId="2" srcOrd="1" destOrd="0"/>
+      </dgm:cxnLst>
+      <dgm:bg/>
+      <dgm:whole/>
+    </dgm:dataModel>
+  </dgm:styleData>
+  <dgm:clrData>
+    <dgm:dataModel>
+      <dgm:ptLst>
+        <dgm:pt modelId="0" type="doc"/>
+        <dgm:pt modelId="1"/>
+        <dgm:pt modelId="2"/>
+        <dgm:pt modelId="3"/>
+        <dgm:pt modelId="4"/>
+      </dgm:ptLst>
+      <dgm:cxnLst>
+        <dgm:cxn modelId="5" srcId="0" destId="1" srcOrd="0" destOrd="0"/>
+        <dgm:cxn modelId="6" srcId="0" destId="2" srcOrd="1" destOrd="0"/>
+        <dgm:cxn modelId="7" srcId="0" destId="3" srcOrd="2" destOrd="0"/>
+        <dgm:cxn modelId="8" srcId="0" destId="4" srcOrd="3" destOrd="0"/>
+      </dgm:cxnLst>
+      <dgm:bg/>
+      <dgm:whole/>
+    </dgm:dataModel>
+  </dgm:clrData>
+  <dgm:layoutNode name="linear">
+    <dgm:varLst>
+      <dgm:animLvl val="lvl"/>
+      <dgm:resizeHandles val="exact"/>
+    </dgm:varLst>
+    <dgm:alg type="lin">
+      <dgm:param type="linDir" val="fromT"/>
+      <dgm:param type="vertAlign" val="mid"/>
+    </dgm:alg>
+    <dgm:shape xmlns:r="http://schemas.openxmlformats.org/officeDocument/2006/relationships" r:blip="">
+      <dgm:adjLst/>
+    </dgm:shape>
+    <dgm:presOf/>
+    <dgm:constrLst>
+      <dgm:constr type="w" for="ch" forName="parentText" refType="w"/>
+      <dgm:constr type="h" for="ch" forName="parentText" refType="primFontSz" refFor="ch" refForName="parentText" fact="0.52"/>
+      <dgm:constr type="w" for="ch" forName="childText" refType="w"/>
+      <dgm:constr type="h" for="ch" forName="childText" refType="primFontSz" refFor="ch" refForName="parentText" fact="0.46"/>
+      <dgm:constr type="h" for="ch" forName="parentText" op="equ"/>
+      <dgm:constr type="primFontSz" for="ch" forName="parentText" op="equ" val="65"/>
+      <dgm:constr type="primFontSz" for="ch" forName="childText" refType="primFontSz" refFor="ch" refForName="parentText" op="equ"/>
+      <dgm:constr type="h" for="ch" forName="spacer" refType="primFontSz" refFor="ch" refForName="parentText" fact="0.08"/>
+    </dgm:constrLst>
+    <dgm:ruleLst>
+      <dgm:rule type="primFontSz" for="ch" forName="parentText" val="5" fact="NaN" max="NaN"/>
+    </dgm:ruleLst>
+    <dgm:forEach name="Name0" axis="ch" ptType="node">
+      <dgm:layoutNode name="parentText" styleLbl="node1">
+        <dgm:varLst>
+          <dgm:chMax val="0"/>
+          <dgm:bulletEnabled val="1"/>
+        </dgm:varLst>
+        <dgm:alg type="tx">
+          <dgm:param type="parTxLTRAlign" val="l"/>
+          <dgm:param type="parTxRTLAlign" val="r"/>
+        </dgm:alg>
+        <dgm:shape xmlns:r="http://schemas.openxmlformats.org/officeDocument/2006/relationships" type="roundRect" r:blip="">
+          <dgm:adjLst/>
+        </dgm:shape>
+        <dgm:presOf axis="self"/>
+        <dgm:constrLst>
+          <dgm:constr type="tMarg" refType="primFontSz" fact="0.3"/>
+          <dgm:constr type="bMarg" refType="primFontSz" fact="0.3"/>
+          <dgm:constr type="lMarg" refType="primFontSz" fact="0.3"/>
+          <dgm:constr type="rMarg" refType="primFontSz" fact="0.3"/>
+        </dgm:constrLst>
+        <dgm:ruleLst>
+          <dgm:rule type="h" val="INF" fact="NaN" max="NaN"/>
+        </dgm:ruleLst>
+      </dgm:layoutNode>
+      <dgm:choose name="Name1">
+        <dgm:if name="Name2" axis="ch" ptType="node" func="cnt" op="gte" val="1">
+          <dgm:layoutNode name="childText" styleLbl="revTx">
+            <dgm:varLst>
+              <dgm:bulletEnabled val="1"/>
+            </dgm:varLst>
+            <dgm:alg type="tx">
+              <dgm:param type="stBulletLvl" val="1"/>
+              <dgm:param type="lnSpAfChP" val="20"/>
+            </dgm:alg>
+            <dgm:shape xmlns:r="http://schemas.openxmlformats.org/officeDocument/2006/relationships" type="rect" r:blip="">
+              <dgm:adjLst/>
+            </dgm:shape>
+            <dgm:presOf axis="des" ptType="node"/>
+            <dgm:constrLst>
+              <dgm:constr type="tMarg" refType="primFontSz" fact="0.1"/>
+              <dgm:constr type="bMarg" refType="primFontSz" fact="0.1"/>
+              <dgm:constr type="lMarg" refType="w" fact="0.09"/>
+            </dgm:constrLst>
+            <dgm:ruleLst>
+              <dgm:rule type="h" val="INF" fact="NaN" max="NaN"/>
+            </dgm:ruleLst>
+          </dgm:layoutNode>
+        </dgm:if>
+        <dgm:else name="Name3">
+          <dgm:choose name="Name4">
+            <dgm:if name="Name5" axis="par ch" ptType="doc node" func="cnt" op="gte" val="2">
+              <dgm:forEach name="Name6" axis="followSib" ptType="sibTrans" cnt="1">
+                <dgm:layoutNode name="spacer">
+                  <dgm:alg type="sp"/>
+                  <dgm:shape xmlns:r="http://schemas.openxmlformats.org/officeDocument/2006/relationships" r:blip="">
+                    <dgm:adjLst/>
+                  </dgm:shape>
+                  <dgm:presOf/>
+                  <dgm:constrLst/>
+                  <dgm:ruleLst/>
+                </dgm:layoutNode>
+              </dgm:forEach>
+            </dgm:if>
+            <dgm:else name="Name7"/>
+          </dgm:choose>
+        </dgm:else>
+      </dgm:choose>
+    </dgm:forEach>
+  </dgm:layoutNode>
+</dgm:layoutDef>
+</file>
+
 <file path=ppt/diagrams/quickStyle1.xml><?xml version="1.0" encoding="utf-8"?>
 <dgm:styleDef xmlns:dgm="http://schemas.openxmlformats.org/drawingml/2006/diagram" xmlns:a="http://schemas.openxmlformats.org/drawingml/2006/main" uniqueId="urn:microsoft.com/office/officeart/2005/8/quickstyle/simple1">
   <dgm:title val=""/>
@@ -21700,6 +23145,1040 @@
 </file>
 
 <file path=ppt/diagrams/quickStyle8.xml><?xml version="1.0" encoding="utf-8"?>
+<dgm:styleDef xmlns:dgm="http://schemas.openxmlformats.org/drawingml/2006/diagram" xmlns:a="http://schemas.openxmlformats.org/drawingml/2006/main" uniqueId="urn:microsoft.com/office/officeart/2005/8/quickstyle/simple1">
+  <dgm:title val=""/>
+  <dgm:desc val=""/>
+  <dgm:catLst>
+    <dgm:cat type="simple" pri="10100"/>
+  </dgm:catLst>
+  <dgm:scene3d>
+    <a:camera prst="orthographicFront"/>
+    <a:lightRig rig="threePt" dir="t"/>
+  </dgm:scene3d>
+  <dgm:styleLbl name="node0">
+    <dgm:scene3d>
+      <a:camera prst="orthographicFront"/>
+      <a:lightRig rig="threePt" dir="t"/>
+    </dgm:scene3d>
+    <dgm:sp3d/>
+    <dgm:txPr/>
+    <dgm:style>
+      <a:lnRef idx="2">
+        <a:scrgbClr r="0" g="0" b="0"/>
+      </a:lnRef>
+      <a:fillRef idx="1">
+        <a:scrgbClr r="0" g="0" b="0"/>
+      </a:fillRef>
+      <a:effectRef idx="0">
+        <a:scrgbClr r="0" g="0" b="0"/>
+      </a:effectRef>
+      <a:fontRef idx="minor">
+        <a:schemeClr val="lt1"/>
+      </a:fontRef>
+    </dgm:style>
+  </dgm:styleLbl>
+  <dgm:styleLbl name="lnNode1">
+    <dgm:scene3d>
+      <a:camera prst="orthographicFront"/>
+      <a:lightRig rig="threePt" dir="t"/>
+    </dgm:scene3d>
+    <dgm:sp3d/>
+    <dgm:txPr/>
+    <dgm:style>
+      <a:lnRef idx="2">
+        <a:scrgbClr r="0" g="0" b="0"/>
+      </a:lnRef>
+      <a:fillRef idx="1">
+        <a:scrgbClr r="0" g="0" b="0"/>
+      </a:fillRef>
+      <a:effectRef idx="0">
+        <a:scrgbClr r="0" g="0" b="0"/>
+      </a:effectRef>
+      <a:fontRef idx="minor">
+        <a:schemeClr val="lt1"/>
+      </a:fontRef>
+    </dgm:style>
+  </dgm:styleLbl>
+  <dgm:styleLbl name="vennNode1">
+    <dgm:scene3d>
+      <a:camera prst="orthographicFront"/>
+      <a:lightRig rig="threePt" dir="t"/>
+    </dgm:scene3d>
+    <dgm:sp3d/>
+    <dgm:txPr/>
+    <dgm:style>
+      <a:lnRef idx="2">
+        <a:scrgbClr r="0" g="0" b="0"/>
+      </a:lnRef>
+      <a:fillRef idx="1">
+        <a:scrgbClr r="0" g="0" b="0"/>
+      </a:fillRef>
+      <a:effectRef idx="0">
+        <a:scrgbClr r="0" g="0" b="0"/>
+      </a:effectRef>
+      <a:fontRef idx="minor">
+        <a:schemeClr val="tx1"/>
+      </a:fontRef>
+    </dgm:style>
+  </dgm:styleLbl>
+  <dgm:styleLbl name="alignNode1">
+    <dgm:scene3d>
+      <a:camera prst="orthographicFront"/>
+      <a:lightRig rig="threePt" dir="t"/>
+    </dgm:scene3d>
+    <dgm:sp3d/>
+    <dgm:txPr/>
+    <dgm:style>
+      <a:lnRef idx="2">
+        <a:scrgbClr r="0" g="0" b="0"/>
+      </a:lnRef>
+      <a:fillRef idx="1">
+        <a:scrgbClr r="0" g="0" b="0"/>
+      </a:fillRef>
+      <a:effectRef idx="0">
+        <a:scrgbClr r="0" g="0" b="0"/>
+      </a:effectRef>
+      <a:fontRef idx="minor">
+        <a:schemeClr val="lt1"/>
+      </a:fontRef>
+    </dgm:style>
+  </dgm:styleLbl>
+  <dgm:styleLbl name="node1">
+    <dgm:scene3d>
+      <a:camera prst="orthographicFront"/>
+      <a:lightRig rig="threePt" dir="t"/>
+    </dgm:scene3d>
+    <dgm:sp3d/>
+    <dgm:txPr/>
+    <dgm:style>
+      <a:lnRef idx="2">
+        <a:scrgbClr r="0" g="0" b="0"/>
+      </a:lnRef>
+      <a:fillRef idx="1">
+        <a:scrgbClr r="0" g="0" b="0"/>
+      </a:fillRef>
+      <a:effectRef idx="0">
+        <a:scrgbClr r="0" g="0" b="0"/>
+      </a:effectRef>
+      <a:fontRef idx="minor">
+        <a:schemeClr val="lt1"/>
+      </a:fontRef>
+    </dgm:style>
+  </dgm:styleLbl>
+  <dgm:styleLbl name="node2">
+    <dgm:scene3d>
+      <a:camera prst="orthographicFront"/>
+      <a:lightRig rig="threePt" dir="t"/>
+    </dgm:scene3d>
+    <dgm:sp3d/>
+    <dgm:txPr/>
+    <dgm:style>
+      <a:lnRef idx="2">
+        <a:scrgbClr r="0" g="0" b="0"/>
+      </a:lnRef>
+      <a:fillRef idx="1">
+        <a:scrgbClr r="0" g="0" b="0"/>
+      </a:fillRef>
+      <a:effectRef idx="0">
+        <a:scrgbClr r="0" g="0" b="0"/>
+      </a:effectRef>
+      <a:fontRef idx="minor">
+        <a:schemeClr val="lt1"/>
+      </a:fontRef>
+    </dgm:style>
+  </dgm:styleLbl>
+  <dgm:styleLbl name="node3">
+    <dgm:scene3d>
+      <a:camera prst="orthographicFront"/>
+      <a:lightRig rig="threePt" dir="t"/>
+    </dgm:scene3d>
+    <dgm:sp3d/>
+    <dgm:txPr/>
+    <dgm:style>
+      <a:lnRef idx="2">
+        <a:scrgbClr r="0" g="0" b="0"/>
+      </a:lnRef>
+      <a:fillRef idx="1">
+        <a:scrgbClr r="0" g="0" b="0"/>
+      </a:fillRef>
+      <a:effectRef idx="0">
+        <a:scrgbClr r="0" g="0" b="0"/>
+      </a:effectRef>
+      <a:fontRef idx="minor">
+        <a:schemeClr val="lt1"/>
+      </a:fontRef>
+    </dgm:style>
+  </dgm:styleLbl>
+  <dgm:styleLbl name="node4">
+    <dgm:scene3d>
+      <a:camera prst="orthographicFront"/>
+      <a:lightRig rig="threePt" dir="t"/>
+    </dgm:scene3d>
+    <dgm:sp3d/>
+    <dgm:txPr/>
+    <dgm:style>
+      <a:lnRef idx="2">
+        <a:scrgbClr r="0" g="0" b="0"/>
+      </a:lnRef>
+      <a:fillRef idx="1">
+        <a:scrgbClr r="0" g="0" b="0"/>
+      </a:fillRef>
+      <a:effectRef idx="0">
+        <a:scrgbClr r="0" g="0" b="0"/>
+      </a:effectRef>
+      <a:fontRef idx="minor">
+        <a:schemeClr val="lt1"/>
+      </a:fontRef>
+    </dgm:style>
+  </dgm:styleLbl>
+  <dgm:styleLbl name="fgImgPlace1">
+    <dgm:scene3d>
+      <a:camera prst="orthographicFront"/>
+      <a:lightRig rig="threePt" dir="t"/>
+    </dgm:scene3d>
+    <dgm:sp3d/>
+    <dgm:txPr/>
+    <dgm:style>
+      <a:lnRef idx="2">
+        <a:scrgbClr r="0" g="0" b="0"/>
+      </a:lnRef>
+      <a:fillRef idx="1">
+        <a:scrgbClr r="0" g="0" b="0"/>
+      </a:fillRef>
+      <a:effectRef idx="0">
+        <a:scrgbClr r="0" g="0" b="0"/>
+      </a:effectRef>
+      <a:fontRef idx="minor"/>
+    </dgm:style>
+  </dgm:styleLbl>
+  <dgm:styleLbl name="alignImgPlace1">
+    <dgm:scene3d>
+      <a:camera prst="orthographicFront"/>
+      <a:lightRig rig="threePt" dir="t"/>
+    </dgm:scene3d>
+    <dgm:sp3d/>
+    <dgm:txPr/>
+    <dgm:style>
+      <a:lnRef idx="2">
+        <a:scrgbClr r="0" g="0" b="0"/>
+      </a:lnRef>
+      <a:fillRef idx="1">
+        <a:scrgbClr r="0" g="0" b="0"/>
+      </a:fillRef>
+      <a:effectRef idx="0">
+        <a:scrgbClr r="0" g="0" b="0"/>
+      </a:effectRef>
+      <a:fontRef idx="minor"/>
+    </dgm:style>
+  </dgm:styleLbl>
+  <dgm:styleLbl name="bgImgPlace1">
+    <dgm:scene3d>
+      <a:camera prst="orthographicFront"/>
+      <a:lightRig rig="threePt" dir="t"/>
+    </dgm:scene3d>
+    <dgm:sp3d/>
+    <dgm:txPr/>
+    <dgm:style>
+      <a:lnRef idx="2">
+        <a:scrgbClr r="0" g="0" b="0"/>
+      </a:lnRef>
+      <a:fillRef idx="1">
+        <a:scrgbClr r="0" g="0" b="0"/>
+      </a:fillRef>
+      <a:effectRef idx="0">
+        <a:scrgbClr r="0" g="0" b="0"/>
+      </a:effectRef>
+      <a:fontRef idx="minor"/>
+    </dgm:style>
+  </dgm:styleLbl>
+  <dgm:styleLbl name="sibTrans2D1">
+    <dgm:scene3d>
+      <a:camera prst="orthographicFront"/>
+      <a:lightRig rig="threePt" dir="t"/>
+    </dgm:scene3d>
+    <dgm:sp3d/>
+    <dgm:txPr/>
+    <dgm:style>
+      <a:lnRef idx="0">
+        <a:scrgbClr r="0" g="0" b="0"/>
+      </a:lnRef>
+      <a:fillRef idx="1">
+        <a:scrgbClr r="0" g="0" b="0"/>
+      </a:fillRef>
+      <a:effectRef idx="0">
+        <a:scrgbClr r="0" g="0" b="0"/>
+      </a:effectRef>
+      <a:fontRef idx="minor">
+        <a:schemeClr val="lt1"/>
+      </a:fontRef>
+    </dgm:style>
+  </dgm:styleLbl>
+  <dgm:styleLbl name="fgSibTrans2D1">
+    <dgm:scene3d>
+      <a:camera prst="orthographicFront"/>
+      <a:lightRig rig="threePt" dir="t"/>
+    </dgm:scene3d>
+    <dgm:sp3d/>
+    <dgm:txPr/>
+    <dgm:style>
+      <a:lnRef idx="0">
+        <a:scrgbClr r="0" g="0" b="0"/>
+      </a:lnRef>
+      <a:fillRef idx="1">
+        <a:scrgbClr r="0" g="0" b="0"/>
+      </a:fillRef>
+      <a:effectRef idx="0">
+        <a:scrgbClr r="0" g="0" b="0"/>
+      </a:effectRef>
+      <a:fontRef idx="minor">
+        <a:schemeClr val="lt1"/>
+      </a:fontRef>
+    </dgm:style>
+  </dgm:styleLbl>
+  <dgm:styleLbl name="bgSibTrans2D1">
+    <dgm:scene3d>
+      <a:camera prst="orthographicFront"/>
+      <a:lightRig rig="threePt" dir="t"/>
+    </dgm:scene3d>
+    <dgm:sp3d/>
+    <dgm:txPr/>
+    <dgm:style>
+      <a:lnRef idx="0">
+        <a:scrgbClr r="0" g="0" b="0"/>
+      </a:lnRef>
+      <a:fillRef idx="1">
+        <a:scrgbClr r="0" g="0" b="0"/>
+      </a:fillRef>
+      <a:effectRef idx="0">
+        <a:scrgbClr r="0" g="0" b="0"/>
+      </a:effectRef>
+      <a:fontRef idx="minor">
+        <a:schemeClr val="lt1"/>
+      </a:fontRef>
+    </dgm:style>
+  </dgm:styleLbl>
+  <dgm:styleLbl name="sibTrans1D1">
+    <dgm:scene3d>
+      <a:camera prst="orthographicFront"/>
+      <a:lightRig rig="threePt" dir="t"/>
+    </dgm:scene3d>
+    <dgm:sp3d/>
+    <dgm:txPr/>
+    <dgm:style>
+      <a:lnRef idx="1">
+        <a:scrgbClr r="0" g="0" b="0"/>
+      </a:lnRef>
+      <a:fillRef idx="0">
+        <a:scrgbClr r="0" g="0" b="0"/>
+      </a:fillRef>
+      <a:effectRef idx="0">
+        <a:scrgbClr r="0" g="0" b="0"/>
+      </a:effectRef>
+      <a:fontRef idx="minor"/>
+    </dgm:style>
+  </dgm:styleLbl>
+  <dgm:styleLbl name="callout">
+    <dgm:scene3d>
+      <a:camera prst="orthographicFront"/>
+      <a:lightRig rig="threePt" dir="t"/>
+    </dgm:scene3d>
+    <dgm:sp3d/>
+    <dgm:txPr/>
+    <dgm:style>
+      <a:lnRef idx="2">
+        <a:scrgbClr r="0" g="0" b="0"/>
+      </a:lnRef>
+      <a:fillRef idx="1">
+        <a:scrgbClr r="0" g="0" b="0"/>
+      </a:fillRef>
+      <a:effectRef idx="0">
+        <a:scrgbClr r="0" g="0" b="0"/>
+      </a:effectRef>
+      <a:fontRef idx="minor"/>
+    </dgm:style>
+  </dgm:styleLbl>
+  <dgm:styleLbl name="asst0">
+    <dgm:scene3d>
+      <a:camera prst="orthographicFront"/>
+      <a:lightRig rig="threePt" dir="t"/>
+    </dgm:scene3d>
+    <dgm:sp3d/>
+    <dgm:txPr/>
+    <dgm:style>
+      <a:lnRef idx="2">
+        <a:scrgbClr r="0" g="0" b="0"/>
+      </a:lnRef>
+      <a:fillRef idx="1">
+        <a:scrgbClr r="0" g="0" b="0"/>
+      </a:fillRef>
+      <a:effectRef idx="0">
+        <a:scrgbClr r="0" g="0" b="0"/>
+      </a:effectRef>
+      <a:fontRef idx="minor">
+        <a:schemeClr val="lt1"/>
+      </a:fontRef>
+    </dgm:style>
+  </dgm:styleLbl>
+  <dgm:styleLbl name="asst1">
+    <dgm:scene3d>
+      <a:camera prst="orthographicFront"/>
+      <a:lightRig rig="threePt" dir="t"/>
+    </dgm:scene3d>
+    <dgm:sp3d/>
+    <dgm:txPr/>
+    <dgm:style>
+      <a:lnRef idx="2">
+        <a:scrgbClr r="0" g="0" b="0"/>
+      </a:lnRef>
+      <a:fillRef idx="1">
+        <a:scrgbClr r="0" g="0" b="0"/>
+      </a:fillRef>
+      <a:effectRef idx="0">
+        <a:scrgbClr r="0" g="0" b="0"/>
+      </a:effectRef>
+      <a:fontRef idx="minor">
+        <a:schemeClr val="lt1"/>
+      </a:fontRef>
+    </dgm:style>
+  </dgm:styleLbl>
+  <dgm:styleLbl name="asst2">
+    <dgm:scene3d>
+      <a:camera prst="orthographicFront"/>
+      <a:lightRig rig="threePt" dir="t"/>
+    </dgm:scene3d>
+    <dgm:sp3d/>
+    <dgm:txPr/>
+    <dgm:style>
+      <a:lnRef idx="2">
+        <a:scrgbClr r="0" g="0" b="0"/>
+      </a:lnRef>
+      <a:fillRef idx="1">
+        <a:scrgbClr r="0" g="0" b="0"/>
+      </a:fillRef>
+      <a:effectRef idx="0">
+        <a:scrgbClr r="0" g="0" b="0"/>
+      </a:effectRef>
+      <a:fontRef idx="minor">
+        <a:schemeClr val="lt1"/>
+      </a:fontRef>
+    </dgm:style>
+  </dgm:styleLbl>
+  <dgm:styleLbl name="asst3">
+    <dgm:scene3d>
+      <a:camera prst="orthographicFront"/>
+      <a:lightRig rig="threePt" dir="t"/>
+    </dgm:scene3d>
+    <dgm:sp3d/>
+    <dgm:txPr/>
+    <dgm:style>
+      <a:lnRef idx="2">
+        <a:scrgbClr r="0" g="0" b="0"/>
+      </a:lnRef>
+      <a:fillRef idx="1">
+        <a:scrgbClr r="0" g="0" b="0"/>
+      </a:fillRef>
+      <a:effectRef idx="0">
+        <a:scrgbClr r="0" g="0" b="0"/>
+      </a:effectRef>
+      <a:fontRef idx="minor">
+        <a:schemeClr val="lt1"/>
+      </a:fontRef>
+    </dgm:style>
+  </dgm:styleLbl>
+  <dgm:styleLbl name="asst4">
+    <dgm:scene3d>
+      <a:camera prst="orthographicFront"/>
+      <a:lightRig rig="threePt" dir="t"/>
+    </dgm:scene3d>
+    <dgm:sp3d/>
+    <dgm:txPr/>
+    <dgm:style>
+      <a:lnRef idx="2">
+        <a:scrgbClr r="0" g="0" b="0"/>
+      </a:lnRef>
+      <a:fillRef idx="1">
+        <a:scrgbClr r="0" g="0" b="0"/>
+      </a:fillRef>
+      <a:effectRef idx="0">
+        <a:scrgbClr r="0" g="0" b="0"/>
+      </a:effectRef>
+      <a:fontRef idx="minor">
+        <a:schemeClr val="lt1"/>
+      </a:fontRef>
+    </dgm:style>
+  </dgm:styleLbl>
+  <dgm:styleLbl name="parChTrans2D1">
+    <dgm:scene3d>
+      <a:camera prst="orthographicFront"/>
+      <a:lightRig rig="threePt" dir="t"/>
+    </dgm:scene3d>
+    <dgm:sp3d/>
+    <dgm:txPr/>
+    <dgm:style>
+      <a:lnRef idx="2">
+        <a:scrgbClr r="0" g="0" b="0"/>
+      </a:lnRef>
+      <a:fillRef idx="1">
+        <a:scrgbClr r="0" g="0" b="0"/>
+      </a:fillRef>
+      <a:effectRef idx="0">
+        <a:scrgbClr r="0" g="0" b="0"/>
+      </a:effectRef>
+      <a:fontRef idx="minor">
+        <a:schemeClr val="lt1"/>
+      </a:fontRef>
+    </dgm:style>
+  </dgm:styleLbl>
+  <dgm:styleLbl name="parChTrans2D2">
+    <dgm:scene3d>
+      <a:camera prst="orthographicFront"/>
+      <a:lightRig rig="threePt" dir="t"/>
+    </dgm:scene3d>
+    <dgm:sp3d/>
+    <dgm:txPr/>
+    <dgm:style>
+      <a:lnRef idx="2">
+        <a:scrgbClr r="0" g="0" b="0"/>
+      </a:lnRef>
+      <a:fillRef idx="1">
+        <a:scrgbClr r="0" g="0" b="0"/>
+      </a:fillRef>
+      <a:effectRef idx="0">
+        <a:scrgbClr r="0" g="0" b="0"/>
+      </a:effectRef>
+      <a:fontRef idx="minor">
+        <a:schemeClr val="lt1"/>
+      </a:fontRef>
+    </dgm:style>
+  </dgm:styleLbl>
+  <dgm:styleLbl name="parChTrans2D3">
+    <dgm:scene3d>
+      <a:camera prst="orthographicFront"/>
+      <a:lightRig rig="threePt" dir="t"/>
+    </dgm:scene3d>
+    <dgm:sp3d/>
+    <dgm:txPr/>
+    <dgm:style>
+      <a:lnRef idx="2">
+        <a:scrgbClr r="0" g="0" b="0"/>
+      </a:lnRef>
+      <a:fillRef idx="1">
+        <a:scrgbClr r="0" g="0" b="0"/>
+      </a:fillRef>
+      <a:effectRef idx="0">
+        <a:scrgbClr r="0" g="0" b="0"/>
+      </a:effectRef>
+      <a:fontRef idx="minor">
+        <a:schemeClr val="lt1"/>
+      </a:fontRef>
+    </dgm:style>
+  </dgm:styleLbl>
+  <dgm:styleLbl name="parChTrans2D4">
+    <dgm:scene3d>
+      <a:camera prst="orthographicFront"/>
+      <a:lightRig rig="threePt" dir="t"/>
+    </dgm:scene3d>
+    <dgm:sp3d/>
+    <dgm:txPr/>
+    <dgm:style>
+      <a:lnRef idx="2">
+        <a:scrgbClr r="0" g="0" b="0"/>
+      </a:lnRef>
+      <a:fillRef idx="1">
+        <a:scrgbClr r="0" g="0" b="0"/>
+      </a:fillRef>
+      <a:effectRef idx="0">
+        <a:scrgbClr r="0" g="0" b="0"/>
+      </a:effectRef>
+      <a:fontRef idx="minor">
+        <a:schemeClr val="lt1"/>
+      </a:fontRef>
+    </dgm:style>
+  </dgm:styleLbl>
+  <dgm:styleLbl name="parChTrans1D1">
+    <dgm:scene3d>
+      <a:camera prst="orthographicFront"/>
+      <a:lightRig rig="threePt" dir="t"/>
+    </dgm:scene3d>
+    <dgm:sp3d/>
+    <dgm:txPr/>
+    <dgm:style>
+      <a:lnRef idx="2">
+        <a:scrgbClr r="0" g="0" b="0"/>
+      </a:lnRef>
+      <a:fillRef idx="0">
+        <a:scrgbClr r="0" g="0" b="0"/>
+      </a:fillRef>
+      <a:effectRef idx="0">
+        <a:scrgbClr r="0" g="0" b="0"/>
+      </a:effectRef>
+      <a:fontRef idx="minor"/>
+    </dgm:style>
+  </dgm:styleLbl>
+  <dgm:styleLbl name="parChTrans1D2">
+    <dgm:scene3d>
+      <a:camera prst="orthographicFront"/>
+      <a:lightRig rig="threePt" dir="t"/>
+    </dgm:scene3d>
+    <dgm:sp3d/>
+    <dgm:txPr/>
+    <dgm:style>
+      <a:lnRef idx="2">
+        <a:scrgbClr r="0" g="0" b="0"/>
+      </a:lnRef>
+      <a:fillRef idx="0">
+        <a:scrgbClr r="0" g="0" b="0"/>
+      </a:fillRef>
+      <a:effectRef idx="0">
+        <a:scrgbClr r="0" g="0" b="0"/>
+      </a:effectRef>
+      <a:fontRef idx="minor"/>
+    </dgm:style>
+  </dgm:styleLbl>
+  <dgm:styleLbl name="parChTrans1D3">
+    <dgm:scene3d>
+      <a:camera prst="orthographicFront"/>
+      <a:lightRig rig="threePt" dir="t"/>
+    </dgm:scene3d>
+    <dgm:sp3d/>
+    <dgm:txPr/>
+    <dgm:style>
+      <a:lnRef idx="2">
+        <a:scrgbClr r="0" g="0" b="0"/>
+      </a:lnRef>
+      <a:fillRef idx="0">
+        <a:scrgbClr r="0" g="0" b="0"/>
+      </a:fillRef>
+      <a:effectRef idx="0">
+        <a:scrgbClr r="0" g="0" b="0"/>
+      </a:effectRef>
+      <a:fontRef idx="minor"/>
+    </dgm:style>
+  </dgm:styleLbl>
+  <dgm:styleLbl name="parChTrans1D4">
+    <dgm:scene3d>
+      <a:camera prst="orthographicFront"/>
+      <a:lightRig rig="threePt" dir="t"/>
+    </dgm:scene3d>
+    <dgm:sp3d/>
+    <dgm:txPr/>
+    <dgm:style>
+      <a:lnRef idx="2">
+        <a:scrgbClr r="0" g="0" b="0"/>
+      </a:lnRef>
+      <a:fillRef idx="0">
+        <a:scrgbClr r="0" g="0" b="0"/>
+      </a:fillRef>
+      <a:effectRef idx="0">
+        <a:scrgbClr r="0" g="0" b="0"/>
+      </a:effectRef>
+      <a:fontRef idx="minor"/>
+    </dgm:style>
+  </dgm:styleLbl>
+  <dgm:styleLbl name="fgAcc1">
+    <dgm:scene3d>
+      <a:camera prst="orthographicFront"/>
+      <a:lightRig rig="threePt" dir="t"/>
+    </dgm:scene3d>
+    <dgm:sp3d/>
+    <dgm:txPr/>
+    <dgm:style>
+      <a:lnRef idx="2">
+        <a:scrgbClr r="0" g="0" b="0"/>
+      </a:lnRef>
+      <a:fillRef idx="1">
+        <a:scrgbClr r="0" g="0" b="0"/>
+      </a:fillRef>
+      <a:effectRef idx="0">
+        <a:scrgbClr r="0" g="0" b="0"/>
+      </a:effectRef>
+      <a:fontRef idx="minor"/>
+    </dgm:style>
+  </dgm:styleLbl>
+  <dgm:styleLbl name="conFgAcc1">
+    <dgm:scene3d>
+      <a:camera prst="orthographicFront"/>
+      <a:lightRig rig="threePt" dir="t"/>
+    </dgm:scene3d>
+    <dgm:sp3d/>
+    <dgm:txPr/>
+    <dgm:style>
+      <a:lnRef idx="2">
+        <a:scrgbClr r="0" g="0" b="0"/>
+      </a:lnRef>
+      <a:fillRef idx="1">
+        <a:scrgbClr r="0" g="0" b="0"/>
+      </a:fillRef>
+      <a:effectRef idx="0">
+        <a:scrgbClr r="0" g="0" b="0"/>
+      </a:effectRef>
+      <a:fontRef idx="minor"/>
+    </dgm:style>
+  </dgm:styleLbl>
+  <dgm:styleLbl name="alignAcc1">
+    <dgm:scene3d>
+      <a:camera prst="orthographicFront"/>
+      <a:lightRig rig="threePt" dir="t"/>
+    </dgm:scene3d>
+    <dgm:sp3d/>
+    <dgm:txPr/>
+    <dgm:style>
+      <a:lnRef idx="2">
+        <a:scrgbClr r="0" g="0" b="0"/>
+      </a:lnRef>
+      <a:fillRef idx="1">
+        <a:scrgbClr r="0" g="0" b="0"/>
+      </a:fillRef>
+      <a:effectRef idx="0">
+        <a:scrgbClr r="0" g="0" b="0"/>
+      </a:effectRef>
+      <a:fontRef idx="minor"/>
+    </dgm:style>
+  </dgm:styleLbl>
+  <dgm:styleLbl name="trAlignAcc1">
+    <dgm:scene3d>
+      <a:camera prst="orthographicFront"/>
+      <a:lightRig rig="threePt" dir="t"/>
+    </dgm:scene3d>
+    <dgm:sp3d/>
+    <dgm:txPr/>
+    <dgm:style>
+      <a:lnRef idx="1">
+        <a:scrgbClr r="0" g="0" b="0"/>
+      </a:lnRef>
+      <a:fillRef idx="1">
+        <a:scrgbClr r="0" g="0" b="0"/>
+      </a:fillRef>
+      <a:effectRef idx="0">
+        <a:scrgbClr r="0" g="0" b="0"/>
+      </a:effectRef>
+      <a:fontRef idx="minor"/>
+    </dgm:style>
+  </dgm:styleLbl>
+  <dgm:styleLbl name="bgAcc1">
+    <dgm:scene3d>
+      <a:camera prst="orthographicFront"/>
+      <a:lightRig rig="threePt" dir="t"/>
+    </dgm:scene3d>
+    <dgm:sp3d/>
+    <dgm:txPr/>
+    <dgm:style>
+      <a:lnRef idx="2">
+        <a:scrgbClr r="0" g="0" b="0"/>
+      </a:lnRef>
+      <a:fillRef idx="1">
+        <a:scrgbClr r="0" g="0" b="0"/>
+      </a:fillRef>
+      <a:effectRef idx="0">
+        <a:scrgbClr r="0" g="0" b="0"/>
+      </a:effectRef>
+      <a:fontRef idx="minor"/>
+    </dgm:style>
+  </dgm:styleLbl>
+  <dgm:styleLbl name="solidFgAcc1">
+    <dgm:scene3d>
+      <a:camera prst="orthographicFront"/>
+      <a:lightRig rig="threePt" dir="t"/>
+    </dgm:scene3d>
+    <dgm:sp3d/>
+    <dgm:txPr/>
+    <dgm:style>
+      <a:lnRef idx="2">
+        <a:scrgbClr r="0" g="0" b="0"/>
+      </a:lnRef>
+      <a:fillRef idx="1">
+        <a:scrgbClr r="0" g="0" b="0"/>
+      </a:fillRef>
+      <a:effectRef idx="0">
+        <a:scrgbClr r="0" g="0" b="0"/>
+      </a:effectRef>
+      <a:fontRef idx="minor"/>
+    </dgm:style>
+  </dgm:styleLbl>
+  <dgm:styleLbl name="solidAlignAcc1">
+    <dgm:scene3d>
+      <a:camera prst="orthographicFront"/>
+      <a:lightRig rig="threePt" dir="t"/>
+    </dgm:scene3d>
+    <dgm:sp3d/>
+    <dgm:txPr/>
+    <dgm:style>
+      <a:lnRef idx="2">
+        <a:scrgbClr r="0" g="0" b="0"/>
+      </a:lnRef>
+      <a:fillRef idx="1">
+        <a:scrgbClr r="0" g="0" b="0"/>
+      </a:fillRef>
+      <a:effectRef idx="0">
+        <a:scrgbClr r="0" g="0" b="0"/>
+      </a:effectRef>
+      <a:fontRef idx="minor"/>
+    </dgm:style>
+  </dgm:styleLbl>
+  <dgm:styleLbl name="solidBgAcc1">
+    <dgm:scene3d>
+      <a:camera prst="orthographicFront"/>
+      <a:lightRig rig="threePt" dir="t"/>
+    </dgm:scene3d>
+    <dgm:sp3d/>
+    <dgm:txPr/>
+    <dgm:style>
+      <a:lnRef idx="2">
+        <a:scrgbClr r="0" g="0" b="0"/>
+      </a:lnRef>
+      <a:fillRef idx="1">
+        <a:scrgbClr r="0" g="0" b="0"/>
+      </a:fillRef>
+      <a:effectRef idx="0">
+        <a:scrgbClr r="0" g="0" b="0"/>
+      </a:effectRef>
+      <a:fontRef idx="minor"/>
+    </dgm:style>
+  </dgm:styleLbl>
+  <dgm:styleLbl name="fgAccFollowNode1">
+    <dgm:scene3d>
+      <a:camera prst="orthographicFront"/>
+      <a:lightRig rig="threePt" dir="t"/>
+    </dgm:scene3d>
+    <dgm:sp3d/>
+    <dgm:txPr/>
+    <dgm:style>
+      <a:lnRef idx="2">
+        <a:scrgbClr r="0" g="0" b="0"/>
+      </a:lnRef>
+      <a:fillRef idx="1">
+        <a:scrgbClr r="0" g="0" b="0"/>
+      </a:fillRef>
+      <a:effectRef idx="0">
+        <a:scrgbClr r="0" g="0" b="0"/>
+      </a:effectRef>
+      <a:fontRef idx="minor"/>
+    </dgm:style>
+  </dgm:styleLbl>
+  <dgm:styleLbl name="alignAccFollowNode1">
+    <dgm:scene3d>
+      <a:camera prst="orthographicFront"/>
+      <a:lightRig rig="threePt" dir="t"/>
+    </dgm:scene3d>
+    <dgm:sp3d/>
+    <dgm:txPr/>
+    <dgm:style>
+      <a:lnRef idx="2">
+        <a:scrgbClr r="0" g="0" b="0"/>
+      </a:lnRef>
+      <a:fillRef idx="1">
+        <a:scrgbClr r="0" g="0" b="0"/>
+      </a:fillRef>
+      <a:effectRef idx="0">
+        <a:scrgbClr r="0" g="0" b="0"/>
+      </a:effectRef>
+      <a:fontRef idx="minor"/>
+    </dgm:style>
+  </dgm:styleLbl>
+  <dgm:styleLbl name="bgAccFollowNode1">
+    <dgm:scene3d>
+      <a:camera prst="orthographicFront"/>
+      <a:lightRig rig="threePt" dir="t"/>
+    </dgm:scene3d>
+    <dgm:sp3d/>
+    <dgm:txPr/>
+    <dgm:style>
+      <a:lnRef idx="2">
+        <a:scrgbClr r="0" g="0" b="0"/>
+      </a:lnRef>
+      <a:fillRef idx="1">
+        <a:scrgbClr r="0" g="0" b="0"/>
+      </a:fillRef>
+      <a:effectRef idx="0">
+        <a:scrgbClr r="0" g="0" b="0"/>
+      </a:effectRef>
+      <a:fontRef idx="minor"/>
+    </dgm:style>
+  </dgm:styleLbl>
+  <dgm:styleLbl name="fgAcc0">
+    <dgm:scene3d>
+      <a:camera prst="orthographicFront"/>
+      <a:lightRig rig="threePt" dir="t"/>
+    </dgm:scene3d>
+    <dgm:sp3d/>
+    <dgm:txPr/>
+    <dgm:style>
+      <a:lnRef idx="2">
+        <a:scrgbClr r="0" g="0" b="0"/>
+      </a:lnRef>
+      <a:fillRef idx="1">
+        <a:scrgbClr r="0" g="0" b="0"/>
+      </a:fillRef>
+      <a:effectRef idx="0">
+        <a:scrgbClr r="0" g="0" b="0"/>
+      </a:effectRef>
+      <a:fontRef idx="minor"/>
+    </dgm:style>
+  </dgm:styleLbl>
+  <dgm:styleLbl name="fgAcc2">
+    <dgm:scene3d>
+      <a:camera prst="orthographicFront"/>
+      <a:lightRig rig="threePt" dir="t"/>
+    </dgm:scene3d>
+    <dgm:sp3d/>
+    <dgm:txPr/>
+    <dgm:style>
+      <a:lnRef idx="2">
+        <a:scrgbClr r="0" g="0" b="0"/>
+      </a:lnRef>
+      <a:fillRef idx="1">
+        <a:scrgbClr r="0" g="0" b="0"/>
+      </a:fillRef>
+      <a:effectRef idx="0">
+        <a:scrgbClr r="0" g="0" b="0"/>
+      </a:effectRef>
+      <a:fontRef idx="minor"/>
+    </dgm:style>
+  </dgm:styleLbl>
+  <dgm:styleLbl name="fgAcc3">
+    <dgm:scene3d>
+      <a:camera prst="orthographicFront"/>
+      <a:lightRig rig="threePt" dir="t"/>
+    </dgm:scene3d>
+    <dgm:sp3d/>
+    <dgm:txPr/>
+    <dgm:style>
+      <a:lnRef idx="2">
+        <a:scrgbClr r="0" g="0" b="0"/>
+      </a:lnRef>
+      <a:fillRef idx="1">
+        <a:scrgbClr r="0" g="0" b="0"/>
+      </a:fillRef>
+      <a:effectRef idx="0">
+        <a:scrgbClr r="0" g="0" b="0"/>
+      </a:effectRef>
+      <a:fontRef idx="minor"/>
+    </dgm:style>
+  </dgm:styleLbl>
+  <dgm:styleLbl name="fgAcc4">
+    <dgm:scene3d>
+      <a:camera prst="orthographicFront"/>
+      <a:lightRig rig="threePt" dir="t"/>
+    </dgm:scene3d>
+    <dgm:sp3d/>
+    <dgm:txPr/>
+    <dgm:style>
+      <a:lnRef idx="2">
+        <a:scrgbClr r="0" g="0" b="0"/>
+      </a:lnRef>
+      <a:fillRef idx="1">
+        <a:scrgbClr r="0" g="0" b="0"/>
+      </a:fillRef>
+      <a:effectRef idx="0">
+        <a:scrgbClr r="0" g="0" b="0"/>
+      </a:effectRef>
+      <a:fontRef idx="minor"/>
+    </dgm:style>
+  </dgm:styleLbl>
+  <dgm:styleLbl name="bgShp">
+    <dgm:scene3d>
+      <a:camera prst="orthographicFront"/>
+      <a:lightRig rig="threePt" dir="t"/>
+    </dgm:scene3d>
+    <dgm:sp3d/>
+    <dgm:txPr/>
+    <dgm:style>
+      <a:lnRef idx="0">
+        <a:scrgbClr r="0" g="0" b="0"/>
+      </a:lnRef>
+      <a:fillRef idx="1">
+        <a:scrgbClr r="0" g="0" b="0"/>
+      </a:fillRef>
+      <a:effectRef idx="0">
+        <a:scrgbClr r="0" g="0" b="0"/>
+      </a:effectRef>
+      <a:fontRef idx="minor"/>
+    </dgm:style>
+  </dgm:styleLbl>
+  <dgm:styleLbl name="dkBgShp">
+    <dgm:scene3d>
+      <a:camera prst="orthographicFront"/>
+      <a:lightRig rig="threePt" dir="t"/>
+    </dgm:scene3d>
+    <dgm:sp3d/>
+    <dgm:txPr/>
+    <dgm:style>
+      <a:lnRef idx="0">
+        <a:scrgbClr r="0" g="0" b="0"/>
+      </a:lnRef>
+      <a:fillRef idx="1">
+        <a:scrgbClr r="0" g="0" b="0"/>
+      </a:fillRef>
+      <a:effectRef idx="0">
+        <a:scrgbClr r="0" g="0" b="0"/>
+      </a:effectRef>
+      <a:fontRef idx="minor"/>
+    </dgm:style>
+  </dgm:styleLbl>
+  <dgm:styleLbl name="trBgShp">
+    <dgm:scene3d>
+      <a:camera prst="orthographicFront"/>
+      <a:lightRig rig="threePt" dir="t"/>
+    </dgm:scene3d>
+    <dgm:sp3d/>
+    <dgm:txPr/>
+    <dgm:style>
+      <a:lnRef idx="0">
+        <a:scrgbClr r="0" g="0" b="0"/>
+      </a:lnRef>
+      <a:fillRef idx="1">
+        <a:scrgbClr r="0" g="0" b="0"/>
+      </a:fillRef>
+      <a:effectRef idx="0">
+        <a:scrgbClr r="0" g="0" b="0"/>
+      </a:effectRef>
+      <a:fontRef idx="minor"/>
+    </dgm:style>
+  </dgm:styleLbl>
+  <dgm:styleLbl name="fgShp">
+    <dgm:scene3d>
+      <a:camera prst="orthographicFront"/>
+      <a:lightRig rig="threePt" dir="t"/>
+    </dgm:scene3d>
+    <dgm:sp3d/>
+    <dgm:txPr/>
+    <dgm:style>
+      <a:lnRef idx="2">
+        <a:scrgbClr r="0" g="0" b="0"/>
+      </a:lnRef>
+      <a:fillRef idx="1">
+        <a:scrgbClr r="0" g="0" b="0"/>
+      </a:fillRef>
+      <a:effectRef idx="0">
+        <a:scrgbClr r="0" g="0" b="0"/>
+      </a:effectRef>
+      <a:fontRef idx="minor"/>
+    </dgm:style>
+  </dgm:styleLbl>
+  <dgm:styleLbl name="revTx">
+    <dgm:scene3d>
+      <a:camera prst="orthographicFront"/>
+      <a:lightRig rig="threePt" dir="t"/>
+    </dgm:scene3d>
+    <dgm:sp3d/>
+    <dgm:txPr/>
+    <dgm:style>
+      <a:lnRef idx="0">
+        <a:scrgbClr r="0" g="0" b="0"/>
+      </a:lnRef>
+      <a:fillRef idx="0">
+        <a:scrgbClr r="0" g="0" b="0"/>
+      </a:fillRef>
+      <a:effectRef idx="0">
+        <a:scrgbClr r="0" g="0" b="0"/>
+      </a:effectRef>
+      <a:fontRef idx="minor"/>
+    </dgm:style>
+  </dgm:styleLbl>
+</dgm:styleDef>
+</file>
+
+<file path=ppt/diagrams/quickStyle9.xml><?xml version="1.0" encoding="utf-8"?>
 <dgm:styleDef xmlns:dgm="http://schemas.openxmlformats.org/drawingml/2006/diagram" xmlns:a="http://schemas.openxmlformats.org/drawingml/2006/main" uniqueId="urn:microsoft.com/office/officeart/2005/8/quickstyle/simple1">
   <dgm:title val=""/>
   <dgm:desc val=""/>
@@ -22815,7 +25294,7 @@
           <a:p>
             <a:fld id="{2DA23E8D-1792-1541-9147-970A8DD8A355}" type="datetimeFigureOut">
               <a:rPr lang="en-US" smtClean="0"/>
-              <a:t>9/23/21</a:t>
+              <a:t>9/25/21</a:t>
             </a:fld>
             <a:endParaRPr lang="en-US" dirty="0"/>
           </a:p>
@@ -23818,7 +26297,7 @@
                 <a:latin typeface="Calibri"/>
               </a:rPr>
               <a:pPr/>
-              <a:t>9/23/21</a:t>
+              <a:t>9/25/21</a:t>
             </a:fld>
             <a:endParaRPr lang="en-US" dirty="0">
               <a:solidFill>
@@ -24071,7 +26550,7 @@
                 <a:latin typeface="Calibri"/>
               </a:rPr>
               <a:pPr/>
-              <a:t>9/23/21</a:t>
+              <a:t>9/25/21</a:t>
             </a:fld>
             <a:endParaRPr lang="en-US" dirty="0">
               <a:solidFill>
@@ -24286,7 +26765,7 @@
                 <a:latin typeface="Calibri"/>
               </a:rPr>
               <a:pPr/>
-              <a:t>9/23/21</a:t>
+              <a:t>9/25/21</a:t>
             </a:fld>
             <a:endParaRPr lang="en-US" dirty="0">
               <a:solidFill>
@@ -24684,7 +27163,7 @@
                 <a:latin typeface="Calibri"/>
               </a:rPr>
               <a:pPr/>
-              <a:t>9/23/21</a:t>
+              <a:t>9/25/21</a:t>
             </a:fld>
             <a:endParaRPr lang="en-US" dirty="0">
               <a:solidFill>
@@ -25026,7 +27505,7 @@
                 <a:latin typeface="Calibri"/>
               </a:rPr>
               <a:pPr/>
-              <a:t>9/23/21</a:t>
+              <a:t>9/25/21</a:t>
             </a:fld>
             <a:endParaRPr lang="en-US" dirty="0">
               <a:solidFill>
@@ -25354,7 +27833,7 @@
                 <a:latin typeface="Calibri"/>
               </a:rPr>
               <a:pPr/>
-              <a:t>9/23/21</a:t>
+              <a:t>9/25/21</a:t>
             </a:fld>
             <a:endParaRPr lang="en-US" dirty="0">
               <a:solidFill>
@@ -25843,7 +28322,7 @@
                 <a:latin typeface="Calibri"/>
               </a:rPr>
               <a:pPr/>
-              <a:t>9/23/21</a:t>
+              <a:t>9/25/21</a:t>
             </a:fld>
             <a:endParaRPr lang="en-US" dirty="0">
               <a:solidFill>
@@ -26026,7 +28505,7 @@
                 <a:latin typeface="Calibri"/>
               </a:rPr>
               <a:pPr/>
-              <a:t>9/23/21</a:t>
+              <a:t>9/25/21</a:t>
             </a:fld>
             <a:endParaRPr lang="en-US" dirty="0">
               <a:solidFill>
@@ -26272,7 +28751,7 @@
                 <a:latin typeface="Calibri"/>
               </a:rPr>
               <a:pPr/>
-              <a:t>9/23/21</a:t>
+              <a:t>9/25/21</a:t>
             </a:fld>
             <a:endParaRPr lang="en-US" dirty="0">
               <a:solidFill>
@@ -26614,7 +29093,7 @@
                 <a:latin typeface="Calibri"/>
               </a:rPr>
               <a:pPr/>
-              <a:t>9/23/21</a:t>
+              <a:t>9/25/21</a:t>
             </a:fld>
             <a:endParaRPr lang="en-US" dirty="0">
               <a:solidFill>
@@ -26906,7 +29385,7 @@
                 <a:latin typeface="Calibri"/>
               </a:rPr>
               <a:pPr/>
-              <a:t>9/23/21</a:t>
+              <a:t>9/25/21</a:t>
             </a:fld>
             <a:endParaRPr lang="en-US" dirty="0">
               <a:solidFill>
@@ -27156,7 +29635,7 @@
                 <a:latin typeface="Calibri"/>
               </a:rPr>
               <a:pPr defTabSz="914400"/>
-              <a:t>9/23/21</a:t>
+              <a:t>9/25/21</a:t>
             </a:fld>
             <a:endParaRPr lang="en-US" dirty="0">
               <a:solidFill>
@@ -28036,6 +30515,126 @@
           </a:fontRef>
         </p:style>
       </p:cxnSp>
+      <p:pic>
+        <p:nvPicPr>
+          <p:cNvPr id="13" name="Picture 12">
+            <a:extLst>
+              <a:ext uri="{FF2B5EF4-FFF2-40B4-BE49-F238E27FC236}">
+                <a16:creationId xmlns:a16="http://schemas.microsoft.com/office/drawing/2014/main" id="{70F8766E-84EB-3141-9A99-6C082202FE9E}"/>
+              </a:ext>
+            </a:extLst>
+          </p:cNvPr>
+          <p:cNvPicPr>
+            <a:picLocks noChangeAspect="1"/>
+          </p:cNvPicPr>
+          <p:nvPr/>
+        </p:nvPicPr>
+        <p:blipFill>
+          <a:blip r:embed="rId4"/>
+          <a:stretch>
+            <a:fillRect/>
+          </a:stretch>
+        </p:blipFill>
+        <p:spPr>
+          <a:xfrm>
+            <a:off x="7658559" y="1245319"/>
+            <a:ext cx="251446" cy="203091"/>
+          </a:xfrm>
+          <a:prstGeom prst="rect">
+            <a:avLst/>
+          </a:prstGeom>
+        </p:spPr>
+      </p:pic>
+      <p:pic>
+        <p:nvPicPr>
+          <p:cNvPr id="14" name="Picture 13">
+            <a:extLst>
+              <a:ext uri="{FF2B5EF4-FFF2-40B4-BE49-F238E27FC236}">
+                <a16:creationId xmlns:a16="http://schemas.microsoft.com/office/drawing/2014/main" id="{50108AC8-4CD4-0242-80BE-9CAF792AB8C4}"/>
+              </a:ext>
+            </a:extLst>
+          </p:cNvPr>
+          <p:cNvPicPr>
+            <a:picLocks noChangeAspect="1"/>
+          </p:cNvPicPr>
+          <p:nvPr/>
+        </p:nvPicPr>
+        <p:blipFill>
+          <a:blip r:embed="rId5"/>
+          <a:stretch>
+            <a:fillRect/>
+          </a:stretch>
+        </p:blipFill>
+        <p:spPr>
+          <a:xfrm>
+            <a:off x="4929269" y="3158415"/>
+            <a:ext cx="268688" cy="217017"/>
+          </a:xfrm>
+          <a:prstGeom prst="rect">
+            <a:avLst/>
+          </a:prstGeom>
+        </p:spPr>
+      </p:pic>
+      <p:pic>
+        <p:nvPicPr>
+          <p:cNvPr id="15" name="Picture 14">
+            <a:extLst>
+              <a:ext uri="{FF2B5EF4-FFF2-40B4-BE49-F238E27FC236}">
+                <a16:creationId xmlns:a16="http://schemas.microsoft.com/office/drawing/2014/main" id="{D2933D79-2ED2-3045-BFB6-3339F671788F}"/>
+              </a:ext>
+            </a:extLst>
+          </p:cNvPr>
+          <p:cNvPicPr>
+            <a:picLocks noChangeAspect="1"/>
+          </p:cNvPicPr>
+          <p:nvPr/>
+        </p:nvPicPr>
+        <p:blipFill>
+          <a:blip r:embed="rId5"/>
+          <a:stretch>
+            <a:fillRect/>
+          </a:stretch>
+        </p:blipFill>
+        <p:spPr>
+          <a:xfrm>
+            <a:off x="6754729" y="3149280"/>
+            <a:ext cx="268688" cy="217017"/>
+          </a:xfrm>
+          <a:prstGeom prst="rect">
+            <a:avLst/>
+          </a:prstGeom>
+        </p:spPr>
+      </p:pic>
+      <p:pic>
+        <p:nvPicPr>
+          <p:cNvPr id="16" name="Picture 15">
+            <a:extLst>
+              <a:ext uri="{FF2B5EF4-FFF2-40B4-BE49-F238E27FC236}">
+                <a16:creationId xmlns:a16="http://schemas.microsoft.com/office/drawing/2014/main" id="{71315AB9-E0B8-294A-9342-8EB93C60BF4A}"/>
+              </a:ext>
+            </a:extLst>
+          </p:cNvPr>
+          <p:cNvPicPr>
+            <a:picLocks noChangeAspect="1"/>
+          </p:cNvPicPr>
+          <p:nvPr/>
+        </p:nvPicPr>
+        <p:blipFill>
+          <a:blip r:embed="rId5"/>
+          <a:stretch>
+            <a:fillRect/>
+          </a:stretch>
+        </p:blipFill>
+        <p:spPr>
+          <a:xfrm>
+            <a:off x="8562388" y="3149279"/>
+            <a:ext cx="268688" cy="217017"/>
+          </a:xfrm>
+          <a:prstGeom prst="rect">
+            <a:avLst/>
+          </a:prstGeom>
+        </p:spPr>
+      </p:pic>
     </p:spTree>
     <p:extLst>
       <p:ext uri="{BB962C8B-B14F-4D97-AF65-F5344CB8AC3E}">
@@ -28337,6 +30936,96 @@
           </a:fontRef>
         </p:style>
       </p:cxnSp>
+      <p:pic>
+        <p:nvPicPr>
+          <p:cNvPr id="13" name="Picture 12">
+            <a:extLst>
+              <a:ext uri="{FF2B5EF4-FFF2-40B4-BE49-F238E27FC236}">
+                <a16:creationId xmlns:a16="http://schemas.microsoft.com/office/drawing/2014/main" id="{9791CC2B-ACA6-2147-9298-5A323BBA0CF7}"/>
+              </a:ext>
+            </a:extLst>
+          </p:cNvPr>
+          <p:cNvPicPr>
+            <a:picLocks noChangeAspect="1"/>
+          </p:cNvPicPr>
+          <p:nvPr/>
+        </p:nvPicPr>
+        <p:blipFill>
+          <a:blip r:embed="rId4"/>
+          <a:stretch>
+            <a:fillRect/>
+          </a:stretch>
+        </p:blipFill>
+        <p:spPr>
+          <a:xfrm>
+            <a:off x="7658559" y="1245319"/>
+            <a:ext cx="251446" cy="203091"/>
+          </a:xfrm>
+          <a:prstGeom prst="rect">
+            <a:avLst/>
+          </a:prstGeom>
+        </p:spPr>
+      </p:pic>
+      <p:pic>
+        <p:nvPicPr>
+          <p:cNvPr id="14" name="Picture 13">
+            <a:extLst>
+              <a:ext uri="{FF2B5EF4-FFF2-40B4-BE49-F238E27FC236}">
+                <a16:creationId xmlns:a16="http://schemas.microsoft.com/office/drawing/2014/main" id="{91A19C76-BFC9-534B-9906-6F8D9DBD6497}"/>
+              </a:ext>
+            </a:extLst>
+          </p:cNvPr>
+          <p:cNvPicPr>
+            <a:picLocks noChangeAspect="1"/>
+          </p:cNvPicPr>
+          <p:nvPr/>
+        </p:nvPicPr>
+        <p:blipFill>
+          <a:blip r:embed="rId5"/>
+          <a:stretch>
+            <a:fillRect/>
+          </a:stretch>
+        </p:blipFill>
+        <p:spPr>
+          <a:xfrm>
+            <a:off x="4929269" y="3158415"/>
+            <a:ext cx="268688" cy="217017"/>
+          </a:xfrm>
+          <a:prstGeom prst="rect">
+            <a:avLst/>
+          </a:prstGeom>
+        </p:spPr>
+      </p:pic>
+      <p:pic>
+        <p:nvPicPr>
+          <p:cNvPr id="15" name="Picture 14">
+            <a:extLst>
+              <a:ext uri="{FF2B5EF4-FFF2-40B4-BE49-F238E27FC236}">
+                <a16:creationId xmlns:a16="http://schemas.microsoft.com/office/drawing/2014/main" id="{90274A8A-914E-C34A-8DA3-EE22ED51F40E}"/>
+              </a:ext>
+            </a:extLst>
+          </p:cNvPr>
+          <p:cNvPicPr>
+            <a:picLocks noChangeAspect="1"/>
+          </p:cNvPicPr>
+          <p:nvPr/>
+        </p:nvPicPr>
+        <p:blipFill>
+          <a:blip r:embed="rId5"/>
+          <a:stretch>
+            <a:fillRect/>
+          </a:stretch>
+        </p:blipFill>
+        <p:spPr>
+          <a:xfrm>
+            <a:off x="8571362" y="3151972"/>
+            <a:ext cx="268688" cy="217017"/>
+          </a:xfrm>
+          <a:prstGeom prst="rect">
+            <a:avLst/>
+          </a:prstGeom>
+        </p:spPr>
+      </p:pic>
       <p:cxnSp>
         <p:nvCxnSpPr>
           <p:cNvPr id="10" name="Straight Connector 9">
@@ -28380,6 +31069,36 @@
           </a:fontRef>
         </p:style>
       </p:cxnSp>
+      <p:pic>
+        <p:nvPicPr>
+          <p:cNvPr id="17" name="Picture 16">
+            <a:extLst>
+              <a:ext uri="{FF2B5EF4-FFF2-40B4-BE49-F238E27FC236}">
+                <a16:creationId xmlns:a16="http://schemas.microsoft.com/office/drawing/2014/main" id="{C6215B75-BF78-8547-B623-EEEE7C57A35F}"/>
+              </a:ext>
+            </a:extLst>
+          </p:cNvPr>
+          <p:cNvPicPr>
+            <a:picLocks noChangeAspect="1"/>
+          </p:cNvPicPr>
+          <p:nvPr/>
+        </p:nvPicPr>
+        <p:blipFill>
+          <a:blip r:embed="rId5"/>
+          <a:stretch>
+            <a:fillRect/>
+          </a:stretch>
+        </p:blipFill>
+        <p:spPr>
+          <a:xfrm>
+            <a:off x="6743526" y="3141434"/>
+            <a:ext cx="268688" cy="217017"/>
+          </a:xfrm>
+          <a:prstGeom prst="rect">
+            <a:avLst/>
+          </a:prstGeom>
+        </p:spPr>
+      </p:pic>
       <p:cxnSp>
         <p:nvCxnSpPr>
           <p:cNvPr id="12" name="Straight Connector 11">
@@ -28685,6 +31404,36 @@
           </a:fontRef>
         </p:style>
       </p:cxnSp>
+      <p:pic>
+        <p:nvPicPr>
+          <p:cNvPr id="8" name="Picture 7">
+            <a:extLst>
+              <a:ext uri="{FF2B5EF4-FFF2-40B4-BE49-F238E27FC236}">
+                <a16:creationId xmlns:a16="http://schemas.microsoft.com/office/drawing/2014/main" id="{850243AA-F72E-1840-8C36-FF302B5570C3}"/>
+              </a:ext>
+            </a:extLst>
+          </p:cNvPr>
+          <p:cNvPicPr>
+            <a:picLocks noChangeAspect="1"/>
+          </p:cNvPicPr>
+          <p:nvPr/>
+        </p:nvPicPr>
+        <p:blipFill>
+          <a:blip r:embed="rId4"/>
+          <a:stretch>
+            <a:fillRect/>
+          </a:stretch>
+        </p:blipFill>
+        <p:spPr>
+          <a:xfrm>
+            <a:off x="7658559" y="1245319"/>
+            <a:ext cx="251446" cy="203091"/>
+          </a:xfrm>
+          <a:prstGeom prst="rect">
+            <a:avLst/>
+          </a:prstGeom>
+        </p:spPr>
+      </p:pic>
       <p:cxnSp>
         <p:nvCxnSpPr>
           <p:cNvPr id="13" name="Straight Connector 12">
@@ -28728,6 +31477,96 @@
           </a:fontRef>
         </p:style>
       </p:cxnSp>
+      <p:pic>
+        <p:nvPicPr>
+          <p:cNvPr id="9" name="Picture 8">
+            <a:extLst>
+              <a:ext uri="{FF2B5EF4-FFF2-40B4-BE49-F238E27FC236}">
+                <a16:creationId xmlns:a16="http://schemas.microsoft.com/office/drawing/2014/main" id="{6E9112B5-1228-F241-8989-B2EB007AFBA2}"/>
+              </a:ext>
+            </a:extLst>
+          </p:cNvPr>
+          <p:cNvPicPr>
+            <a:picLocks noChangeAspect="1"/>
+          </p:cNvPicPr>
+          <p:nvPr/>
+        </p:nvPicPr>
+        <p:blipFill>
+          <a:blip r:embed="rId5"/>
+          <a:stretch>
+            <a:fillRect/>
+          </a:stretch>
+        </p:blipFill>
+        <p:spPr>
+          <a:xfrm>
+            <a:off x="4929269" y="3158415"/>
+            <a:ext cx="268688" cy="217017"/>
+          </a:xfrm>
+          <a:prstGeom prst="rect">
+            <a:avLst/>
+          </a:prstGeom>
+        </p:spPr>
+      </p:pic>
+      <p:pic>
+        <p:nvPicPr>
+          <p:cNvPr id="10" name="Picture 9">
+            <a:extLst>
+              <a:ext uri="{FF2B5EF4-FFF2-40B4-BE49-F238E27FC236}">
+                <a16:creationId xmlns:a16="http://schemas.microsoft.com/office/drawing/2014/main" id="{691B779D-0ED8-C04F-9A5B-095FD8AFD94A}"/>
+              </a:ext>
+            </a:extLst>
+          </p:cNvPr>
+          <p:cNvPicPr>
+            <a:picLocks noChangeAspect="1"/>
+          </p:cNvPicPr>
+          <p:nvPr/>
+        </p:nvPicPr>
+        <p:blipFill>
+          <a:blip r:embed="rId5"/>
+          <a:stretch>
+            <a:fillRect/>
+          </a:stretch>
+        </p:blipFill>
+        <p:spPr>
+          <a:xfrm>
+            <a:off x="6727292" y="3132279"/>
+            <a:ext cx="268688" cy="217017"/>
+          </a:xfrm>
+          <a:prstGeom prst="rect">
+            <a:avLst/>
+          </a:prstGeom>
+        </p:spPr>
+      </p:pic>
+      <p:pic>
+        <p:nvPicPr>
+          <p:cNvPr id="12" name="Picture 11">
+            <a:extLst>
+              <a:ext uri="{FF2B5EF4-FFF2-40B4-BE49-F238E27FC236}">
+                <a16:creationId xmlns:a16="http://schemas.microsoft.com/office/drawing/2014/main" id="{8080A376-0D77-7B45-AE27-59C1CAD00628}"/>
+              </a:ext>
+            </a:extLst>
+          </p:cNvPr>
+          <p:cNvPicPr>
+            <a:picLocks noChangeAspect="1"/>
+          </p:cNvPicPr>
+          <p:nvPr/>
+        </p:nvPicPr>
+        <p:blipFill>
+          <a:blip r:embed="rId5"/>
+          <a:stretch>
+            <a:fillRect/>
+          </a:stretch>
+        </p:blipFill>
+        <p:spPr>
+          <a:xfrm>
+            <a:off x="8544341" y="3158414"/>
+            <a:ext cx="268688" cy="217017"/>
+          </a:xfrm>
+          <a:prstGeom prst="rect">
+            <a:avLst/>
+          </a:prstGeom>
+        </p:spPr>
+      </p:pic>
     </p:spTree>
     <p:extLst>
       <p:ext uri="{BB962C8B-B14F-4D97-AF65-F5344CB8AC3E}">
@@ -29089,6 +31928,126 @@
           </a:fontRef>
         </p:style>
       </p:cxnSp>
+      <p:pic>
+        <p:nvPicPr>
+          <p:cNvPr id="13" name="Picture 12">
+            <a:extLst>
+              <a:ext uri="{FF2B5EF4-FFF2-40B4-BE49-F238E27FC236}">
+                <a16:creationId xmlns:a16="http://schemas.microsoft.com/office/drawing/2014/main" id="{5FBC924D-1AF7-E847-ADCF-5B7DA5F37AD7}"/>
+              </a:ext>
+            </a:extLst>
+          </p:cNvPr>
+          <p:cNvPicPr>
+            <a:picLocks noChangeAspect="1"/>
+          </p:cNvPicPr>
+          <p:nvPr/>
+        </p:nvPicPr>
+        <p:blipFill>
+          <a:blip r:embed="rId4"/>
+          <a:stretch>
+            <a:fillRect/>
+          </a:stretch>
+        </p:blipFill>
+        <p:spPr>
+          <a:xfrm>
+            <a:off x="7658559" y="1245319"/>
+            <a:ext cx="251446" cy="203091"/>
+          </a:xfrm>
+          <a:prstGeom prst="rect">
+            <a:avLst/>
+          </a:prstGeom>
+        </p:spPr>
+      </p:pic>
+      <p:pic>
+        <p:nvPicPr>
+          <p:cNvPr id="14" name="Picture 13">
+            <a:extLst>
+              <a:ext uri="{FF2B5EF4-FFF2-40B4-BE49-F238E27FC236}">
+                <a16:creationId xmlns:a16="http://schemas.microsoft.com/office/drawing/2014/main" id="{3AFBEF55-D5FC-7446-886A-84D62EC40517}"/>
+              </a:ext>
+            </a:extLst>
+          </p:cNvPr>
+          <p:cNvPicPr>
+            <a:picLocks noChangeAspect="1"/>
+          </p:cNvPicPr>
+          <p:nvPr/>
+        </p:nvPicPr>
+        <p:blipFill>
+          <a:blip r:embed="rId5"/>
+          <a:stretch>
+            <a:fillRect/>
+          </a:stretch>
+        </p:blipFill>
+        <p:spPr>
+          <a:xfrm>
+            <a:off x="4922078" y="3145234"/>
+            <a:ext cx="268688" cy="217017"/>
+          </a:xfrm>
+          <a:prstGeom prst="rect">
+            <a:avLst/>
+          </a:prstGeom>
+        </p:spPr>
+      </p:pic>
+      <p:pic>
+        <p:nvPicPr>
+          <p:cNvPr id="15" name="Picture 14">
+            <a:extLst>
+              <a:ext uri="{FF2B5EF4-FFF2-40B4-BE49-F238E27FC236}">
+                <a16:creationId xmlns:a16="http://schemas.microsoft.com/office/drawing/2014/main" id="{D9E35CD5-9090-AE44-803F-1C405F4FDDD8}"/>
+              </a:ext>
+            </a:extLst>
+          </p:cNvPr>
+          <p:cNvPicPr>
+            <a:picLocks noChangeAspect="1"/>
+          </p:cNvPicPr>
+          <p:nvPr/>
+        </p:nvPicPr>
+        <p:blipFill>
+          <a:blip r:embed="rId5"/>
+          <a:stretch>
+            <a:fillRect/>
+          </a:stretch>
+        </p:blipFill>
+        <p:spPr>
+          <a:xfrm>
+            <a:off x="6754729" y="3145236"/>
+            <a:ext cx="268688" cy="217017"/>
+          </a:xfrm>
+          <a:prstGeom prst="rect">
+            <a:avLst/>
+          </a:prstGeom>
+        </p:spPr>
+      </p:pic>
+      <p:pic>
+        <p:nvPicPr>
+          <p:cNvPr id="16" name="Picture 15">
+            <a:extLst>
+              <a:ext uri="{FF2B5EF4-FFF2-40B4-BE49-F238E27FC236}">
+                <a16:creationId xmlns:a16="http://schemas.microsoft.com/office/drawing/2014/main" id="{30EE0C6E-1301-A144-A933-44F6ABFA8B97}"/>
+              </a:ext>
+            </a:extLst>
+          </p:cNvPr>
+          <p:cNvPicPr>
+            <a:picLocks noChangeAspect="1"/>
+          </p:cNvPicPr>
+          <p:nvPr/>
+        </p:nvPicPr>
+        <p:blipFill>
+          <a:blip r:embed="rId5"/>
+          <a:stretch>
+            <a:fillRect/>
+          </a:stretch>
+        </p:blipFill>
+        <p:spPr>
+          <a:xfrm>
+            <a:off x="8580189" y="3145235"/>
+            <a:ext cx="268688" cy="217017"/>
+          </a:xfrm>
+          <a:prstGeom prst="rect">
+            <a:avLst/>
+          </a:prstGeom>
+        </p:spPr>
+      </p:pic>
       <p:cxnSp>
         <p:nvCxnSpPr>
           <p:cNvPr id="12" name="Straight Connector 11">
@@ -29385,6 +32344,126 @@
           <a:xfrm>
             <a:off x="4040184" y="563845"/>
             <a:ext cx="5043438" cy="3392858"/>
+          </a:xfrm>
+          <a:prstGeom prst="rect">
+            <a:avLst/>
+          </a:prstGeom>
+        </p:spPr>
+      </p:pic>
+      <p:pic>
+        <p:nvPicPr>
+          <p:cNvPr id="6" name="Picture 5">
+            <a:extLst>
+              <a:ext uri="{FF2B5EF4-FFF2-40B4-BE49-F238E27FC236}">
+                <a16:creationId xmlns:a16="http://schemas.microsoft.com/office/drawing/2014/main" id="{DEDFE68F-81D0-DC4F-8EAC-AF08053E6BE1}"/>
+              </a:ext>
+            </a:extLst>
+          </p:cNvPr>
+          <p:cNvPicPr>
+            <a:picLocks noChangeAspect="1"/>
+          </p:cNvPicPr>
+          <p:nvPr/>
+        </p:nvPicPr>
+        <p:blipFill>
+          <a:blip r:embed="rId4"/>
+          <a:stretch>
+            <a:fillRect/>
+          </a:stretch>
+        </p:blipFill>
+        <p:spPr>
+          <a:xfrm>
+            <a:off x="7658559" y="1245319"/>
+            <a:ext cx="251446" cy="203091"/>
+          </a:xfrm>
+          <a:prstGeom prst="rect">
+            <a:avLst/>
+          </a:prstGeom>
+        </p:spPr>
+      </p:pic>
+      <p:pic>
+        <p:nvPicPr>
+          <p:cNvPr id="7" name="Picture 6">
+            <a:extLst>
+              <a:ext uri="{FF2B5EF4-FFF2-40B4-BE49-F238E27FC236}">
+                <a16:creationId xmlns:a16="http://schemas.microsoft.com/office/drawing/2014/main" id="{2A3BC4F5-9F9F-5444-9404-F2FAEF0607FD}"/>
+              </a:ext>
+            </a:extLst>
+          </p:cNvPr>
+          <p:cNvPicPr>
+            <a:picLocks noChangeAspect="1"/>
+          </p:cNvPicPr>
+          <p:nvPr/>
+        </p:nvPicPr>
+        <p:blipFill>
+          <a:blip r:embed="rId5"/>
+          <a:stretch>
+            <a:fillRect/>
+          </a:stretch>
+        </p:blipFill>
+        <p:spPr>
+          <a:xfrm>
+            <a:off x="4929269" y="3158415"/>
+            <a:ext cx="268688" cy="217017"/>
+          </a:xfrm>
+          <a:prstGeom prst="rect">
+            <a:avLst/>
+          </a:prstGeom>
+        </p:spPr>
+      </p:pic>
+      <p:pic>
+        <p:nvPicPr>
+          <p:cNvPr id="8" name="Picture 7">
+            <a:extLst>
+              <a:ext uri="{FF2B5EF4-FFF2-40B4-BE49-F238E27FC236}">
+                <a16:creationId xmlns:a16="http://schemas.microsoft.com/office/drawing/2014/main" id="{B3B7E696-5576-5641-A781-74CE1AF970F2}"/>
+              </a:ext>
+            </a:extLst>
+          </p:cNvPr>
+          <p:cNvPicPr>
+            <a:picLocks noChangeAspect="1"/>
+          </p:cNvPicPr>
+          <p:nvPr/>
+        </p:nvPicPr>
+        <p:blipFill>
+          <a:blip r:embed="rId5"/>
+          <a:stretch>
+            <a:fillRect/>
+          </a:stretch>
+        </p:blipFill>
+        <p:spPr>
+          <a:xfrm>
+            <a:off x="8539205" y="3149281"/>
+            <a:ext cx="268688" cy="217017"/>
+          </a:xfrm>
+          <a:prstGeom prst="rect">
+            <a:avLst/>
+          </a:prstGeom>
+        </p:spPr>
+      </p:pic>
+      <p:pic>
+        <p:nvPicPr>
+          <p:cNvPr id="9" name="Picture 8">
+            <a:extLst>
+              <a:ext uri="{FF2B5EF4-FFF2-40B4-BE49-F238E27FC236}">
+                <a16:creationId xmlns:a16="http://schemas.microsoft.com/office/drawing/2014/main" id="{66113841-010B-394B-90A3-B24C619E5F7A}"/>
+              </a:ext>
+            </a:extLst>
+          </p:cNvPr>
+          <p:cNvPicPr>
+            <a:picLocks noChangeAspect="1"/>
+          </p:cNvPicPr>
+          <p:nvPr/>
+        </p:nvPicPr>
+        <p:blipFill>
+          <a:blip r:embed="rId5"/>
+          <a:stretch>
+            <a:fillRect/>
+          </a:stretch>
+        </p:blipFill>
+        <p:spPr>
+          <a:xfrm>
+            <a:off x="6737757" y="3149281"/>
+            <a:ext cx="268688" cy="217017"/>
           </a:xfrm>
           <a:prstGeom prst="rect">
             <a:avLst/>
@@ -29645,6 +32724,126 @@
           </a:prstGeom>
         </p:spPr>
       </p:pic>
+      <p:pic>
+        <p:nvPicPr>
+          <p:cNvPr id="8" name="Picture 7">
+            <a:extLst>
+              <a:ext uri="{FF2B5EF4-FFF2-40B4-BE49-F238E27FC236}">
+                <a16:creationId xmlns:a16="http://schemas.microsoft.com/office/drawing/2014/main" id="{DE50B1D6-BC48-C14B-B512-BD14168588AD}"/>
+              </a:ext>
+            </a:extLst>
+          </p:cNvPr>
+          <p:cNvPicPr>
+            <a:picLocks noChangeAspect="1"/>
+          </p:cNvPicPr>
+          <p:nvPr/>
+        </p:nvPicPr>
+        <p:blipFill>
+          <a:blip r:embed="rId4"/>
+          <a:stretch>
+            <a:fillRect/>
+          </a:stretch>
+        </p:blipFill>
+        <p:spPr>
+          <a:xfrm>
+            <a:off x="7448364" y="1543052"/>
+            <a:ext cx="251446" cy="203091"/>
+          </a:xfrm>
+          <a:prstGeom prst="rect">
+            <a:avLst/>
+          </a:prstGeom>
+        </p:spPr>
+      </p:pic>
+      <p:pic>
+        <p:nvPicPr>
+          <p:cNvPr id="9" name="Picture 8">
+            <a:extLst>
+              <a:ext uri="{FF2B5EF4-FFF2-40B4-BE49-F238E27FC236}">
+                <a16:creationId xmlns:a16="http://schemas.microsoft.com/office/drawing/2014/main" id="{6A407332-73F1-CC4B-A525-24106D93C47C}"/>
+              </a:ext>
+            </a:extLst>
+          </p:cNvPr>
+          <p:cNvPicPr>
+            <a:picLocks noChangeAspect="1"/>
+          </p:cNvPicPr>
+          <p:nvPr/>
+        </p:nvPicPr>
+        <p:blipFill>
+          <a:blip r:embed="rId5"/>
+          <a:stretch>
+            <a:fillRect/>
+          </a:stretch>
+        </p:blipFill>
+        <p:spPr>
+          <a:xfrm>
+            <a:off x="8330069" y="3492089"/>
+            <a:ext cx="268688" cy="217017"/>
+          </a:xfrm>
+          <a:prstGeom prst="rect">
+            <a:avLst/>
+          </a:prstGeom>
+        </p:spPr>
+      </p:pic>
+      <p:pic>
+        <p:nvPicPr>
+          <p:cNvPr id="10" name="Picture 9">
+            <a:extLst>
+              <a:ext uri="{FF2B5EF4-FFF2-40B4-BE49-F238E27FC236}">
+                <a16:creationId xmlns:a16="http://schemas.microsoft.com/office/drawing/2014/main" id="{446E3FCB-CF46-5E44-93B2-418BCC9DD496}"/>
+              </a:ext>
+            </a:extLst>
+          </p:cNvPr>
+          <p:cNvPicPr>
+            <a:picLocks noChangeAspect="1"/>
+          </p:cNvPicPr>
+          <p:nvPr/>
+        </p:nvPicPr>
+        <p:blipFill>
+          <a:blip r:embed="rId5"/>
+          <a:stretch>
+            <a:fillRect/>
+          </a:stretch>
+        </p:blipFill>
+        <p:spPr>
+          <a:xfrm>
+            <a:off x="4687115" y="3492090"/>
+            <a:ext cx="268688" cy="217017"/>
+          </a:xfrm>
+          <a:prstGeom prst="rect">
+            <a:avLst/>
+          </a:prstGeom>
+        </p:spPr>
+      </p:pic>
+      <p:pic>
+        <p:nvPicPr>
+          <p:cNvPr id="12" name="Picture 11">
+            <a:extLst>
+              <a:ext uri="{FF2B5EF4-FFF2-40B4-BE49-F238E27FC236}">
+                <a16:creationId xmlns:a16="http://schemas.microsoft.com/office/drawing/2014/main" id="{D9C550D2-41B3-3649-B73C-0199CAF917C4}"/>
+              </a:ext>
+            </a:extLst>
+          </p:cNvPr>
+          <p:cNvPicPr>
+            <a:picLocks noChangeAspect="1"/>
+          </p:cNvPicPr>
+          <p:nvPr/>
+        </p:nvPicPr>
+        <p:blipFill>
+          <a:blip r:embed="rId5"/>
+          <a:stretch>
+            <a:fillRect/>
+          </a:stretch>
+        </p:blipFill>
+        <p:spPr>
+          <a:xfrm>
+            <a:off x="6508592" y="3500477"/>
+            <a:ext cx="268688" cy="217017"/>
+          </a:xfrm>
+          <a:prstGeom prst="rect">
+            <a:avLst/>
+          </a:prstGeom>
+        </p:spPr>
+      </p:pic>
     </p:spTree>
     <p:extLst>
       <p:ext uri="{BB962C8B-B14F-4D97-AF65-F5344CB8AC3E}">
@@ -29744,15 +32943,15 @@
             </a:pPr>
             <a:r>
               <a:rPr lang="en-US" dirty="0"/>
-              <a:t>Point the bins ‘</a:t>
-            </a:r>
-            <a:r>
-              <a:rPr lang="en-US" i="1" dirty="0"/>
-              <a:t>bck</a:t>
+              <a:t>Point the </a:t>
+            </a:r>
+            <a:r>
+              <a:rPr lang="en-US" b="1" i="1" u="sng" dirty="0"/>
+              <a:t>bins ‘bk’</a:t>
             </a:r>
             <a:r>
               <a:rPr lang="en-US" dirty="0"/>
-              <a:t>’ to the </a:t>
+              <a:t> to the </a:t>
             </a:r>
             <a:r>
               <a:rPr lang="en-US" b="1" i="1" dirty="0"/>
@@ -29782,7 +32981,7 @@
             </a:r>
             <a:r>
               <a:rPr lang="en-US" dirty="0"/>
-              <a:t>’ to the </a:t>
+              <a:t>’’ to the </a:t>
             </a:r>
             <a:r>
               <a:rPr lang="en-US" i="1" dirty="0"/>
@@ -29938,6 +33137,126 @@
           </a:p>
         </p:txBody>
       </p:sp>
+      <p:pic>
+        <p:nvPicPr>
+          <p:cNvPr id="7" name="Picture 6">
+            <a:extLst>
+              <a:ext uri="{FF2B5EF4-FFF2-40B4-BE49-F238E27FC236}">
+                <a16:creationId xmlns:a16="http://schemas.microsoft.com/office/drawing/2014/main" id="{5257E9EE-B094-AD49-813D-0949B52694D4}"/>
+              </a:ext>
+            </a:extLst>
+          </p:cNvPr>
+          <p:cNvPicPr>
+            <a:picLocks noChangeAspect="1"/>
+          </p:cNvPicPr>
+          <p:nvPr/>
+        </p:nvPicPr>
+        <p:blipFill>
+          <a:blip r:embed="rId4"/>
+          <a:stretch>
+            <a:fillRect/>
+          </a:stretch>
+        </p:blipFill>
+        <p:spPr>
+          <a:xfrm>
+            <a:off x="7371610" y="1660784"/>
+            <a:ext cx="251446" cy="203091"/>
+          </a:xfrm>
+          <a:prstGeom prst="rect">
+            <a:avLst/>
+          </a:prstGeom>
+        </p:spPr>
+      </p:pic>
+      <p:pic>
+        <p:nvPicPr>
+          <p:cNvPr id="9" name="Picture 8">
+            <a:extLst>
+              <a:ext uri="{FF2B5EF4-FFF2-40B4-BE49-F238E27FC236}">
+                <a16:creationId xmlns:a16="http://schemas.microsoft.com/office/drawing/2014/main" id="{A656E753-4C73-C346-BE70-5A7E9C1D344A}"/>
+              </a:ext>
+            </a:extLst>
+          </p:cNvPr>
+          <p:cNvPicPr>
+            <a:picLocks noChangeAspect="1"/>
+          </p:cNvPicPr>
+          <p:nvPr/>
+        </p:nvPicPr>
+        <p:blipFill>
+          <a:blip r:embed="rId5"/>
+          <a:stretch>
+            <a:fillRect/>
+          </a:stretch>
+        </p:blipFill>
+        <p:spPr>
+          <a:xfrm>
+            <a:off x="4602437" y="3513050"/>
+            <a:ext cx="268688" cy="217017"/>
+          </a:xfrm>
+          <a:prstGeom prst="rect">
+            <a:avLst/>
+          </a:prstGeom>
+        </p:spPr>
+      </p:pic>
+      <p:pic>
+        <p:nvPicPr>
+          <p:cNvPr id="10" name="Picture 9">
+            <a:extLst>
+              <a:ext uri="{FF2B5EF4-FFF2-40B4-BE49-F238E27FC236}">
+                <a16:creationId xmlns:a16="http://schemas.microsoft.com/office/drawing/2014/main" id="{FFBEBF70-E1AE-7B47-9180-406A0ABA01F6}"/>
+              </a:ext>
+            </a:extLst>
+          </p:cNvPr>
+          <p:cNvPicPr>
+            <a:picLocks noChangeAspect="1"/>
+          </p:cNvPicPr>
+          <p:nvPr/>
+        </p:nvPicPr>
+        <p:blipFill>
+          <a:blip r:embed="rId5"/>
+          <a:stretch>
+            <a:fillRect/>
+          </a:stretch>
+        </p:blipFill>
+        <p:spPr>
+          <a:xfrm>
+            <a:off x="8248100" y="3532711"/>
+            <a:ext cx="268688" cy="217017"/>
+          </a:xfrm>
+          <a:prstGeom prst="rect">
+            <a:avLst/>
+          </a:prstGeom>
+        </p:spPr>
+      </p:pic>
+      <p:pic>
+        <p:nvPicPr>
+          <p:cNvPr id="12" name="Picture 11">
+            <a:extLst>
+              <a:ext uri="{FF2B5EF4-FFF2-40B4-BE49-F238E27FC236}">
+                <a16:creationId xmlns:a16="http://schemas.microsoft.com/office/drawing/2014/main" id="{9C73DA08-9913-9F4F-B4FB-BB591A7B6A25}"/>
+              </a:ext>
+            </a:extLst>
+          </p:cNvPr>
+          <p:cNvPicPr>
+            <a:picLocks noChangeAspect="1"/>
+          </p:cNvPicPr>
+          <p:nvPr/>
+        </p:nvPicPr>
+        <p:blipFill>
+          <a:blip r:embed="rId5"/>
+          <a:stretch>
+            <a:fillRect/>
+          </a:stretch>
+        </p:blipFill>
+        <p:spPr>
+          <a:xfrm>
+            <a:off x="6415910" y="3540560"/>
+            <a:ext cx="268688" cy="217017"/>
+          </a:xfrm>
+          <a:prstGeom prst="rect">
+            <a:avLst/>
+          </a:prstGeom>
+        </p:spPr>
+      </p:pic>
     </p:spTree>
     <p:extLst>
       <p:ext uri="{BB962C8B-B14F-4D97-AF65-F5344CB8AC3E}">
@@ -30247,6 +33566,126 @@
           </a:fontRef>
         </p:style>
       </p:cxnSp>
+      <p:pic>
+        <p:nvPicPr>
+          <p:cNvPr id="8" name="Picture 7">
+            <a:extLst>
+              <a:ext uri="{FF2B5EF4-FFF2-40B4-BE49-F238E27FC236}">
+                <a16:creationId xmlns:a16="http://schemas.microsoft.com/office/drawing/2014/main" id="{EF54DE84-3080-004C-B257-A1E99935FD82}"/>
+              </a:ext>
+            </a:extLst>
+          </p:cNvPr>
+          <p:cNvPicPr>
+            <a:picLocks noChangeAspect="1"/>
+          </p:cNvPicPr>
+          <p:nvPr/>
+        </p:nvPicPr>
+        <p:blipFill>
+          <a:blip r:embed="rId4"/>
+          <a:stretch>
+            <a:fillRect/>
+          </a:stretch>
+        </p:blipFill>
+        <p:spPr>
+          <a:xfrm>
+            <a:off x="7539520" y="1987784"/>
+            <a:ext cx="251446" cy="203091"/>
+          </a:xfrm>
+          <a:prstGeom prst="rect">
+            <a:avLst/>
+          </a:prstGeom>
+        </p:spPr>
+      </p:pic>
+      <p:pic>
+        <p:nvPicPr>
+          <p:cNvPr id="12" name="Picture 11">
+            <a:extLst>
+              <a:ext uri="{FF2B5EF4-FFF2-40B4-BE49-F238E27FC236}">
+                <a16:creationId xmlns:a16="http://schemas.microsoft.com/office/drawing/2014/main" id="{23174A21-3A12-A049-A7B2-A8055A09F19E}"/>
+              </a:ext>
+            </a:extLst>
+          </p:cNvPr>
+          <p:cNvPicPr>
+            <a:picLocks noChangeAspect="1"/>
+          </p:cNvPicPr>
+          <p:nvPr/>
+        </p:nvPicPr>
+        <p:blipFill>
+          <a:blip r:embed="rId5"/>
+          <a:stretch>
+            <a:fillRect/>
+          </a:stretch>
+        </p:blipFill>
+        <p:spPr>
+          <a:xfrm>
+            <a:off x="4738167" y="3941142"/>
+            <a:ext cx="268688" cy="217017"/>
+          </a:xfrm>
+          <a:prstGeom prst="rect">
+            <a:avLst/>
+          </a:prstGeom>
+        </p:spPr>
+      </p:pic>
+      <p:pic>
+        <p:nvPicPr>
+          <p:cNvPr id="13" name="Picture 12">
+            <a:extLst>
+              <a:ext uri="{FF2B5EF4-FFF2-40B4-BE49-F238E27FC236}">
+                <a16:creationId xmlns:a16="http://schemas.microsoft.com/office/drawing/2014/main" id="{10C3DD27-54FC-6644-9E22-FAFFBB3523DB}"/>
+              </a:ext>
+            </a:extLst>
+          </p:cNvPr>
+          <p:cNvPicPr>
+            <a:picLocks noChangeAspect="1"/>
+          </p:cNvPicPr>
+          <p:nvPr/>
+        </p:nvPicPr>
+        <p:blipFill>
+          <a:blip r:embed="rId5"/>
+          <a:stretch>
+            <a:fillRect/>
+          </a:stretch>
+        </p:blipFill>
+        <p:spPr>
+          <a:xfrm>
+            <a:off x="8436059" y="3930590"/>
+            <a:ext cx="268688" cy="217017"/>
+          </a:xfrm>
+          <a:prstGeom prst="rect">
+            <a:avLst/>
+          </a:prstGeom>
+        </p:spPr>
+      </p:pic>
+      <p:pic>
+        <p:nvPicPr>
+          <p:cNvPr id="14" name="Picture 13">
+            <a:extLst>
+              <a:ext uri="{FF2B5EF4-FFF2-40B4-BE49-F238E27FC236}">
+                <a16:creationId xmlns:a16="http://schemas.microsoft.com/office/drawing/2014/main" id="{1805BDC3-E395-3846-9128-67102808039F}"/>
+              </a:ext>
+            </a:extLst>
+          </p:cNvPr>
+          <p:cNvPicPr>
+            <a:picLocks noChangeAspect="1"/>
+          </p:cNvPicPr>
+          <p:nvPr/>
+        </p:nvPicPr>
+        <p:blipFill>
+          <a:blip r:embed="rId5"/>
+          <a:stretch>
+            <a:fillRect/>
+          </a:stretch>
+        </p:blipFill>
+        <p:spPr>
+          <a:xfrm>
+            <a:off x="6587113" y="3953284"/>
+            <a:ext cx="268688" cy="217017"/>
+          </a:xfrm>
+          <a:prstGeom prst="rect">
+            <a:avLst/>
+          </a:prstGeom>
+        </p:spPr>
+      </p:pic>
     </p:spTree>
     <p:extLst>
       <p:ext uri="{BB962C8B-B14F-4D97-AF65-F5344CB8AC3E}">
@@ -30497,6 +33936,126 @@
           </a:prstGeom>
         </p:spPr>
       </p:pic>
+      <p:pic>
+        <p:nvPicPr>
+          <p:cNvPr id="6" name="Picture 5">
+            <a:extLst>
+              <a:ext uri="{FF2B5EF4-FFF2-40B4-BE49-F238E27FC236}">
+                <a16:creationId xmlns:a16="http://schemas.microsoft.com/office/drawing/2014/main" id="{6809F216-84AF-EB45-85DE-9A78F4EBDF7D}"/>
+              </a:ext>
+            </a:extLst>
+          </p:cNvPr>
+          <p:cNvPicPr>
+            <a:picLocks noChangeAspect="1"/>
+          </p:cNvPicPr>
+          <p:nvPr/>
+        </p:nvPicPr>
+        <p:blipFill>
+          <a:blip r:embed="rId4"/>
+          <a:stretch>
+            <a:fillRect/>
+          </a:stretch>
+        </p:blipFill>
+        <p:spPr>
+          <a:xfrm>
+            <a:off x="7265484" y="1849528"/>
+            <a:ext cx="251446" cy="203091"/>
+          </a:xfrm>
+          <a:prstGeom prst="rect">
+            <a:avLst/>
+          </a:prstGeom>
+        </p:spPr>
+      </p:pic>
+      <p:pic>
+        <p:nvPicPr>
+          <p:cNvPr id="7" name="Picture 6">
+            <a:extLst>
+              <a:ext uri="{FF2B5EF4-FFF2-40B4-BE49-F238E27FC236}">
+                <a16:creationId xmlns:a16="http://schemas.microsoft.com/office/drawing/2014/main" id="{9E5E0095-6404-F445-AA90-5BDAE74EB1B7}"/>
+              </a:ext>
+            </a:extLst>
+          </p:cNvPr>
+          <p:cNvPicPr>
+            <a:picLocks noChangeAspect="1"/>
+          </p:cNvPicPr>
+          <p:nvPr/>
+        </p:nvPicPr>
+        <p:blipFill>
+          <a:blip r:embed="rId5"/>
+          <a:stretch>
+            <a:fillRect/>
+          </a:stretch>
+        </p:blipFill>
+        <p:spPr>
+          <a:xfrm>
+            <a:off x="4435298" y="3831413"/>
+            <a:ext cx="268688" cy="217017"/>
+          </a:xfrm>
+          <a:prstGeom prst="rect">
+            <a:avLst/>
+          </a:prstGeom>
+        </p:spPr>
+      </p:pic>
+      <p:pic>
+        <p:nvPicPr>
+          <p:cNvPr id="8" name="Picture 7">
+            <a:extLst>
+              <a:ext uri="{FF2B5EF4-FFF2-40B4-BE49-F238E27FC236}">
+                <a16:creationId xmlns:a16="http://schemas.microsoft.com/office/drawing/2014/main" id="{102FE56A-ECD5-6F44-A5C2-4ABB5C47787A}"/>
+              </a:ext>
+            </a:extLst>
+          </p:cNvPr>
+          <p:cNvPicPr>
+            <a:picLocks noChangeAspect="1"/>
+          </p:cNvPicPr>
+          <p:nvPr/>
+        </p:nvPicPr>
+        <p:blipFill>
+          <a:blip r:embed="rId5"/>
+          <a:stretch>
+            <a:fillRect/>
+          </a:stretch>
+        </p:blipFill>
+        <p:spPr>
+          <a:xfrm>
+            <a:off x="6264714" y="3831413"/>
+            <a:ext cx="268688" cy="217017"/>
+          </a:xfrm>
+          <a:prstGeom prst="rect">
+            <a:avLst/>
+          </a:prstGeom>
+        </p:spPr>
+      </p:pic>
+      <p:pic>
+        <p:nvPicPr>
+          <p:cNvPr id="10" name="Picture 9">
+            <a:extLst>
+              <a:ext uri="{FF2B5EF4-FFF2-40B4-BE49-F238E27FC236}">
+                <a16:creationId xmlns:a16="http://schemas.microsoft.com/office/drawing/2014/main" id="{F8AB5980-720F-CF4C-8726-7CD1A1E55A5B}"/>
+              </a:ext>
+            </a:extLst>
+          </p:cNvPr>
+          <p:cNvPicPr>
+            <a:picLocks noChangeAspect="1"/>
+          </p:cNvPicPr>
+          <p:nvPr/>
+        </p:nvPicPr>
+        <p:blipFill>
+          <a:blip r:embed="rId6"/>
+          <a:stretch>
+            <a:fillRect/>
+          </a:stretch>
+        </p:blipFill>
+        <p:spPr>
+          <a:xfrm>
+            <a:off x="8195730" y="3807949"/>
+            <a:ext cx="271838" cy="219561"/>
+          </a:xfrm>
+          <a:prstGeom prst="rect">
+            <a:avLst/>
+          </a:prstGeom>
+        </p:spPr>
+      </p:pic>
     </p:spTree>
     <p:extLst>
       <p:ext uri="{BB962C8B-B14F-4D97-AF65-F5344CB8AC3E}">
@@ -30643,7 +34202,7 @@
             <p:ph idx="1"/>
             <p:extLst>
               <p:ext uri="{D42A27DB-BD31-4B8C-83A1-F6EECF244321}">
-                <p14:modId xmlns:p14="http://schemas.microsoft.com/office/powerpoint/2010/main" val="4219352320"/>
+                <p14:modId xmlns:p14="http://schemas.microsoft.com/office/powerpoint/2010/main" val="1919098971"/>
               </p:ext>
             </p:extLst>
           </p:nvPr>
@@ -30962,6 +34521,96 @@
           </a:p>
         </p:txBody>
       </p:sp>
+      <p:pic>
+        <p:nvPicPr>
+          <p:cNvPr id="10" name="Picture 9">
+            <a:extLst>
+              <a:ext uri="{FF2B5EF4-FFF2-40B4-BE49-F238E27FC236}">
+                <a16:creationId xmlns:a16="http://schemas.microsoft.com/office/drawing/2014/main" id="{AA71CD3B-CDEE-5E4E-8F67-7BEE5AF556A7}"/>
+              </a:ext>
+            </a:extLst>
+          </p:cNvPr>
+          <p:cNvPicPr>
+            <a:picLocks noChangeAspect="1"/>
+          </p:cNvPicPr>
+          <p:nvPr/>
+        </p:nvPicPr>
+        <p:blipFill>
+          <a:blip r:embed="rId6"/>
+          <a:stretch>
+            <a:fillRect/>
+          </a:stretch>
+        </p:blipFill>
+        <p:spPr>
+          <a:xfrm>
+            <a:off x="4636660" y="4408739"/>
+            <a:ext cx="206001" cy="166385"/>
+          </a:xfrm>
+          <a:prstGeom prst="rect">
+            <a:avLst/>
+          </a:prstGeom>
+        </p:spPr>
+      </p:pic>
+      <p:pic>
+        <p:nvPicPr>
+          <p:cNvPr id="12" name="Picture 11">
+            <a:extLst>
+              <a:ext uri="{FF2B5EF4-FFF2-40B4-BE49-F238E27FC236}">
+                <a16:creationId xmlns:a16="http://schemas.microsoft.com/office/drawing/2014/main" id="{3463E242-6686-4E48-B836-F4E0C51825C1}"/>
+              </a:ext>
+            </a:extLst>
+          </p:cNvPr>
+          <p:cNvPicPr>
+            <a:picLocks noChangeAspect="1"/>
+          </p:cNvPicPr>
+          <p:nvPr/>
+        </p:nvPicPr>
+        <p:blipFill>
+          <a:blip r:embed="rId6"/>
+          <a:stretch>
+            <a:fillRect/>
+          </a:stretch>
+        </p:blipFill>
+        <p:spPr>
+          <a:xfrm>
+            <a:off x="6265584" y="4378269"/>
+            <a:ext cx="206001" cy="166385"/>
+          </a:xfrm>
+          <a:prstGeom prst="rect">
+            <a:avLst/>
+          </a:prstGeom>
+        </p:spPr>
+      </p:pic>
+      <p:pic>
+        <p:nvPicPr>
+          <p:cNvPr id="13" name="Picture 12">
+            <a:extLst>
+              <a:ext uri="{FF2B5EF4-FFF2-40B4-BE49-F238E27FC236}">
+                <a16:creationId xmlns:a16="http://schemas.microsoft.com/office/drawing/2014/main" id="{EEAF10E1-0B68-7942-8C65-AE5C45059568}"/>
+              </a:ext>
+            </a:extLst>
+          </p:cNvPr>
+          <p:cNvPicPr>
+            <a:picLocks noChangeAspect="1"/>
+          </p:cNvPicPr>
+          <p:nvPr/>
+        </p:nvPicPr>
+        <p:blipFill>
+          <a:blip r:embed="rId6"/>
+          <a:stretch>
+            <a:fillRect/>
+          </a:stretch>
+        </p:blipFill>
+        <p:spPr>
+          <a:xfrm>
+            <a:off x="7894508" y="4370954"/>
+            <a:ext cx="206001" cy="166385"/>
+          </a:xfrm>
+          <a:prstGeom prst="rect">
+            <a:avLst/>
+          </a:prstGeom>
+        </p:spPr>
+      </p:pic>
     </p:spTree>
     <p:extLst>
       <p:ext uri="{BB962C8B-B14F-4D97-AF65-F5344CB8AC3E}">
@@ -31251,6 +34900,126 @@
           </a:prstGeom>
         </p:spPr>
       </p:pic>
+      <p:pic>
+        <p:nvPicPr>
+          <p:cNvPr id="10" name="Picture 9">
+            <a:extLst>
+              <a:ext uri="{FF2B5EF4-FFF2-40B4-BE49-F238E27FC236}">
+                <a16:creationId xmlns:a16="http://schemas.microsoft.com/office/drawing/2014/main" id="{DCF2B187-B9E7-5D44-A81C-B0BCCF1AB9A4}"/>
+              </a:ext>
+            </a:extLst>
+          </p:cNvPr>
+          <p:cNvPicPr>
+            <a:picLocks noChangeAspect="1"/>
+          </p:cNvPicPr>
+          <p:nvPr/>
+        </p:nvPicPr>
+        <p:blipFill>
+          <a:blip r:embed="rId6"/>
+          <a:stretch>
+            <a:fillRect/>
+          </a:stretch>
+        </p:blipFill>
+        <p:spPr>
+          <a:xfrm>
+            <a:off x="7506886" y="2128000"/>
+            <a:ext cx="251446" cy="203091"/>
+          </a:xfrm>
+          <a:prstGeom prst="rect">
+            <a:avLst/>
+          </a:prstGeom>
+        </p:spPr>
+      </p:pic>
+      <p:pic>
+        <p:nvPicPr>
+          <p:cNvPr id="11" name="Picture 10">
+            <a:extLst>
+              <a:ext uri="{FF2B5EF4-FFF2-40B4-BE49-F238E27FC236}">
+                <a16:creationId xmlns:a16="http://schemas.microsoft.com/office/drawing/2014/main" id="{078A09B6-874B-D54E-93C1-CBD4CC4AD793}"/>
+              </a:ext>
+            </a:extLst>
+          </p:cNvPr>
+          <p:cNvPicPr>
+            <a:picLocks noChangeAspect="1"/>
+          </p:cNvPicPr>
+          <p:nvPr/>
+        </p:nvPicPr>
+        <p:blipFill>
+          <a:blip r:embed="rId7"/>
+          <a:stretch>
+            <a:fillRect/>
+          </a:stretch>
+        </p:blipFill>
+        <p:spPr>
+          <a:xfrm>
+            <a:off x="4665922" y="4061947"/>
+            <a:ext cx="268688" cy="217017"/>
+          </a:xfrm>
+          <a:prstGeom prst="rect">
+            <a:avLst/>
+          </a:prstGeom>
+        </p:spPr>
+      </p:pic>
+      <p:pic>
+        <p:nvPicPr>
+          <p:cNvPr id="12" name="Picture 11">
+            <a:extLst>
+              <a:ext uri="{FF2B5EF4-FFF2-40B4-BE49-F238E27FC236}">
+                <a16:creationId xmlns:a16="http://schemas.microsoft.com/office/drawing/2014/main" id="{4C49BDB7-23A0-6F4A-9C78-B7676C3287A4}"/>
+              </a:ext>
+            </a:extLst>
+          </p:cNvPr>
+          <p:cNvPicPr>
+            <a:picLocks noChangeAspect="1"/>
+          </p:cNvPicPr>
+          <p:nvPr/>
+        </p:nvPicPr>
+        <p:blipFill>
+          <a:blip r:embed="rId7"/>
+          <a:stretch>
+            <a:fillRect/>
+          </a:stretch>
+        </p:blipFill>
+        <p:spPr>
+          <a:xfrm>
+            <a:off x="6535272" y="4061947"/>
+            <a:ext cx="268688" cy="217017"/>
+          </a:xfrm>
+          <a:prstGeom prst="rect">
+            <a:avLst/>
+          </a:prstGeom>
+        </p:spPr>
+      </p:pic>
+      <p:pic>
+        <p:nvPicPr>
+          <p:cNvPr id="13" name="Picture 12">
+            <a:extLst>
+              <a:ext uri="{FF2B5EF4-FFF2-40B4-BE49-F238E27FC236}">
+                <a16:creationId xmlns:a16="http://schemas.microsoft.com/office/drawing/2014/main" id="{C7DB98D0-3D1B-D049-B3DE-DA082EB69A92}"/>
+              </a:ext>
+            </a:extLst>
+          </p:cNvPr>
+          <p:cNvPicPr>
+            <a:picLocks noChangeAspect="1"/>
+          </p:cNvPicPr>
+          <p:nvPr/>
+        </p:nvPicPr>
+        <p:blipFill>
+          <a:blip r:embed="rId8"/>
+          <a:stretch>
+            <a:fillRect/>
+          </a:stretch>
+        </p:blipFill>
+        <p:spPr>
+          <a:xfrm>
+            <a:off x="8406137" y="4059403"/>
+            <a:ext cx="271838" cy="219561"/>
+          </a:xfrm>
+          <a:prstGeom prst="rect">
+            <a:avLst/>
+          </a:prstGeom>
+        </p:spPr>
+      </p:pic>
     </p:spTree>
     <p:extLst>
       <p:ext uri="{BB962C8B-B14F-4D97-AF65-F5344CB8AC3E}">
@@ -31503,6 +35272,126 @@
           </a:prstGeom>
         </p:spPr>
       </p:pic>
+      <p:pic>
+        <p:nvPicPr>
+          <p:cNvPr id="8" name="Picture 7">
+            <a:extLst>
+              <a:ext uri="{FF2B5EF4-FFF2-40B4-BE49-F238E27FC236}">
+                <a16:creationId xmlns:a16="http://schemas.microsoft.com/office/drawing/2014/main" id="{1C93D1E7-80A8-454D-AD8F-F7C3659915A9}"/>
+              </a:ext>
+            </a:extLst>
+          </p:cNvPr>
+          <p:cNvPicPr>
+            <a:picLocks noChangeAspect="1"/>
+          </p:cNvPicPr>
+          <p:nvPr/>
+        </p:nvPicPr>
+        <p:blipFill>
+          <a:blip r:embed="rId5"/>
+          <a:stretch>
+            <a:fillRect/>
+          </a:stretch>
+        </p:blipFill>
+        <p:spPr>
+          <a:xfrm>
+            <a:off x="7499570" y="2470204"/>
+            <a:ext cx="251446" cy="203091"/>
+          </a:xfrm>
+          <a:prstGeom prst="rect">
+            <a:avLst/>
+          </a:prstGeom>
+        </p:spPr>
+      </p:pic>
+      <p:pic>
+        <p:nvPicPr>
+          <p:cNvPr id="9" name="Picture 8">
+            <a:extLst>
+              <a:ext uri="{FF2B5EF4-FFF2-40B4-BE49-F238E27FC236}">
+                <a16:creationId xmlns:a16="http://schemas.microsoft.com/office/drawing/2014/main" id="{27818792-0FAC-6845-8C31-7D21709ADD41}"/>
+              </a:ext>
+            </a:extLst>
+          </p:cNvPr>
+          <p:cNvPicPr>
+            <a:picLocks noChangeAspect="1"/>
+          </p:cNvPicPr>
+          <p:nvPr/>
+        </p:nvPicPr>
+        <p:blipFill>
+          <a:blip r:embed="rId6"/>
+          <a:stretch>
+            <a:fillRect/>
+          </a:stretch>
+        </p:blipFill>
+        <p:spPr>
+          <a:xfrm>
+            <a:off x="5249163" y="4044386"/>
+            <a:ext cx="213317" cy="172294"/>
+          </a:xfrm>
+          <a:prstGeom prst="rect">
+            <a:avLst/>
+          </a:prstGeom>
+        </p:spPr>
+      </p:pic>
+      <p:pic>
+        <p:nvPicPr>
+          <p:cNvPr id="11" name="Picture 10">
+            <a:extLst>
+              <a:ext uri="{FF2B5EF4-FFF2-40B4-BE49-F238E27FC236}">
+                <a16:creationId xmlns:a16="http://schemas.microsoft.com/office/drawing/2014/main" id="{E202C116-C084-F945-A20A-0066BE603027}"/>
+              </a:ext>
+            </a:extLst>
+          </p:cNvPr>
+          <p:cNvPicPr>
+            <a:picLocks noChangeAspect="1"/>
+          </p:cNvPicPr>
+          <p:nvPr/>
+        </p:nvPicPr>
+        <p:blipFill>
+          <a:blip r:embed="rId6"/>
+          <a:stretch>
+            <a:fillRect/>
+          </a:stretch>
+        </p:blipFill>
+        <p:spPr>
+          <a:xfrm>
+            <a:off x="6735804" y="4044386"/>
+            <a:ext cx="213317" cy="172294"/>
+          </a:xfrm>
+          <a:prstGeom prst="rect">
+            <a:avLst/>
+          </a:prstGeom>
+        </p:spPr>
+      </p:pic>
+      <p:pic>
+        <p:nvPicPr>
+          <p:cNvPr id="12" name="Picture 11">
+            <a:extLst>
+              <a:ext uri="{FF2B5EF4-FFF2-40B4-BE49-F238E27FC236}">
+                <a16:creationId xmlns:a16="http://schemas.microsoft.com/office/drawing/2014/main" id="{83065852-8019-A741-B475-E4A54C2C71BE}"/>
+              </a:ext>
+            </a:extLst>
+          </p:cNvPr>
+          <p:cNvPicPr>
+            <a:picLocks noChangeAspect="1"/>
+          </p:cNvPicPr>
+          <p:nvPr/>
+        </p:nvPicPr>
+        <p:blipFill>
+          <a:blip r:embed="rId6"/>
+          <a:stretch>
+            <a:fillRect/>
+          </a:stretch>
+        </p:blipFill>
+        <p:spPr>
+          <a:xfrm>
+            <a:off x="8256167" y="4044386"/>
+            <a:ext cx="213317" cy="172294"/>
+          </a:xfrm>
+          <a:prstGeom prst="rect">
+            <a:avLst/>
+          </a:prstGeom>
+        </p:spPr>
+      </p:pic>
     </p:spTree>
     <p:extLst>
       <p:ext uri="{BB962C8B-B14F-4D97-AF65-F5344CB8AC3E}">
@@ -31563,7 +35452,7 @@
           <a:p>
             <a:r>
               <a:rPr lang="en-US" dirty="0"/>
-              <a:t>Unsorted Bin Chunk – Removal – 2 </a:t>
+              <a:t>Unsorted Bin Attack – 1 </a:t>
             </a:r>
           </a:p>
         </p:txBody>
@@ -31647,7 +35536,7 @@
             </a:r>
             <a:r>
               <a:rPr lang="en-US" b="1" i="1" dirty="0"/>
-              <a:t>fd</a:t>
+              <a:t>fd’</a:t>
             </a:r>
             <a:r>
               <a:rPr lang="en-US" dirty="0"/>
@@ -31755,6 +35644,126 @@
           </a:prstGeom>
         </p:spPr>
       </p:pic>
+      <p:pic>
+        <p:nvPicPr>
+          <p:cNvPr id="6" name="Picture 5">
+            <a:extLst>
+              <a:ext uri="{FF2B5EF4-FFF2-40B4-BE49-F238E27FC236}">
+                <a16:creationId xmlns:a16="http://schemas.microsoft.com/office/drawing/2014/main" id="{C399F135-281D-9348-A637-E6F31F799F35}"/>
+              </a:ext>
+            </a:extLst>
+          </p:cNvPr>
+          <p:cNvPicPr>
+            <a:picLocks noChangeAspect="1"/>
+          </p:cNvPicPr>
+          <p:nvPr/>
+        </p:nvPicPr>
+        <p:blipFill>
+          <a:blip r:embed="rId4"/>
+          <a:stretch>
+            <a:fillRect/>
+          </a:stretch>
+        </p:blipFill>
+        <p:spPr>
+          <a:xfrm>
+            <a:off x="7073279" y="1849528"/>
+            <a:ext cx="251446" cy="203091"/>
+          </a:xfrm>
+          <a:prstGeom prst="rect">
+            <a:avLst/>
+          </a:prstGeom>
+        </p:spPr>
+      </p:pic>
+      <p:pic>
+        <p:nvPicPr>
+          <p:cNvPr id="7" name="Picture 6">
+            <a:extLst>
+              <a:ext uri="{FF2B5EF4-FFF2-40B4-BE49-F238E27FC236}">
+                <a16:creationId xmlns:a16="http://schemas.microsoft.com/office/drawing/2014/main" id="{40E97BD1-7850-EE4A-BB71-FA7F66EB13D4}"/>
+              </a:ext>
+            </a:extLst>
+          </p:cNvPr>
+          <p:cNvPicPr>
+            <a:picLocks noChangeAspect="1"/>
+          </p:cNvPicPr>
+          <p:nvPr/>
+        </p:nvPicPr>
+        <p:blipFill>
+          <a:blip r:embed="rId5"/>
+          <a:stretch>
+            <a:fillRect/>
+          </a:stretch>
+        </p:blipFill>
+        <p:spPr>
+          <a:xfrm>
+            <a:off x="4300162" y="3760553"/>
+            <a:ext cx="271838" cy="219561"/>
+          </a:xfrm>
+          <a:prstGeom prst="rect">
+            <a:avLst/>
+          </a:prstGeom>
+        </p:spPr>
+      </p:pic>
+      <p:pic>
+        <p:nvPicPr>
+          <p:cNvPr id="8" name="Picture 7">
+            <a:extLst>
+              <a:ext uri="{FF2B5EF4-FFF2-40B4-BE49-F238E27FC236}">
+                <a16:creationId xmlns:a16="http://schemas.microsoft.com/office/drawing/2014/main" id="{3B215BFB-2347-2640-BA8A-4F5CD09A0065}"/>
+              </a:ext>
+            </a:extLst>
+          </p:cNvPr>
+          <p:cNvPicPr>
+            <a:picLocks noChangeAspect="1"/>
+          </p:cNvPicPr>
+          <p:nvPr/>
+        </p:nvPicPr>
+        <p:blipFill>
+          <a:blip r:embed="rId5"/>
+          <a:stretch>
+            <a:fillRect/>
+          </a:stretch>
+        </p:blipFill>
+        <p:spPr>
+          <a:xfrm>
+            <a:off x="6156346" y="3760553"/>
+            <a:ext cx="271838" cy="219561"/>
+          </a:xfrm>
+          <a:prstGeom prst="rect">
+            <a:avLst/>
+          </a:prstGeom>
+        </p:spPr>
+      </p:pic>
+      <p:pic>
+        <p:nvPicPr>
+          <p:cNvPr id="9" name="Picture 8">
+            <a:extLst>
+              <a:ext uri="{FF2B5EF4-FFF2-40B4-BE49-F238E27FC236}">
+                <a16:creationId xmlns:a16="http://schemas.microsoft.com/office/drawing/2014/main" id="{870BACDA-EC2B-2449-BE9C-D1E73B07CF00}"/>
+              </a:ext>
+            </a:extLst>
+          </p:cNvPr>
+          <p:cNvPicPr>
+            <a:picLocks noChangeAspect="1"/>
+          </p:cNvPicPr>
+          <p:nvPr/>
+        </p:nvPicPr>
+        <p:blipFill>
+          <a:blip r:embed="rId5"/>
+          <a:stretch>
+            <a:fillRect/>
+          </a:stretch>
+        </p:blipFill>
+        <p:spPr>
+          <a:xfrm>
+            <a:off x="8012530" y="3760553"/>
+            <a:ext cx="271838" cy="219561"/>
+          </a:xfrm>
+          <a:prstGeom prst="rect">
+            <a:avLst/>
+          </a:prstGeom>
+        </p:spPr>
+      </p:pic>
     </p:spTree>
     <p:extLst>
       <p:ext uri="{BB962C8B-B14F-4D97-AF65-F5344CB8AC3E}">
@@ -31815,7 +35824,7 @@
           <a:p>
             <a:r>
               <a:rPr lang="en-US" dirty="0"/>
-              <a:t>Unsorted Bin Chunk – Removal – 2 </a:t>
+              <a:t>Unsorted Bin Attack – 2</a:t>
             </a:r>
           </a:p>
         </p:txBody>
@@ -32038,6 +36047,126 @@
           </a:prstGeom>
         </p:spPr>
       </p:pic>
+      <p:pic>
+        <p:nvPicPr>
+          <p:cNvPr id="6" name="Picture 5">
+            <a:extLst>
+              <a:ext uri="{FF2B5EF4-FFF2-40B4-BE49-F238E27FC236}">
+                <a16:creationId xmlns:a16="http://schemas.microsoft.com/office/drawing/2014/main" id="{7507853D-1857-8B43-82C7-1CE6B072673D}"/>
+              </a:ext>
+            </a:extLst>
+          </p:cNvPr>
+          <p:cNvPicPr>
+            <a:picLocks noChangeAspect="1"/>
+          </p:cNvPicPr>
+          <p:nvPr/>
+        </p:nvPicPr>
+        <p:blipFill>
+          <a:blip r:embed="rId4"/>
+          <a:stretch>
+            <a:fillRect/>
+          </a:stretch>
+        </p:blipFill>
+        <p:spPr>
+          <a:xfrm>
+            <a:off x="7189094" y="1779460"/>
+            <a:ext cx="251446" cy="203091"/>
+          </a:xfrm>
+          <a:prstGeom prst="rect">
+            <a:avLst/>
+          </a:prstGeom>
+        </p:spPr>
+      </p:pic>
+      <p:pic>
+        <p:nvPicPr>
+          <p:cNvPr id="7" name="Picture 6">
+            <a:extLst>
+              <a:ext uri="{FF2B5EF4-FFF2-40B4-BE49-F238E27FC236}">
+                <a16:creationId xmlns:a16="http://schemas.microsoft.com/office/drawing/2014/main" id="{B264B69F-B7AF-584D-A962-013E4CC42739}"/>
+              </a:ext>
+            </a:extLst>
+          </p:cNvPr>
+          <p:cNvPicPr>
+            <a:picLocks noChangeAspect="1"/>
+          </p:cNvPicPr>
+          <p:nvPr/>
+        </p:nvPicPr>
+        <p:blipFill>
+          <a:blip r:embed="rId5"/>
+          <a:stretch>
+            <a:fillRect/>
+          </a:stretch>
+        </p:blipFill>
+        <p:spPr>
+          <a:xfrm>
+            <a:off x="4436081" y="3643896"/>
+            <a:ext cx="271838" cy="219561"/>
+          </a:xfrm>
+          <a:prstGeom prst="rect">
+            <a:avLst/>
+          </a:prstGeom>
+        </p:spPr>
+      </p:pic>
+      <p:pic>
+        <p:nvPicPr>
+          <p:cNvPr id="8" name="Picture 7">
+            <a:extLst>
+              <a:ext uri="{FF2B5EF4-FFF2-40B4-BE49-F238E27FC236}">
+                <a16:creationId xmlns:a16="http://schemas.microsoft.com/office/drawing/2014/main" id="{858CD1BE-90FD-CC45-B39D-187271F18EC0}"/>
+              </a:ext>
+            </a:extLst>
+          </p:cNvPr>
+          <p:cNvPicPr>
+            <a:picLocks noChangeAspect="1"/>
+          </p:cNvPicPr>
+          <p:nvPr/>
+        </p:nvPicPr>
+        <p:blipFill>
+          <a:blip r:embed="rId5"/>
+          <a:stretch>
+            <a:fillRect/>
+          </a:stretch>
+        </p:blipFill>
+        <p:spPr>
+          <a:xfrm>
+            <a:off x="6255227" y="3643897"/>
+            <a:ext cx="271838" cy="219561"/>
+          </a:xfrm>
+          <a:prstGeom prst="rect">
+            <a:avLst/>
+          </a:prstGeom>
+        </p:spPr>
+      </p:pic>
+      <p:pic>
+        <p:nvPicPr>
+          <p:cNvPr id="5" name="Picture 4">
+            <a:extLst>
+              <a:ext uri="{FF2B5EF4-FFF2-40B4-BE49-F238E27FC236}">
+                <a16:creationId xmlns:a16="http://schemas.microsoft.com/office/drawing/2014/main" id="{4027B83D-3F94-B248-B199-888E5BD1F900}"/>
+              </a:ext>
+            </a:extLst>
+          </p:cNvPr>
+          <p:cNvPicPr>
+            <a:picLocks noChangeAspect="1"/>
+          </p:cNvPicPr>
+          <p:nvPr/>
+        </p:nvPicPr>
+        <p:blipFill>
+          <a:blip r:embed="rId6"/>
+          <a:stretch>
+            <a:fillRect/>
+          </a:stretch>
+        </p:blipFill>
+        <p:spPr>
+          <a:xfrm>
+            <a:off x="8070592" y="3626063"/>
+            <a:ext cx="271838" cy="219561"/>
+          </a:xfrm>
+          <a:prstGeom prst="rect">
+            <a:avLst/>
+          </a:prstGeom>
+        </p:spPr>
+      </p:pic>
     </p:spTree>
     <p:extLst>
       <p:ext uri="{BB962C8B-B14F-4D97-AF65-F5344CB8AC3E}">
@@ -32166,7 +36295,7 @@
         </p:blipFill>
         <p:spPr>
           <a:xfrm>
-            <a:off x="3800267" y="0"/>
+            <a:off x="3800267" y="143933"/>
             <a:ext cx="5343733" cy="3131778"/>
           </a:xfrm>
           <a:prstGeom prst="rect">
@@ -32190,7 +36319,7 @@
         </p:nvCxnSpPr>
         <p:spPr>
           <a:xfrm>
-            <a:off x="3892249" y="1365304"/>
+            <a:off x="3852458" y="1517704"/>
             <a:ext cx="1900133" cy="0"/>
           </a:xfrm>
           <a:prstGeom prst="line">
@@ -32980,8 +37109,44 @@
               <a:rPr lang="en-US" dirty="0">
                 <a:sym typeface="Wingdings" pitchFamily="2" charset="2"/>
               </a:rPr>
-              <a:t>section</a:t>
-            </a:r>
+              <a:t>section </a:t>
+            </a:r>
+          </a:p>
+          <a:p>
+            <a:pPr lvl="1"/>
+            <a:r>
+              <a:rPr lang="en-US" dirty="0">
+                <a:sym typeface="Wingdings" pitchFamily="2" charset="2"/>
+              </a:rPr>
+              <a:t>Address is ﻿</a:t>
+            </a:r>
+            <a:r>
+              <a:rPr lang="en-US" b="1" dirty="0">
+                <a:sym typeface="Wingdings" pitchFamily="2" charset="2"/>
+              </a:rPr>
+              <a:t>0x404088</a:t>
+            </a:r>
+            <a:r>
+              <a:rPr lang="en-US" dirty="0">
+                <a:sym typeface="Wingdings" pitchFamily="2" charset="2"/>
+              </a:rPr>
+              <a:t> or in the </a:t>
+            </a:r>
+            <a:r>
+              <a:rPr lang="en-US" i="1" dirty="0" err="1">
+                <a:sym typeface="Wingdings" pitchFamily="2" charset="2"/>
+              </a:rPr>
+              <a:t>magic_loc</a:t>
+            </a:r>
+            <a:r>
+              <a:rPr lang="en-US" dirty="0">
+                <a:sym typeface="Wingdings" pitchFamily="2" charset="2"/>
+              </a:rPr>
+              <a:t> variable</a:t>
+            </a:r>
+            <a:endParaRPr lang="en-US" b="1" dirty="0">
+              <a:sym typeface="Wingdings" pitchFamily="2" charset="2"/>
+            </a:endParaRPr>
           </a:p>
           <a:p>
             <a:r>
@@ -34412,9 +38577,16 @@
             <p:ph type="title"/>
           </p:nvPr>
         </p:nvSpPr>
-        <p:spPr/>
+        <p:spPr>
+          <a:xfrm>
+            <a:off x="629841" y="342900"/>
+            <a:ext cx="2949178" cy="1200150"/>
+          </a:xfrm>
+        </p:spPr>
         <p:txBody>
-          <a:bodyPr/>
+          <a:bodyPr anchor="b">
+            <a:normAutofit/>
+          </a:bodyPr>
           <a:lstStyle/>
           <a:p>
             <a:r>
@@ -34426,10 +38598,10 @@
       </p:sp>
       <p:sp>
         <p:nvSpPr>
-          <p:cNvPr id="3" name="Content Placeholder 2">
+          <p:cNvPr id="9" name="Text Placeholder 3">
             <a:extLst>
               <a:ext uri="{FF2B5EF4-FFF2-40B4-BE49-F238E27FC236}">
-                <a16:creationId xmlns:a16="http://schemas.microsoft.com/office/drawing/2014/main" id="{918A4E2B-5ACB-C048-B99D-EF20F35EAB4D}"/>
+                <a16:creationId xmlns:a16="http://schemas.microsoft.com/office/drawing/2014/main" id="{EB389AD2-2CE4-43EA-AF17-402B35760CBA}"/>
               </a:ext>
             </a:extLst>
           </p:cNvPr>
@@ -34437,57 +38609,54 @@
             <a:spLocks noGrp="1"/>
           </p:cNvSpPr>
           <p:nvPr>
-            <p:ph idx="1"/>
+            <p:ph type="body" sz="half" idx="2"/>
           </p:nvPr>
         </p:nvSpPr>
-        <p:spPr/>
+        <p:spPr>
+          <a:xfrm>
+            <a:off x="629841" y="1543052"/>
+            <a:ext cx="2949178" cy="2858691"/>
+          </a:xfrm>
+        </p:spPr>
         <p:txBody>
-          <a:bodyPr>
-            <a:normAutofit/>
-          </a:bodyPr>
+          <a:bodyPr/>
           <a:lstStyle/>
           <a:p>
-            <a:r>
-              <a:rPr lang="en-US" dirty="0"/>
-              <a:t>Allows to write to </a:t>
-            </a:r>
-            <a:r>
-              <a:rPr lang="en-US" b="1" dirty="0"/>
-              <a:t>ANYWHERE</a:t>
-            </a:r>
-            <a:r>
-              <a:rPr lang="en-US" dirty="0"/>
-              <a:t> in memory </a:t>
-            </a:r>
-          </a:p>
-          <a:p>
-            <a:pPr lvl="1"/>
-            <a:r>
-              <a:rPr lang="en-US" dirty="0"/>
-              <a:t>Cannot control the WHAT, only the WHERE</a:t>
-            </a:r>
-          </a:p>
-          <a:p>
-            <a:r>
-              <a:rPr lang="en-US" dirty="0"/>
-              <a:t>Major part of many other techniques:</a:t>
-            </a:r>
-          </a:p>
-          <a:p>
-            <a:pPr lvl="1"/>
-            <a:r>
-              <a:rPr lang="en-US" dirty="0"/>
-              <a:t>House of Orange House of Roman, House of Husk…</a:t>
-            </a:r>
-          </a:p>
-          <a:p>
-            <a:endParaRPr lang="en-US" dirty="0"/>
-          </a:p>
-          <a:p>
-            <a:endParaRPr lang="en-US" dirty="0"/>
+            <a:endParaRPr lang="en-US"/>
           </a:p>
         </p:txBody>
       </p:sp>
+      <p:graphicFrame>
+        <p:nvGraphicFramePr>
+          <p:cNvPr id="5" name="Content Placeholder 2">
+            <a:extLst>
+              <a:ext uri="{FF2B5EF4-FFF2-40B4-BE49-F238E27FC236}">
+                <a16:creationId xmlns:a16="http://schemas.microsoft.com/office/drawing/2014/main" id="{0DD9FAAF-0963-4833-8D1E-6A8ECCA5716E}"/>
+              </a:ext>
+            </a:extLst>
+          </p:cNvPr>
+          <p:cNvGraphicFramePr>
+            <a:graphicFrameLocks noGrp="1"/>
+          </p:cNvGraphicFramePr>
+          <p:nvPr>
+            <p:ph idx="1"/>
+            <p:extLst>
+              <p:ext uri="{D42A27DB-BD31-4B8C-83A1-F6EECF244321}">
+                <p14:modId xmlns:p14="http://schemas.microsoft.com/office/powerpoint/2010/main" val="3520562897"/>
+              </p:ext>
+            </p:extLst>
+          </p:nvPr>
+        </p:nvGraphicFramePr>
+        <p:xfrm>
+          <a:off x="3887391" y="740572"/>
+          <a:ext cx="4629150" cy="3655219"/>
+        </p:xfrm>
+        <a:graphic>
+          <a:graphicData uri="http://schemas.openxmlformats.org/drawingml/2006/diagram">
+            <dgm:relIds xmlns:dgm="http://schemas.openxmlformats.org/drawingml/2006/diagram" xmlns:r="http://schemas.openxmlformats.org/officeDocument/2006/relationships" r:dm="rId2" r:lo="rId3" r:qs="rId4" r:cs="rId5"/>
+          </a:graphicData>
+        </a:graphic>
+      </p:graphicFrame>
     </p:spTree>
     <p:extLst>
       <p:ext uri="{BB962C8B-B14F-4D97-AF65-F5344CB8AC3E}">
@@ -35042,7 +39211,7 @@
 </file>
 
 <file path=ppt/slides/slide42.xml><?xml version="1.0" encoding="utf-8"?>
-<p:sld xmlns:a="http://schemas.openxmlformats.org/drawingml/2006/main" xmlns:r="http://schemas.openxmlformats.org/officeDocument/2006/relationships" xmlns:p="http://schemas.openxmlformats.org/presentationml/2006/main">
+<p:sld xmlns:a="http://schemas.openxmlformats.org/drawingml/2006/main" xmlns:r="http://schemas.openxmlformats.org/officeDocument/2006/relationships" xmlns:p="http://schemas.openxmlformats.org/presentationml/2006/main" show="0">
   <p:cSld>
     <p:spTree>
       <p:nvGrpSpPr>
@@ -35125,7 +39294,7 @@
 </file>
 
 <file path=ppt/slides/slide43.xml><?xml version="1.0" encoding="utf-8"?>
-<p:sld xmlns:a="http://schemas.openxmlformats.org/drawingml/2006/main" xmlns:r="http://schemas.openxmlformats.org/officeDocument/2006/relationships" xmlns:p="http://schemas.openxmlformats.org/presentationml/2006/main">
+<p:sld xmlns:a="http://schemas.openxmlformats.org/drawingml/2006/main" xmlns:r="http://schemas.openxmlformats.org/officeDocument/2006/relationships" xmlns:p="http://schemas.openxmlformats.org/presentationml/2006/main" show="0">
   <p:cSld>
     <p:spTree>
       <p:nvGrpSpPr>
@@ -35228,7 +39397,7 @@
 </file>
 
 <file path=ppt/slides/slide44.xml><?xml version="1.0" encoding="utf-8"?>
-<p:sld xmlns:a="http://schemas.openxmlformats.org/drawingml/2006/main" xmlns:r="http://schemas.openxmlformats.org/officeDocument/2006/relationships" xmlns:p="http://schemas.openxmlformats.org/presentationml/2006/main">
+<p:sld xmlns:a="http://schemas.openxmlformats.org/drawingml/2006/main" xmlns:r="http://schemas.openxmlformats.org/officeDocument/2006/relationships" xmlns:p="http://schemas.openxmlformats.org/presentationml/2006/main" show="0">
   <p:cSld>
     <p:spTree>
       <p:nvGrpSpPr>
@@ -35474,7 +39643,7 @@
 </file>
 
 <file path=ppt/slides/slide45.xml><?xml version="1.0" encoding="utf-8"?>
-<p:sld xmlns:a="http://schemas.openxmlformats.org/drawingml/2006/main" xmlns:r="http://schemas.openxmlformats.org/officeDocument/2006/relationships" xmlns:p="http://schemas.openxmlformats.org/presentationml/2006/main">
+<p:sld xmlns:a="http://schemas.openxmlformats.org/drawingml/2006/main" xmlns:r="http://schemas.openxmlformats.org/officeDocument/2006/relationships" xmlns:p="http://schemas.openxmlformats.org/presentationml/2006/main" show="0">
   <p:cSld>
     <p:spTree>
       <p:nvGrpSpPr>
@@ -36976,7 +41145,7 @@
             </a:pPr>
             <a:r>
               <a:rPr lang="en-US" dirty="0"/>
-              <a:t>Fd &amp; Bk Pointers</a:t>
+              <a:t>Fd &amp; bk Pointers</a:t>
             </a:r>
           </a:p>
           <a:p>
@@ -37087,6 +41256,126 @@
           <a:xfrm>
             <a:off x="4040184" y="563845"/>
             <a:ext cx="5043438" cy="3392858"/>
+          </a:xfrm>
+          <a:prstGeom prst="rect">
+            <a:avLst/>
+          </a:prstGeom>
+        </p:spPr>
+      </p:pic>
+      <p:pic>
+        <p:nvPicPr>
+          <p:cNvPr id="6" name="Picture 5">
+            <a:extLst>
+              <a:ext uri="{FF2B5EF4-FFF2-40B4-BE49-F238E27FC236}">
+                <a16:creationId xmlns:a16="http://schemas.microsoft.com/office/drawing/2014/main" id="{1215F5CA-4D88-5446-9031-D47A421FC177}"/>
+              </a:ext>
+            </a:extLst>
+          </p:cNvPr>
+          <p:cNvPicPr>
+            <a:picLocks noChangeAspect="1"/>
+          </p:cNvPicPr>
+          <p:nvPr/>
+        </p:nvPicPr>
+        <p:blipFill>
+          <a:blip r:embed="rId4"/>
+          <a:stretch>
+            <a:fillRect/>
+          </a:stretch>
+        </p:blipFill>
+        <p:spPr>
+          <a:xfrm>
+            <a:off x="4929269" y="3158415"/>
+            <a:ext cx="268688" cy="217017"/>
+          </a:xfrm>
+          <a:prstGeom prst="rect">
+            <a:avLst/>
+          </a:prstGeom>
+        </p:spPr>
+      </p:pic>
+      <p:pic>
+        <p:nvPicPr>
+          <p:cNvPr id="9" name="Picture 8">
+            <a:extLst>
+              <a:ext uri="{FF2B5EF4-FFF2-40B4-BE49-F238E27FC236}">
+                <a16:creationId xmlns:a16="http://schemas.microsoft.com/office/drawing/2014/main" id="{39C392DB-2201-6F48-9DC2-7EE23CCE28EA}"/>
+              </a:ext>
+            </a:extLst>
+          </p:cNvPr>
+          <p:cNvPicPr>
+            <a:picLocks noChangeAspect="1"/>
+          </p:cNvPicPr>
+          <p:nvPr/>
+        </p:nvPicPr>
+        <p:blipFill>
+          <a:blip r:embed="rId4"/>
+          <a:stretch>
+            <a:fillRect/>
+          </a:stretch>
+        </p:blipFill>
+        <p:spPr>
+          <a:xfrm>
+            <a:off x="6737757" y="3149281"/>
+            <a:ext cx="268688" cy="217017"/>
+          </a:xfrm>
+          <a:prstGeom prst="rect">
+            <a:avLst/>
+          </a:prstGeom>
+        </p:spPr>
+      </p:pic>
+      <p:pic>
+        <p:nvPicPr>
+          <p:cNvPr id="10" name="Picture 9">
+            <a:extLst>
+              <a:ext uri="{FF2B5EF4-FFF2-40B4-BE49-F238E27FC236}">
+                <a16:creationId xmlns:a16="http://schemas.microsoft.com/office/drawing/2014/main" id="{C1844371-7E4A-E34E-924C-4A2AD89BFEA4}"/>
+              </a:ext>
+            </a:extLst>
+          </p:cNvPr>
+          <p:cNvPicPr>
+            <a:picLocks noChangeAspect="1"/>
+          </p:cNvPicPr>
+          <p:nvPr/>
+        </p:nvPicPr>
+        <p:blipFill>
+          <a:blip r:embed="rId4"/>
+          <a:stretch>
+            <a:fillRect/>
+          </a:stretch>
+        </p:blipFill>
+        <p:spPr>
+          <a:xfrm>
+            <a:off x="8546245" y="3171826"/>
+            <a:ext cx="268688" cy="217017"/>
+          </a:xfrm>
+          <a:prstGeom prst="rect">
+            <a:avLst/>
+          </a:prstGeom>
+        </p:spPr>
+      </p:pic>
+      <p:pic>
+        <p:nvPicPr>
+          <p:cNvPr id="8" name="Picture 7">
+            <a:extLst>
+              <a:ext uri="{FF2B5EF4-FFF2-40B4-BE49-F238E27FC236}">
+                <a16:creationId xmlns:a16="http://schemas.microsoft.com/office/drawing/2014/main" id="{2F20E167-5D97-2442-974C-3626227FAD2D}"/>
+              </a:ext>
+            </a:extLst>
+          </p:cNvPr>
+          <p:cNvPicPr>
+            <a:picLocks noChangeAspect="1"/>
+          </p:cNvPicPr>
+          <p:nvPr/>
+        </p:nvPicPr>
+        <p:blipFill>
+          <a:blip r:embed="rId5"/>
+          <a:stretch>
+            <a:fillRect/>
+          </a:stretch>
+        </p:blipFill>
+        <p:spPr>
+          <a:xfrm>
+            <a:off x="7658559" y="1245319"/>
+            <a:ext cx="251446" cy="203091"/>
           </a:xfrm>
           <a:prstGeom prst="rect">
             <a:avLst/>

</xml_diff>